<commit_message>
Presentation finished. Alles gut
</commit_message>
<xml_diff>
--- a/ISS_FinalPresentation.pptx
+++ b/ISS_FinalPresentation.pptx
@@ -11,6 +11,10 @@
     <p:sldId id="259" r:id="rId5"/>
     <p:sldId id="260" r:id="rId6"/>
     <p:sldId id="261" r:id="rId7"/>
+    <p:sldId id="262" r:id="rId8"/>
+    <p:sldId id="263" r:id="rId9"/>
+    <p:sldId id="264" r:id="rId10"/>
+    <p:sldId id="265" r:id="rId11"/>
   </p:sldIdLst>
   <p:sldSz cx="12192000" cy="6858000"/>
   <p:notesSz cx="6858000" cy="9144000"/>
@@ -109,7 +113,16 @@
       </a:defRPr>
     </a:lvl9pPr>
   </p:defaultTextStyle>
+  <p:extLst>
+    <p:ext uri="{EFAFB233-063F-42B5-8137-9DF3F51BA10A}">
+      <p15:sldGuideLst xmlns:p15="http://schemas.microsoft.com/office/powerpoint/2012/main"/>
+    </p:ext>
+  </p:extLst>
 </p:presentation>
+</file>
+
+<file path=ppt/revisionInfo.xml><?xml version="1.0" encoding="utf-8"?>
+<p1510:revInfo xmlns:a="http://schemas.openxmlformats.org/drawingml/2006/main" xmlns:r="http://schemas.openxmlformats.org/officeDocument/2006/relationships" xmlns:p1510="http://schemas.microsoft.com/office/powerpoint/2015/10/main"/>
 </file>
 
 <file path=ppt/slideLayouts/slideLayout1.xml><?xml version="1.0" encoding="utf-8"?>
@@ -162,7 +175,7 @@
           <a:noFill/>
           <a:extLst>
             <a:ext uri="{909E8E84-426E-40dd-AFC4-6F175D3DCCD1}">
-              <a14:hiddenFill xmlns:a14="http://schemas.microsoft.com/office/drawing/2010/main" xmlns="">
+              <a14:hiddenFill xmlns="" xmlns:a14="http://schemas.microsoft.com/office/drawing/2010/main">
                 <a:solidFill>
                   <a:srgbClr val="FFFFFF"/>
                 </a:solidFill>
@@ -222,7 +235,7 @@
             </a:ln>
             <a:extLst>
               <a:ext uri="{91240B29-F687-4f45-9708-019B960494DF}">
-                <a14:hiddenLine xmlns:a14="http://schemas.microsoft.com/office/drawing/2010/main" xmlns="" w="9525">
+                <a14:hiddenLine xmlns="" xmlns:a14="http://schemas.microsoft.com/office/drawing/2010/main" w="9525">
                   <a:solidFill>
                     <a:srgbClr val="000000"/>
                   </a:solidFill>
@@ -312,7 +325,7 @@
             </a:ln>
             <a:extLst>
               <a:ext uri="{91240B29-F687-4f45-9708-019B960494DF}">
-                <a14:hiddenLine xmlns:a14="http://schemas.microsoft.com/office/drawing/2010/main" xmlns="" w="9525">
+                <a14:hiddenLine xmlns="" xmlns:a14="http://schemas.microsoft.com/office/drawing/2010/main" w="9525">
                   <a:solidFill>
                     <a:srgbClr val="000000"/>
                   </a:solidFill>
@@ -402,7 +415,7 @@
             </a:ln>
             <a:extLst>
               <a:ext uri="{91240B29-F687-4f45-9708-019B960494DF}">
-                <a14:hiddenLine xmlns:a14="http://schemas.microsoft.com/office/drawing/2010/main" xmlns="" w="9525">
+                <a14:hiddenLine xmlns="" xmlns:a14="http://schemas.microsoft.com/office/drawing/2010/main" w="9525">
                   <a:solidFill>
                     <a:srgbClr val="000000"/>
                   </a:solidFill>
@@ -436,7 +449,7 @@
             </a:ln>
             <a:extLst>
               <a:ext uri="{91240B29-F687-4f45-9708-019B960494DF}">
-                <a14:hiddenLine xmlns:a14="http://schemas.microsoft.com/office/drawing/2010/main" xmlns="" w="9525">
+                <a14:hiddenLine xmlns="" xmlns:a14="http://schemas.microsoft.com/office/drawing/2010/main" w="9525">
                   <a:solidFill>
                     <a:srgbClr val="000000"/>
                   </a:solidFill>
@@ -526,7 +539,7 @@
             </a:ln>
             <a:extLst>
               <a:ext uri="{91240B29-F687-4f45-9708-019B960494DF}">
-                <a14:hiddenLine xmlns:a14="http://schemas.microsoft.com/office/drawing/2010/main" xmlns="" w="9525">
+                <a14:hiddenLine xmlns="" xmlns:a14="http://schemas.microsoft.com/office/drawing/2010/main" w="9525">
                   <a:solidFill>
                     <a:srgbClr val="000000"/>
                   </a:solidFill>
@@ -588,7 +601,7 @@
             </a:ln>
             <a:extLst>
               <a:ext uri="{91240B29-F687-4f45-9708-019B960494DF}">
-                <a14:hiddenLine xmlns:a14="http://schemas.microsoft.com/office/drawing/2010/main" xmlns="" w="9525">
+                <a14:hiddenLine xmlns="" xmlns:a14="http://schemas.microsoft.com/office/drawing/2010/main" w="9525">
                   <a:solidFill>
                     <a:srgbClr val="000000"/>
                   </a:solidFill>
@@ -650,7 +663,7 @@
             </a:ln>
             <a:extLst>
               <a:ext uri="{91240B29-F687-4f45-9708-019B960494DF}">
-                <a14:hiddenLine xmlns:a14="http://schemas.microsoft.com/office/drawing/2010/main" xmlns="" w="9525">
+                <a14:hiddenLine xmlns="" xmlns:a14="http://schemas.microsoft.com/office/drawing/2010/main" w="9525">
                   <a:solidFill>
                     <a:srgbClr val="000000"/>
                   </a:solidFill>
@@ -740,7 +753,7 @@
             </a:ln>
             <a:extLst>
               <a:ext uri="{91240B29-F687-4f45-9708-019B960494DF}">
-                <a14:hiddenLine xmlns:a14="http://schemas.microsoft.com/office/drawing/2010/main" xmlns="" w="9525">
+                <a14:hiddenLine xmlns="" xmlns:a14="http://schemas.microsoft.com/office/drawing/2010/main" w="9525">
                   <a:solidFill>
                     <a:srgbClr val="000000"/>
                   </a:solidFill>
@@ -802,7 +815,7 @@
             </a:ln>
             <a:extLst>
               <a:ext uri="{91240B29-F687-4f45-9708-019B960494DF}">
-                <a14:hiddenLine xmlns:a14="http://schemas.microsoft.com/office/drawing/2010/main" xmlns="" w="9525">
+                <a14:hiddenLine xmlns="" xmlns:a14="http://schemas.microsoft.com/office/drawing/2010/main" w="9525">
                   <a:solidFill>
                     <a:srgbClr val="000000"/>
                   </a:solidFill>
@@ -864,7 +877,7 @@
             </a:ln>
             <a:extLst>
               <a:ext uri="{91240B29-F687-4f45-9708-019B960494DF}">
-                <a14:hiddenLine xmlns:a14="http://schemas.microsoft.com/office/drawing/2010/main" xmlns="" w="9525">
+                <a14:hiddenLine xmlns="" xmlns:a14="http://schemas.microsoft.com/office/drawing/2010/main" w="9525">
                   <a:solidFill>
                     <a:srgbClr val="000000"/>
                   </a:solidFill>
@@ -954,7 +967,7 @@
             </a:ln>
             <a:extLst>
               <a:ext uri="{91240B29-F687-4f45-9708-019B960494DF}">
-                <a14:hiddenLine xmlns:a14="http://schemas.microsoft.com/office/drawing/2010/main" xmlns="" w="9525">
+                <a14:hiddenLine xmlns="" xmlns:a14="http://schemas.microsoft.com/office/drawing/2010/main" w="9525">
                   <a:solidFill>
                     <a:srgbClr val="000000"/>
                   </a:solidFill>
@@ -1044,7 +1057,7 @@
             </a:ln>
             <a:extLst>
               <a:ext uri="{91240B29-F687-4f45-9708-019B960494DF}">
-                <a14:hiddenLine xmlns:a14="http://schemas.microsoft.com/office/drawing/2010/main" xmlns="" w="9525">
+                <a14:hiddenLine xmlns="" xmlns:a14="http://schemas.microsoft.com/office/drawing/2010/main" w="9525">
                   <a:solidFill>
                     <a:srgbClr val="000000"/>
                   </a:solidFill>
@@ -1106,7 +1119,7 @@
             </a:ln>
             <a:extLst>
               <a:ext uri="{91240B29-F687-4f45-9708-019B960494DF}">
-                <a14:hiddenLine xmlns:a14="http://schemas.microsoft.com/office/drawing/2010/main" xmlns="" w="9525">
+                <a14:hiddenLine xmlns="" xmlns:a14="http://schemas.microsoft.com/office/drawing/2010/main" w="9525">
                   <a:solidFill>
                     <a:srgbClr val="000000"/>
                   </a:solidFill>
@@ -1216,7 +1229,7 @@
             </a:ln>
             <a:extLst>
               <a:ext uri="{91240B29-F687-4f45-9708-019B960494DF}">
-                <a14:hiddenLine xmlns:a14="http://schemas.microsoft.com/office/drawing/2010/main" xmlns="" w="9525">
+                <a14:hiddenLine xmlns="" xmlns:a14="http://schemas.microsoft.com/office/drawing/2010/main" w="9525">
                   <a:solidFill>
                     <a:srgbClr val="000000"/>
                   </a:solidFill>
@@ -1278,7 +1291,7 @@
             </a:ln>
             <a:extLst>
               <a:ext uri="{91240B29-F687-4f45-9708-019B960494DF}">
-                <a14:hiddenLine xmlns:a14="http://schemas.microsoft.com/office/drawing/2010/main" xmlns="" w="9525">
+                <a14:hiddenLine xmlns="" xmlns:a14="http://schemas.microsoft.com/office/drawing/2010/main" w="9525">
                   <a:solidFill>
                     <a:srgbClr val="000000"/>
                   </a:solidFill>
@@ -1368,7 +1381,7 @@
             </a:ln>
             <a:extLst>
               <a:ext uri="{91240B29-F687-4f45-9708-019B960494DF}">
-                <a14:hiddenLine xmlns:a14="http://schemas.microsoft.com/office/drawing/2010/main" xmlns="" w="9525">
+                <a14:hiddenLine xmlns="" xmlns:a14="http://schemas.microsoft.com/office/drawing/2010/main" w="9525">
                   <a:solidFill>
                     <a:srgbClr val="000000"/>
                   </a:solidFill>
@@ -1458,7 +1471,7 @@
             </a:ln>
             <a:extLst>
               <a:ext uri="{91240B29-F687-4f45-9708-019B960494DF}">
-                <a14:hiddenLine xmlns:a14="http://schemas.microsoft.com/office/drawing/2010/main" xmlns="" w="9525">
+                <a14:hiddenLine xmlns="" xmlns:a14="http://schemas.microsoft.com/office/drawing/2010/main" w="9525">
                   <a:solidFill>
                     <a:srgbClr val="000000"/>
                   </a:solidFill>
@@ -1520,7 +1533,7 @@
             </a:ln>
             <a:extLst>
               <a:ext uri="{91240B29-F687-4f45-9708-019B960494DF}">
-                <a14:hiddenLine xmlns:a14="http://schemas.microsoft.com/office/drawing/2010/main" xmlns="" w="9525">
+                <a14:hiddenLine xmlns="" xmlns:a14="http://schemas.microsoft.com/office/drawing/2010/main" w="9525">
                   <a:solidFill>
                     <a:srgbClr val="000000"/>
                   </a:solidFill>
@@ -1610,7 +1623,7 @@
             </a:ln>
             <a:extLst>
               <a:ext uri="{91240B29-F687-4f45-9708-019B960494DF}">
-                <a14:hiddenLine xmlns:a14="http://schemas.microsoft.com/office/drawing/2010/main" xmlns="" w="9525">
+                <a14:hiddenLine xmlns="" xmlns:a14="http://schemas.microsoft.com/office/drawing/2010/main" w="9525">
                   <a:solidFill>
                     <a:srgbClr val="000000"/>
                   </a:solidFill>
@@ -1700,7 +1713,7 @@
             </a:ln>
             <a:extLst>
               <a:ext uri="{91240B29-F687-4f45-9708-019B960494DF}">
-                <a14:hiddenLine xmlns:a14="http://schemas.microsoft.com/office/drawing/2010/main" xmlns="" w="9525">
+                <a14:hiddenLine xmlns="" xmlns:a14="http://schemas.microsoft.com/office/drawing/2010/main" w="9525">
                   <a:solidFill>
                     <a:srgbClr val="000000"/>
                   </a:solidFill>
@@ -1756,7 +1769,7 @@
             </a:ln>
             <a:extLst>
               <a:ext uri="{91240B29-F687-4f45-9708-019B960494DF}">
-                <a14:hiddenLine xmlns:a14="http://schemas.microsoft.com/office/drawing/2010/main" xmlns="" w="9525">
+                <a14:hiddenLine xmlns="" xmlns:a14="http://schemas.microsoft.com/office/drawing/2010/main" w="9525">
                   <a:solidFill>
                     <a:srgbClr val="000000"/>
                   </a:solidFill>
@@ -1846,7 +1859,7 @@
             </a:ln>
             <a:extLst>
               <a:ext uri="{91240B29-F687-4f45-9708-019B960494DF}">
-                <a14:hiddenLine xmlns:a14="http://schemas.microsoft.com/office/drawing/2010/main" xmlns="" w="9525">
+                <a14:hiddenLine xmlns="" xmlns:a14="http://schemas.microsoft.com/office/drawing/2010/main" w="9525">
                   <a:solidFill>
                     <a:srgbClr val="000000"/>
                   </a:solidFill>
@@ -1902,7 +1915,7 @@
             </a:ln>
             <a:extLst>
               <a:ext uri="{91240B29-F687-4f45-9708-019B960494DF}">
-                <a14:hiddenLine xmlns:a14="http://schemas.microsoft.com/office/drawing/2010/main" xmlns="" w="9525">
+                <a14:hiddenLine xmlns="" xmlns:a14="http://schemas.microsoft.com/office/drawing/2010/main" w="9525">
                   <a:solidFill>
                     <a:srgbClr val="000000"/>
                   </a:solidFill>
@@ -1992,7 +2005,7 @@
             </a:ln>
             <a:extLst>
               <a:ext uri="{91240B29-F687-4f45-9708-019B960494DF}">
-                <a14:hiddenLine xmlns:a14="http://schemas.microsoft.com/office/drawing/2010/main" xmlns="" w="9525">
+                <a14:hiddenLine xmlns="" xmlns:a14="http://schemas.microsoft.com/office/drawing/2010/main" w="9525">
                   <a:solidFill>
                     <a:srgbClr val="000000"/>
                   </a:solidFill>
@@ -2060,7 +2073,7 @@
             </a:ln>
             <a:extLst>
               <a:ext uri="{91240B29-F687-4f45-9708-019B960494DF}">
-                <a14:hiddenLine xmlns:a14="http://schemas.microsoft.com/office/drawing/2010/main" xmlns="" w="9525">
+                <a14:hiddenLine xmlns="" xmlns:a14="http://schemas.microsoft.com/office/drawing/2010/main" w="9525">
                   <a:solidFill>
                     <a:srgbClr val="000000"/>
                   </a:solidFill>
@@ -2150,7 +2163,7 @@
             </a:ln>
             <a:extLst>
               <a:ext uri="{91240B29-F687-4f45-9708-019B960494DF}">
-                <a14:hiddenLine xmlns:a14="http://schemas.microsoft.com/office/drawing/2010/main" xmlns="" w="9525">
+                <a14:hiddenLine xmlns="" xmlns:a14="http://schemas.microsoft.com/office/drawing/2010/main" w="9525">
                   <a:solidFill>
                     <a:srgbClr val="000000"/>
                   </a:solidFill>
@@ -2218,7 +2231,7 @@
             </a:ln>
             <a:extLst>
               <a:ext uri="{91240B29-F687-4f45-9708-019B960494DF}">
-                <a14:hiddenLine xmlns:a14="http://schemas.microsoft.com/office/drawing/2010/main" xmlns="" w="9525">
+                <a14:hiddenLine xmlns="" xmlns:a14="http://schemas.microsoft.com/office/drawing/2010/main" w="9525">
                   <a:solidFill>
                     <a:srgbClr val="000000"/>
                   </a:solidFill>
@@ -2308,7 +2321,7 @@
             </a:ln>
             <a:extLst>
               <a:ext uri="{91240B29-F687-4f45-9708-019B960494DF}">
-                <a14:hiddenLine xmlns:a14="http://schemas.microsoft.com/office/drawing/2010/main" xmlns="" w="9525">
+                <a14:hiddenLine xmlns="" xmlns:a14="http://schemas.microsoft.com/office/drawing/2010/main" w="9525">
                   <a:solidFill>
                     <a:srgbClr val="000000"/>
                   </a:solidFill>
@@ -2342,7 +2355,7 @@
             </a:ln>
             <a:extLst>
               <a:ext uri="{91240B29-F687-4f45-9708-019B960494DF}">
-                <a14:hiddenLine xmlns:a14="http://schemas.microsoft.com/office/drawing/2010/main" xmlns="" w="9525">
+                <a14:hiddenLine xmlns="" xmlns:a14="http://schemas.microsoft.com/office/drawing/2010/main" w="9525">
                   <a:solidFill>
                     <a:srgbClr val="000000"/>
                   </a:solidFill>
@@ -2432,7 +2445,7 @@
             </a:ln>
             <a:extLst>
               <a:ext uri="{91240B29-F687-4f45-9708-019B960494DF}">
-                <a14:hiddenLine xmlns:a14="http://schemas.microsoft.com/office/drawing/2010/main" xmlns="" w="9525">
+                <a14:hiddenLine xmlns="" xmlns:a14="http://schemas.microsoft.com/office/drawing/2010/main" w="9525">
                   <a:solidFill>
                     <a:srgbClr val="000000"/>
                   </a:solidFill>
@@ -2494,7 +2507,7 @@
             </a:ln>
             <a:extLst>
               <a:ext uri="{91240B29-F687-4f45-9708-019B960494DF}">
-                <a14:hiddenLine xmlns:a14="http://schemas.microsoft.com/office/drawing/2010/main" xmlns="" w="9525">
+                <a14:hiddenLine xmlns="" xmlns:a14="http://schemas.microsoft.com/office/drawing/2010/main" w="9525">
                   <a:solidFill>
                     <a:srgbClr val="000000"/>
                   </a:solidFill>
@@ -2556,7 +2569,7 @@
             </a:ln>
             <a:extLst>
               <a:ext uri="{91240B29-F687-4f45-9708-019B960494DF}">
-                <a14:hiddenLine xmlns:a14="http://schemas.microsoft.com/office/drawing/2010/main" xmlns="" w="9525">
+                <a14:hiddenLine xmlns="" xmlns:a14="http://schemas.microsoft.com/office/drawing/2010/main" w="9525">
                   <a:solidFill>
                     <a:srgbClr val="000000"/>
                   </a:solidFill>
@@ -2646,7 +2659,7 @@
             </a:ln>
             <a:extLst>
               <a:ext uri="{91240B29-F687-4f45-9708-019B960494DF}">
-                <a14:hiddenLine xmlns:a14="http://schemas.microsoft.com/office/drawing/2010/main" xmlns="" w="9525">
+                <a14:hiddenLine xmlns="" xmlns:a14="http://schemas.microsoft.com/office/drawing/2010/main" w="9525">
                   <a:solidFill>
                     <a:srgbClr val="000000"/>
                   </a:solidFill>
@@ -2714,7 +2727,7 @@
             </a:ln>
             <a:extLst>
               <a:ext uri="{91240B29-F687-4f45-9708-019B960494DF}">
-                <a14:hiddenLine xmlns:a14="http://schemas.microsoft.com/office/drawing/2010/main" xmlns="" w="9525">
+                <a14:hiddenLine xmlns="" xmlns:a14="http://schemas.microsoft.com/office/drawing/2010/main" w="9525">
                   <a:solidFill>
                     <a:srgbClr val="000000"/>
                   </a:solidFill>
@@ -2776,7 +2789,7 @@
             </a:ln>
             <a:extLst>
               <a:ext uri="{91240B29-F687-4f45-9708-019B960494DF}">
-                <a14:hiddenLine xmlns:a14="http://schemas.microsoft.com/office/drawing/2010/main" xmlns="" w="9525">
+                <a14:hiddenLine xmlns="" xmlns:a14="http://schemas.microsoft.com/office/drawing/2010/main" w="9525">
                   <a:solidFill>
                     <a:srgbClr val="000000"/>
                   </a:solidFill>
@@ -2866,7 +2879,7 @@
             </a:ln>
             <a:extLst>
               <a:ext uri="{91240B29-F687-4f45-9708-019B960494DF}">
-                <a14:hiddenLine xmlns:a14="http://schemas.microsoft.com/office/drawing/2010/main" xmlns="" w="9525">
+                <a14:hiddenLine xmlns="" xmlns:a14="http://schemas.microsoft.com/office/drawing/2010/main" w="9525">
                   <a:solidFill>
                     <a:srgbClr val="000000"/>
                   </a:solidFill>
@@ -2928,7 +2941,7 @@
             </a:ln>
             <a:extLst>
               <a:ext uri="{91240B29-F687-4f45-9708-019B960494DF}">
-                <a14:hiddenLine xmlns:a14="http://schemas.microsoft.com/office/drawing/2010/main" xmlns="" w="9525">
+                <a14:hiddenLine xmlns="" xmlns:a14="http://schemas.microsoft.com/office/drawing/2010/main" w="9525">
                   <a:solidFill>
                     <a:srgbClr val="000000"/>
                   </a:solidFill>
@@ -3018,7 +3031,7 @@
             </a:ln>
             <a:extLst>
               <a:ext uri="{91240B29-F687-4f45-9708-019B960494DF}">
-                <a14:hiddenLine xmlns:a14="http://schemas.microsoft.com/office/drawing/2010/main" xmlns="" w="9525">
+                <a14:hiddenLine xmlns="" xmlns:a14="http://schemas.microsoft.com/office/drawing/2010/main" w="9525">
                   <a:solidFill>
                     <a:srgbClr val="000000"/>
                   </a:solidFill>
@@ -3080,7 +3093,7 @@
             </a:ln>
             <a:extLst>
               <a:ext uri="{91240B29-F687-4f45-9708-019B960494DF}">
-                <a14:hiddenLine xmlns:a14="http://schemas.microsoft.com/office/drawing/2010/main" xmlns="" w="9525">
+                <a14:hiddenLine xmlns="" xmlns:a14="http://schemas.microsoft.com/office/drawing/2010/main" w="9525">
                   <a:solidFill>
                     <a:srgbClr val="000000"/>
                   </a:solidFill>
@@ -3170,7 +3183,7 @@
             </a:ln>
             <a:extLst>
               <a:ext uri="{91240B29-F687-4f45-9708-019B960494DF}">
-                <a14:hiddenLine xmlns:a14="http://schemas.microsoft.com/office/drawing/2010/main" xmlns="" w="9525">
+                <a14:hiddenLine xmlns="" xmlns:a14="http://schemas.microsoft.com/office/drawing/2010/main" w="9525">
                   <a:solidFill>
                     <a:srgbClr val="000000"/>
                   </a:solidFill>
@@ -3204,7 +3217,7 @@
             </a:ln>
             <a:extLst>
               <a:ext uri="{91240B29-F687-4f45-9708-019B960494DF}">
-                <a14:hiddenLine xmlns:a14="http://schemas.microsoft.com/office/drawing/2010/main" xmlns="" w="9525">
+                <a14:hiddenLine xmlns="" xmlns:a14="http://schemas.microsoft.com/office/drawing/2010/main" w="9525">
                   <a:solidFill>
                     <a:srgbClr val="000000"/>
                   </a:solidFill>
@@ -3269,7 +3282,7 @@
             </a:ln>
             <a:extLst>
               <a:ext uri="{91240B29-F687-4f45-9708-019B960494DF}">
-                <a14:hiddenLine xmlns:a14="http://schemas.microsoft.com/office/drawing/2010/main" xmlns="" w="9525">
+                <a14:hiddenLine xmlns="" xmlns:a14="http://schemas.microsoft.com/office/drawing/2010/main" w="9525">
                   <a:solidFill>
                     <a:srgbClr val="000000"/>
                   </a:solidFill>
@@ -3359,7 +3372,7 @@
             </a:ln>
             <a:extLst>
               <a:ext uri="{91240B29-F687-4f45-9708-019B960494DF}">
-                <a14:hiddenLine xmlns:a14="http://schemas.microsoft.com/office/drawing/2010/main" xmlns="" w="9525">
+                <a14:hiddenLine xmlns="" xmlns:a14="http://schemas.microsoft.com/office/drawing/2010/main" w="9525">
                   <a:solidFill>
                     <a:srgbClr val="000000"/>
                   </a:solidFill>
@@ -3421,7 +3434,7 @@
             </a:ln>
             <a:extLst>
               <a:ext uri="{91240B29-F687-4f45-9708-019B960494DF}">
-                <a14:hiddenLine xmlns:a14="http://schemas.microsoft.com/office/drawing/2010/main" xmlns="" w="9525">
+                <a14:hiddenLine xmlns="" xmlns:a14="http://schemas.microsoft.com/office/drawing/2010/main" w="9525">
                   <a:solidFill>
                     <a:srgbClr val="000000"/>
                   </a:solidFill>
@@ -3511,7 +3524,7 @@
             </a:ln>
             <a:extLst>
               <a:ext uri="{91240B29-F687-4f45-9708-019B960494DF}">
-                <a14:hiddenLine xmlns:a14="http://schemas.microsoft.com/office/drawing/2010/main" xmlns="" w="9525">
+                <a14:hiddenLine xmlns="" xmlns:a14="http://schemas.microsoft.com/office/drawing/2010/main" w="9525">
                   <a:solidFill>
                     <a:srgbClr val="000000"/>
                   </a:solidFill>
@@ -3601,7 +3614,7 @@
             </a:ln>
             <a:extLst>
               <a:ext uri="{91240B29-F687-4f45-9708-019B960494DF}">
-                <a14:hiddenLine xmlns:a14="http://schemas.microsoft.com/office/drawing/2010/main" xmlns="" w="9525">
+                <a14:hiddenLine xmlns="" xmlns:a14="http://schemas.microsoft.com/office/drawing/2010/main" w="9525">
                   <a:solidFill>
                     <a:srgbClr val="000000"/>
                   </a:solidFill>
@@ -3666,7 +3679,7 @@
             </a:ln>
             <a:extLst>
               <a:ext uri="{91240B29-F687-4f45-9708-019B960494DF}">
-                <a14:hiddenLine xmlns:a14="http://schemas.microsoft.com/office/drawing/2010/main" xmlns="" w="9525">
+                <a14:hiddenLine xmlns="" xmlns:a14="http://schemas.microsoft.com/office/drawing/2010/main" w="9525">
                   <a:solidFill>
                     <a:srgbClr val="000000"/>
                   </a:solidFill>
@@ -3728,7 +3741,7 @@
             </a:ln>
             <a:extLst>
               <a:ext uri="{91240B29-F687-4f45-9708-019B960494DF}">
-                <a14:hiddenLine xmlns:a14="http://schemas.microsoft.com/office/drawing/2010/main" xmlns="" w="9525">
+                <a14:hiddenLine xmlns="" xmlns:a14="http://schemas.microsoft.com/office/drawing/2010/main" w="9525">
                   <a:solidFill>
                     <a:srgbClr val="000000"/>
                   </a:solidFill>
@@ -3818,7 +3831,7 @@
             </a:ln>
             <a:extLst>
               <a:ext uri="{91240B29-F687-4f45-9708-019B960494DF}">
-                <a14:hiddenLine xmlns:a14="http://schemas.microsoft.com/office/drawing/2010/main" xmlns="" w="9525">
+                <a14:hiddenLine xmlns="" xmlns:a14="http://schemas.microsoft.com/office/drawing/2010/main" w="9525">
                   <a:solidFill>
                     <a:srgbClr val="000000"/>
                   </a:solidFill>
@@ -3908,7 +3921,7 @@
             </a:ln>
             <a:extLst>
               <a:ext uri="{91240B29-F687-4f45-9708-019B960494DF}">
-                <a14:hiddenLine xmlns:a14="http://schemas.microsoft.com/office/drawing/2010/main" xmlns="" w="9525">
+                <a14:hiddenLine xmlns="" xmlns:a14="http://schemas.microsoft.com/office/drawing/2010/main" w="9525">
                   <a:solidFill>
                     <a:srgbClr val="000000"/>
                   </a:solidFill>
@@ -3970,7 +3983,7 @@
             </a:ln>
             <a:extLst>
               <a:ext uri="{91240B29-F687-4f45-9708-019B960494DF}">
-                <a14:hiddenLine xmlns:a14="http://schemas.microsoft.com/office/drawing/2010/main" xmlns="" w="9525">
+                <a14:hiddenLine xmlns="" xmlns:a14="http://schemas.microsoft.com/office/drawing/2010/main" w="9525">
                   <a:solidFill>
                     <a:srgbClr val="000000"/>
                   </a:solidFill>
@@ -4090,7 +4103,7 @@
             </a:ln>
             <a:extLst>
               <a:ext uri="{91240B29-F687-4f45-9708-019B960494DF}">
-                <a14:hiddenLine xmlns:a14="http://schemas.microsoft.com/office/drawing/2010/main" xmlns="" w="9525">
+                <a14:hiddenLine xmlns="" xmlns:a14="http://schemas.microsoft.com/office/drawing/2010/main" w="9525">
                   <a:solidFill>
                     <a:srgbClr val="000000"/>
                   </a:solidFill>
@@ -4158,7 +4171,7 @@
             </a:ln>
             <a:extLst>
               <a:ext uri="{91240B29-F687-4f45-9708-019B960494DF}">
-                <a14:hiddenLine xmlns:a14="http://schemas.microsoft.com/office/drawing/2010/main" xmlns="" w="9525">
+                <a14:hiddenLine xmlns="" xmlns:a14="http://schemas.microsoft.com/office/drawing/2010/main" w="9525">
                   <a:solidFill>
                     <a:srgbClr val="000000"/>
                   </a:solidFill>
@@ -4248,7 +4261,7 @@
             </a:ln>
             <a:extLst>
               <a:ext uri="{91240B29-F687-4f45-9708-019B960494DF}">
-                <a14:hiddenLine xmlns:a14="http://schemas.microsoft.com/office/drawing/2010/main" xmlns="" w="9525">
+                <a14:hiddenLine xmlns="" xmlns:a14="http://schemas.microsoft.com/office/drawing/2010/main" w="9525">
                   <a:solidFill>
                     <a:srgbClr val="000000"/>
                   </a:solidFill>
@@ -4559,7 +4572,7 @@
               <a:buNone/>
             </a:pPr>
             <a:r>
-              <a:rPr lang="es-ES"/>
+              <a:rPr lang="es-ES" dirty="0"/>
               <a:t>Haga clic en el icono para agregar una imagen</a:t>
             </a:r>
             <a:endParaRPr lang="en-US" dirty="0"/>
@@ -6295,7 +6308,7 @@
               <a:buNone/>
             </a:pPr>
             <a:r>
-              <a:rPr lang="es-ES"/>
+              <a:rPr lang="es-ES" dirty="0"/>
               <a:t>Haga clic en el icono para agregar una imagen</a:t>
             </a:r>
             <a:endParaRPr lang="en-US" dirty="0"/>
@@ -6494,7 +6507,7 @@
               <a:buNone/>
             </a:pPr>
             <a:r>
-              <a:rPr lang="es-ES"/>
+              <a:rPr lang="es-ES" dirty="0"/>
               <a:t>Haga clic en el icono para agregar una imagen</a:t>
             </a:r>
             <a:endParaRPr lang="en-US" dirty="0"/>
@@ -6693,7 +6706,7 @@
               <a:buNone/>
             </a:pPr>
             <a:r>
-              <a:rPr lang="es-ES"/>
+              <a:rPr lang="es-ES" dirty="0"/>
               <a:t>Haga clic en el icono para agregar una imagen</a:t>
             </a:r>
             <a:endParaRPr lang="en-US" dirty="0"/>
@@ -8770,7 +8783,7 @@
           </a:lstStyle>
           <a:p>
             <a:r>
-              <a:rPr lang="es-ES"/>
+              <a:rPr lang="es-ES" dirty="0"/>
               <a:t>Haga clic en el icono para agregar una imagen</a:t>
             </a:r>
             <a:endParaRPr lang="en-US" dirty="0"/>
@@ -8970,7 +8983,7 @@
           <a:noFill/>
           <a:extLst>
             <a:ext uri="{909E8E84-426E-40dd-AFC4-6F175D3DCCD1}">
-              <a14:hiddenFill xmlns:a14="http://schemas.microsoft.com/office/drawing/2010/main" xmlns="">
+              <a14:hiddenFill xmlns="" xmlns:a14="http://schemas.microsoft.com/office/drawing/2010/main">
                 <a:solidFill>
                   <a:srgbClr val="FFFFFF"/>
                 </a:solidFill>
@@ -9044,7 +9057,7 @@
               </a:ln>
               <a:extLst>
                 <a:ext uri="{91240B29-F687-4f45-9708-019B960494DF}">
-                  <a14:hiddenLine xmlns:a14="http://schemas.microsoft.com/office/drawing/2010/main" xmlns="" w="9525">
+                  <a14:hiddenLine xmlns="" xmlns:a14="http://schemas.microsoft.com/office/drawing/2010/main" w="9525">
                     <a:solidFill>
                       <a:srgbClr val="000000"/>
                     </a:solidFill>
@@ -9134,7 +9147,7 @@
               </a:ln>
               <a:extLst>
                 <a:ext uri="{91240B29-F687-4f45-9708-019B960494DF}">
-                  <a14:hiddenLine xmlns:a14="http://schemas.microsoft.com/office/drawing/2010/main" xmlns="" w="9525">
+                  <a14:hiddenLine xmlns="" xmlns:a14="http://schemas.microsoft.com/office/drawing/2010/main" w="9525">
                     <a:solidFill>
                       <a:srgbClr val="000000"/>
                     </a:solidFill>
@@ -9224,7 +9237,7 @@
               </a:ln>
               <a:extLst>
                 <a:ext uri="{91240B29-F687-4f45-9708-019B960494DF}">
-                  <a14:hiddenLine xmlns:a14="http://schemas.microsoft.com/office/drawing/2010/main" xmlns="" w="9525">
+                  <a14:hiddenLine xmlns="" xmlns:a14="http://schemas.microsoft.com/office/drawing/2010/main" w="9525">
                     <a:solidFill>
                       <a:srgbClr val="000000"/>
                     </a:solidFill>
@@ -9286,7 +9299,7 @@
               </a:ln>
               <a:extLst>
                 <a:ext uri="{91240B29-F687-4f45-9708-019B960494DF}">
-                  <a14:hiddenLine xmlns:a14="http://schemas.microsoft.com/office/drawing/2010/main" xmlns="" w="9525">
+                  <a14:hiddenLine xmlns="" xmlns:a14="http://schemas.microsoft.com/office/drawing/2010/main" w="9525">
                     <a:solidFill>
                       <a:srgbClr val="000000"/>
                     </a:solidFill>
@@ -9376,7 +9389,7 @@
               </a:ln>
               <a:extLst>
                 <a:ext uri="{91240B29-F687-4f45-9708-019B960494DF}">
-                  <a14:hiddenLine xmlns:a14="http://schemas.microsoft.com/office/drawing/2010/main" xmlns="" w="9525">
+                  <a14:hiddenLine xmlns="" xmlns:a14="http://schemas.microsoft.com/office/drawing/2010/main" w="9525">
                     <a:solidFill>
                       <a:srgbClr val="000000"/>
                     </a:solidFill>
@@ -9438,7 +9451,7 @@
               </a:ln>
               <a:extLst>
                 <a:ext uri="{91240B29-F687-4f45-9708-019B960494DF}">
-                  <a14:hiddenLine xmlns:a14="http://schemas.microsoft.com/office/drawing/2010/main" xmlns="" w="9525">
+                  <a14:hiddenLine xmlns="" xmlns:a14="http://schemas.microsoft.com/office/drawing/2010/main" w="9525">
                     <a:solidFill>
                       <a:srgbClr val="000000"/>
                     </a:solidFill>
@@ -9500,7 +9513,7 @@
               </a:ln>
               <a:extLst>
                 <a:ext uri="{91240B29-F687-4f45-9708-019B960494DF}">
-                  <a14:hiddenLine xmlns:a14="http://schemas.microsoft.com/office/drawing/2010/main" xmlns="" w="9525">
+                  <a14:hiddenLine xmlns="" xmlns:a14="http://schemas.microsoft.com/office/drawing/2010/main" w="9525">
                     <a:solidFill>
                       <a:srgbClr val="000000"/>
                     </a:solidFill>
@@ -9590,7 +9603,7 @@
               </a:ln>
               <a:extLst>
                 <a:ext uri="{91240B29-F687-4f45-9708-019B960494DF}">
-                  <a14:hiddenLine xmlns:a14="http://schemas.microsoft.com/office/drawing/2010/main" xmlns="" w="9525">
+                  <a14:hiddenLine xmlns="" xmlns:a14="http://schemas.microsoft.com/office/drawing/2010/main" w="9525">
                     <a:solidFill>
                       <a:srgbClr val="000000"/>
                     </a:solidFill>
@@ -9680,7 +9693,7 @@
               </a:ln>
               <a:extLst>
                 <a:ext uri="{91240B29-F687-4f45-9708-019B960494DF}">
-                  <a14:hiddenLine xmlns:a14="http://schemas.microsoft.com/office/drawing/2010/main" xmlns="" w="9525">
+                  <a14:hiddenLine xmlns="" xmlns:a14="http://schemas.microsoft.com/office/drawing/2010/main" w="9525">
                     <a:solidFill>
                       <a:srgbClr val="000000"/>
                     </a:solidFill>
@@ -9742,7 +9755,7 @@
               </a:ln>
               <a:extLst>
                 <a:ext uri="{91240B29-F687-4f45-9708-019B960494DF}">
-                  <a14:hiddenLine xmlns:a14="http://schemas.microsoft.com/office/drawing/2010/main" xmlns="" w="9525">
+                  <a14:hiddenLine xmlns="" xmlns:a14="http://schemas.microsoft.com/office/drawing/2010/main" w="9525">
                     <a:solidFill>
                       <a:srgbClr val="000000"/>
                     </a:solidFill>
@@ -9852,7 +9865,7 @@
               </a:ln>
               <a:extLst>
                 <a:ext uri="{91240B29-F687-4f45-9708-019B960494DF}">
-                  <a14:hiddenLine xmlns:a14="http://schemas.microsoft.com/office/drawing/2010/main" xmlns="" w="9525">
+                  <a14:hiddenLine xmlns="" xmlns:a14="http://schemas.microsoft.com/office/drawing/2010/main" w="9525">
                     <a:solidFill>
                       <a:srgbClr val="000000"/>
                     </a:solidFill>
@@ -9936,7 +9949,7 @@
               </a:ln>
               <a:extLst>
                 <a:ext uri="{91240B29-F687-4f45-9708-019B960494DF}">
-                  <a14:hiddenLine xmlns:a14="http://schemas.microsoft.com/office/drawing/2010/main" xmlns="" w="9525">
+                  <a14:hiddenLine xmlns="" xmlns:a14="http://schemas.microsoft.com/office/drawing/2010/main" w="9525">
                     <a:solidFill>
                       <a:srgbClr val="000000"/>
                     </a:solidFill>
@@ -9998,7 +10011,7 @@
               </a:ln>
               <a:extLst>
                 <a:ext uri="{91240B29-F687-4f45-9708-019B960494DF}">
-                  <a14:hiddenLine xmlns:a14="http://schemas.microsoft.com/office/drawing/2010/main" xmlns="" w="9525">
+                  <a14:hiddenLine xmlns="" xmlns:a14="http://schemas.microsoft.com/office/drawing/2010/main" w="9525">
                     <a:solidFill>
                       <a:srgbClr val="000000"/>
                     </a:solidFill>
@@ -10060,7 +10073,7 @@
               </a:ln>
               <a:extLst>
                 <a:ext uri="{91240B29-F687-4f45-9708-019B960494DF}">
-                  <a14:hiddenLine xmlns:a14="http://schemas.microsoft.com/office/drawing/2010/main" xmlns="" w="9525">
+                  <a14:hiddenLine xmlns="" xmlns:a14="http://schemas.microsoft.com/office/drawing/2010/main" w="9525">
                     <a:solidFill>
                       <a:srgbClr val="000000"/>
                     </a:solidFill>
@@ -10150,7 +10163,7 @@
               </a:ln>
               <a:extLst>
                 <a:ext uri="{91240B29-F687-4f45-9708-019B960494DF}">
-                  <a14:hiddenLine xmlns:a14="http://schemas.microsoft.com/office/drawing/2010/main" xmlns="" w="9525">
+                  <a14:hiddenLine xmlns="" xmlns:a14="http://schemas.microsoft.com/office/drawing/2010/main" w="9525">
                     <a:solidFill>
                       <a:srgbClr val="000000"/>
                     </a:solidFill>
@@ -10184,7 +10197,7 @@
               </a:ln>
               <a:extLst>
                 <a:ext uri="{91240B29-F687-4f45-9708-019B960494DF}">
-                  <a14:hiddenLine xmlns:a14="http://schemas.microsoft.com/office/drawing/2010/main" xmlns="" w="9525">
+                  <a14:hiddenLine xmlns="" xmlns:a14="http://schemas.microsoft.com/office/drawing/2010/main" w="9525">
                     <a:solidFill>
                       <a:srgbClr val="000000"/>
                     </a:solidFill>
@@ -10249,7 +10262,7 @@
               </a:ln>
               <a:extLst>
                 <a:ext uri="{91240B29-F687-4f45-9708-019B960494DF}">
-                  <a14:hiddenLine xmlns:a14="http://schemas.microsoft.com/office/drawing/2010/main" xmlns="" w="9525">
+                  <a14:hiddenLine xmlns="" xmlns:a14="http://schemas.microsoft.com/office/drawing/2010/main" w="9525">
                     <a:solidFill>
                       <a:srgbClr val="000000"/>
                     </a:solidFill>
@@ -10339,7 +10352,7 @@
               </a:ln>
               <a:extLst>
                 <a:ext uri="{91240B29-F687-4f45-9708-019B960494DF}">
-                  <a14:hiddenLine xmlns:a14="http://schemas.microsoft.com/office/drawing/2010/main" xmlns="" w="9525">
+                  <a14:hiddenLine xmlns="" xmlns:a14="http://schemas.microsoft.com/office/drawing/2010/main" w="9525">
                     <a:solidFill>
                       <a:srgbClr val="000000"/>
                     </a:solidFill>
@@ -10401,7 +10414,7 @@
               </a:ln>
               <a:extLst>
                 <a:ext uri="{91240B29-F687-4f45-9708-019B960494DF}">
-                  <a14:hiddenLine xmlns:a14="http://schemas.microsoft.com/office/drawing/2010/main" xmlns="" w="9525">
+                  <a14:hiddenLine xmlns="" xmlns:a14="http://schemas.microsoft.com/office/drawing/2010/main" w="9525">
                     <a:solidFill>
                       <a:srgbClr val="000000"/>
                     </a:solidFill>
@@ -10491,7 +10504,7 @@
               </a:ln>
               <a:extLst>
                 <a:ext uri="{91240B29-F687-4f45-9708-019B960494DF}">
-                  <a14:hiddenLine xmlns:a14="http://schemas.microsoft.com/office/drawing/2010/main" xmlns="" w="9525">
+                  <a14:hiddenLine xmlns="" xmlns:a14="http://schemas.microsoft.com/office/drawing/2010/main" w="9525">
                     <a:solidFill>
                       <a:srgbClr val="000000"/>
                     </a:solidFill>
@@ -10556,7 +10569,7 @@
               </a:ln>
               <a:extLst>
                 <a:ext uri="{91240B29-F687-4f45-9708-019B960494DF}">
-                  <a14:hiddenLine xmlns:a14="http://schemas.microsoft.com/office/drawing/2010/main" xmlns="" w="9525">
+                  <a14:hiddenLine xmlns="" xmlns:a14="http://schemas.microsoft.com/office/drawing/2010/main" w="9525">
                     <a:solidFill>
                       <a:srgbClr val="000000"/>
                     </a:solidFill>
@@ -10618,7 +10631,7 @@
               </a:ln>
               <a:extLst>
                 <a:ext uri="{91240B29-F687-4f45-9708-019B960494DF}">
-                  <a14:hiddenLine xmlns:a14="http://schemas.microsoft.com/office/drawing/2010/main" xmlns="" w="9525">
+                  <a14:hiddenLine xmlns="" xmlns:a14="http://schemas.microsoft.com/office/drawing/2010/main" w="9525">
                     <a:solidFill>
                       <a:srgbClr val="000000"/>
                     </a:solidFill>
@@ -10708,7 +10721,7 @@
               </a:ln>
               <a:extLst>
                 <a:ext uri="{91240B29-F687-4f45-9708-019B960494DF}">
-                  <a14:hiddenLine xmlns:a14="http://schemas.microsoft.com/office/drawing/2010/main" xmlns="" w="9525">
+                  <a14:hiddenLine xmlns="" xmlns:a14="http://schemas.microsoft.com/office/drawing/2010/main" w="9525">
                     <a:solidFill>
                       <a:srgbClr val="000000"/>
                     </a:solidFill>
@@ -10798,7 +10811,7 @@
               </a:ln>
               <a:extLst>
                 <a:ext uri="{91240B29-F687-4f45-9708-019B960494DF}">
-                  <a14:hiddenLine xmlns:a14="http://schemas.microsoft.com/office/drawing/2010/main" xmlns="" w="9525">
+                  <a14:hiddenLine xmlns="" xmlns:a14="http://schemas.microsoft.com/office/drawing/2010/main" w="9525">
                     <a:solidFill>
                       <a:srgbClr val="000000"/>
                     </a:solidFill>
@@ -10863,7 +10876,7 @@
               </a:ln>
               <a:extLst>
                 <a:ext uri="{91240B29-F687-4f45-9708-019B960494DF}">
-                  <a14:hiddenLine xmlns:a14="http://schemas.microsoft.com/office/drawing/2010/main" xmlns="" w="9525">
+                  <a14:hiddenLine xmlns="" xmlns:a14="http://schemas.microsoft.com/office/drawing/2010/main" w="9525">
                     <a:solidFill>
                       <a:srgbClr val="000000"/>
                     </a:solidFill>
@@ -10983,7 +10996,7 @@
               </a:ln>
               <a:extLst>
                 <a:ext uri="{91240B29-F687-4f45-9708-019B960494DF}">
-                  <a14:hiddenLine xmlns:a14="http://schemas.microsoft.com/office/drawing/2010/main" xmlns="" w="9525">
+                  <a14:hiddenLine xmlns="" xmlns:a14="http://schemas.microsoft.com/office/drawing/2010/main" w="9525">
                     <a:solidFill>
                       <a:srgbClr val="000000"/>
                     </a:solidFill>
@@ -11081,7 +11094,7 @@
               </a:ln>
               <a:extLst>
                 <a:ext uri="{91240B29-F687-4f45-9708-019B960494DF}">
-                  <a14:hiddenLine xmlns:a14="http://schemas.microsoft.com/office/drawing/2010/main" xmlns="" w="9525">
+                  <a14:hiddenLine xmlns="" xmlns:a14="http://schemas.microsoft.com/office/drawing/2010/main" w="9525">
                     <a:solidFill>
                       <a:srgbClr val="000000"/>
                     </a:solidFill>
@@ -11196,7 +11209,7 @@
               </a:ln>
               <a:extLst>
                 <a:ext uri="{91240B29-F687-4f45-9708-019B960494DF}">
-                  <a14:hiddenLine xmlns:a14="http://schemas.microsoft.com/office/drawing/2010/main" xmlns="" w="9525">
+                  <a14:hiddenLine xmlns="" xmlns:a14="http://schemas.microsoft.com/office/drawing/2010/main" w="9525">
                     <a:solidFill>
                       <a:srgbClr val="000000"/>
                     </a:solidFill>
@@ -11286,7 +11299,7 @@
               </a:ln>
               <a:extLst>
                 <a:ext uri="{91240B29-F687-4f45-9708-019B960494DF}">
-                  <a14:hiddenLine xmlns:a14="http://schemas.microsoft.com/office/drawing/2010/main" xmlns="" w="9525">
+                  <a14:hiddenLine xmlns="" xmlns:a14="http://schemas.microsoft.com/office/drawing/2010/main" w="9525">
                     <a:solidFill>
                       <a:srgbClr val="000000"/>
                     </a:solidFill>
@@ -11351,7 +11364,7 @@
               </a:ln>
               <a:extLst>
                 <a:ext uri="{91240B29-F687-4f45-9708-019B960494DF}">
-                  <a14:hiddenLine xmlns:a14="http://schemas.microsoft.com/office/drawing/2010/main" xmlns="" w="9525">
+                  <a14:hiddenLine xmlns="" xmlns:a14="http://schemas.microsoft.com/office/drawing/2010/main" w="9525">
                     <a:solidFill>
                       <a:srgbClr val="000000"/>
                     </a:solidFill>
@@ -11441,7 +11454,7 @@
               </a:ln>
               <a:extLst>
                 <a:ext uri="{91240B29-F687-4f45-9708-019B960494DF}">
-                  <a14:hiddenLine xmlns:a14="http://schemas.microsoft.com/office/drawing/2010/main" xmlns="" w="9525">
+                  <a14:hiddenLine xmlns="" xmlns:a14="http://schemas.microsoft.com/office/drawing/2010/main" w="9525">
                     <a:solidFill>
                       <a:srgbClr val="000000"/>
                     </a:solidFill>
@@ -11509,7 +11522,7 @@
               </a:ln>
               <a:extLst>
                 <a:ext uri="{91240B29-F687-4f45-9708-019B960494DF}">
-                  <a14:hiddenLine xmlns:a14="http://schemas.microsoft.com/office/drawing/2010/main" xmlns="" w="9525">
+                  <a14:hiddenLine xmlns="" xmlns:a14="http://schemas.microsoft.com/office/drawing/2010/main" w="9525">
                     <a:solidFill>
                       <a:srgbClr val="000000"/>
                     </a:solidFill>
@@ -11599,7 +11612,7 @@
               </a:ln>
               <a:extLst>
                 <a:ext uri="{91240B29-F687-4f45-9708-019B960494DF}">
-                  <a14:hiddenLine xmlns:a14="http://schemas.microsoft.com/office/drawing/2010/main" xmlns="" w="9525">
+                  <a14:hiddenLine xmlns="" xmlns:a14="http://schemas.microsoft.com/office/drawing/2010/main" w="9525">
                     <a:solidFill>
                       <a:srgbClr val="000000"/>
                     </a:solidFill>
@@ -11667,7 +11680,7 @@
               </a:ln>
               <a:extLst>
                 <a:ext uri="{91240B29-F687-4f45-9708-019B960494DF}">
-                  <a14:hiddenLine xmlns:a14="http://schemas.microsoft.com/office/drawing/2010/main" xmlns="" w="9525">
+                  <a14:hiddenLine xmlns="" xmlns:a14="http://schemas.microsoft.com/office/drawing/2010/main" w="9525">
                     <a:solidFill>
                       <a:srgbClr val="000000"/>
                     </a:solidFill>
@@ -11757,7 +11770,7 @@
               </a:ln>
               <a:extLst>
                 <a:ext uri="{91240B29-F687-4f45-9708-019B960494DF}">
-                  <a14:hiddenLine xmlns:a14="http://schemas.microsoft.com/office/drawing/2010/main" xmlns="" w="9525">
+                  <a14:hiddenLine xmlns="" xmlns:a14="http://schemas.microsoft.com/office/drawing/2010/main" w="9525">
                     <a:solidFill>
                       <a:srgbClr val="000000"/>
                     </a:solidFill>
@@ -11791,7 +11804,7 @@
               </a:ln>
               <a:extLst>
                 <a:ext uri="{91240B29-F687-4f45-9708-019B960494DF}">
-                  <a14:hiddenLine xmlns:a14="http://schemas.microsoft.com/office/drawing/2010/main" xmlns="" w="9525">
+                  <a14:hiddenLine xmlns="" xmlns:a14="http://schemas.microsoft.com/office/drawing/2010/main" w="9525">
                     <a:solidFill>
                       <a:srgbClr val="000000"/>
                     </a:solidFill>
@@ -12382,7 +12395,7 @@
               <a:t> </a:t>
             </a:r>
             <a:r>
-              <a:rPr lang="es-ES" dirty="0" err="1"/>
+              <a:rPr lang="en-US" dirty="0"/>
               <a:t>memory</a:t>
             </a:r>
             <a:r>
@@ -12390,19 +12403,15 @@
               <a:t> </a:t>
             </a:r>
             <a:r>
-              <a:rPr lang="es-ES" dirty="0" err="1"/>
+              <a:rPr lang="en-US" dirty="0"/>
               <a:t>task</a:t>
             </a:r>
             <a:br>
               <a:rPr lang="es-ES" dirty="0"/>
             </a:br>
             <a:r>
-              <a:rPr lang="es-ES" dirty="0" err="1"/>
-              <a:t>iss</a:t>
-            </a:r>
-            <a:r>
               <a:rPr lang="es-ES" dirty="0"/>
-              <a:t> Proyect	</a:t>
+              <a:t>ISS Proyect	</a:t>
             </a:r>
           </a:p>
         </p:txBody>
@@ -12430,18 +12439,7 @@
           <a:p>
             <a:r>
               <a:rPr lang="es-ES" dirty="0"/>
-              <a:t>Manuel Hernández Nájera-</a:t>
-            </a:r>
-            <a:r>
-              <a:rPr lang="es-ES" dirty="0" err="1"/>
-              <a:t>Alesón</a:t>
-            </a:r>
-            <a:endParaRPr lang="es-ES" dirty="0"/>
-          </a:p>
-          <a:p>
-            <a:r>
-              <a:rPr lang="es-ES" dirty="0"/>
-              <a:t>1</a:t>
+              <a:t>Manuel Hernández Nájera-Alesón</a:t>
             </a:r>
           </a:p>
         </p:txBody>
@@ -12456,6 +12454,549 @@
   <p:clrMapOvr>
     <a:masterClrMapping/>
   </p:clrMapOvr>
+</p:sld>
+</file>
+
+<file path=ppt/slides/slide10.xml><?xml version="1.0" encoding="utf-8"?>
+<p:sld xmlns:a="http://schemas.openxmlformats.org/drawingml/2006/main" xmlns:r="http://schemas.openxmlformats.org/officeDocument/2006/relationships" xmlns:p="http://schemas.openxmlformats.org/presentationml/2006/main">
+  <p:cSld>
+    <p:spTree>
+      <p:nvGrpSpPr>
+        <p:cNvPr id="1" name=""/>
+        <p:cNvGrpSpPr/>
+        <p:nvPr/>
+      </p:nvGrpSpPr>
+      <p:grpSpPr>
+        <a:xfrm>
+          <a:off x="0" y="0"/>
+          <a:ext cx="0" cy="0"/>
+          <a:chOff x="0" y="0"/>
+          <a:chExt cx="0" cy="0"/>
+        </a:xfrm>
+      </p:grpSpPr>
+      <p:sp>
+        <p:nvSpPr>
+          <p:cNvPr id="2" name="Título 1">
+            <a:extLst>
+              <a:ext uri="{FF2B5EF4-FFF2-40B4-BE49-F238E27FC236}">
+                <a16:creationId xmlns:a16="http://schemas.microsoft.com/office/drawing/2014/main" id="{AA2442BB-85DF-43B7-8D8E-B23A708A4B28}"/>
+              </a:ext>
+            </a:extLst>
+          </p:cNvPr>
+          <p:cNvSpPr>
+            <a:spLocks noGrp="1"/>
+          </p:cNvSpPr>
+          <p:nvPr>
+            <p:ph type="title"/>
+          </p:nvPr>
+        </p:nvSpPr>
+        <p:spPr>
+          <a:xfrm>
+            <a:off x="1269610" y="2034277"/>
+            <a:ext cx="9905998" cy="1394723"/>
+          </a:xfrm>
+        </p:spPr>
+        <p:txBody>
+          <a:bodyPr/>
+          <a:lstStyle/>
+          <a:p>
+            <a:pPr algn="ctr"/>
+            <a:r>
+              <a:rPr lang="en-GB" dirty="0"/>
+              <a:t>Thanks for the attention</a:t>
+            </a:r>
+          </a:p>
+        </p:txBody>
+      </p:sp>
+      <p:sp>
+        <p:nvSpPr>
+          <p:cNvPr id="3" name="Título 1">
+            <a:extLst>
+              <a:ext uri="{FF2B5EF4-FFF2-40B4-BE49-F238E27FC236}">
+                <a16:creationId xmlns:a16="http://schemas.microsoft.com/office/drawing/2014/main" id="{E4C5ED43-4C24-4871-A854-8DCA99F86F5C}"/>
+              </a:ext>
+            </a:extLst>
+          </p:cNvPr>
+          <p:cNvSpPr txBox="1">
+            <a:spLocks/>
+          </p:cNvSpPr>
+          <p:nvPr/>
+        </p:nvSpPr>
+        <p:spPr>
+          <a:xfrm>
+            <a:off x="1269610" y="743049"/>
+            <a:ext cx="9905998" cy="1394723"/>
+          </a:xfrm>
+          <a:prstGeom prst="rect">
+            <a:avLst/>
+          </a:prstGeom>
+        </p:spPr>
+        <p:txBody>
+          <a:bodyPr vert="horz" lIns="91440" tIns="45720" rIns="91440" bIns="45720" rtlCol="0" anchor="ctr">
+            <a:normAutofit/>
+          </a:bodyPr>
+          <a:lstStyle>
+            <a:lvl1pPr algn="l" defTabSz="914400" rtl="0" eaLnBrk="1" latinLnBrk="0" hangingPunct="1">
+              <a:lnSpc>
+                <a:spcPct val="90000"/>
+              </a:lnSpc>
+              <a:spcBef>
+                <a:spcPct val="0"/>
+              </a:spcBef>
+              <a:buNone/>
+              <a:defRPr sz="3600" kern="1200" cap="all" baseline="0">
+                <a:solidFill>
+                  <a:schemeClr val="tx1"/>
+                </a:solidFill>
+                <a:latin typeface="+mj-lt"/>
+                <a:ea typeface="+mj-ea"/>
+                <a:cs typeface="+mj-cs"/>
+              </a:defRPr>
+            </a:lvl1pPr>
+          </a:lstStyle>
+          <a:p>
+            <a:pPr algn="ctr"/>
+            <a:r>
+              <a:rPr lang="en-GB" dirty="0"/>
+              <a:t>Questions/Comments?</a:t>
+            </a:r>
+          </a:p>
+        </p:txBody>
+      </p:sp>
+      <p:sp>
+        <p:nvSpPr>
+          <p:cNvPr id="11" name="Rectángulo: esquinas redondeadas 10">
+            <a:extLst>
+              <a:ext uri="{FF2B5EF4-FFF2-40B4-BE49-F238E27FC236}">
+                <a16:creationId xmlns:a16="http://schemas.microsoft.com/office/drawing/2014/main" id="{6AF9A535-A02A-40B4-8928-D06523553C2F}"/>
+              </a:ext>
+            </a:extLst>
+          </p:cNvPr>
+          <p:cNvSpPr/>
+          <p:nvPr/>
+        </p:nvSpPr>
+        <p:spPr>
+          <a:xfrm>
+            <a:off x="2913822" y="3429000"/>
+            <a:ext cx="6480313" cy="2809461"/>
+          </a:xfrm>
+          <a:prstGeom prst="roundRect">
+            <a:avLst/>
+          </a:prstGeom>
+          <a:solidFill>
+            <a:schemeClr val="accent5">
+              <a:alpha val="50000"/>
+            </a:schemeClr>
+          </a:solidFill>
+          <a:ln>
+            <a:noFill/>
+          </a:ln>
+        </p:spPr>
+        <p:style>
+          <a:lnRef idx="0">
+            <a:scrgbClr r="0" g="0" b="0"/>
+          </a:lnRef>
+          <a:fillRef idx="0">
+            <a:scrgbClr r="0" g="0" b="0"/>
+          </a:fillRef>
+          <a:effectRef idx="0">
+            <a:scrgbClr r="0" g="0" b="0"/>
+          </a:effectRef>
+          <a:fontRef idx="minor">
+            <a:schemeClr val="lt1"/>
+          </a:fontRef>
+        </p:style>
+        <p:txBody>
+          <a:bodyPr rtlCol="0" anchor="ctr"/>
+          <a:lstStyle/>
+          <a:p>
+            <a:pPr algn="ctr"/>
+            <a:endParaRPr lang="en-GB"/>
+          </a:p>
+        </p:txBody>
+      </p:sp>
+      <p:sp>
+        <p:nvSpPr>
+          <p:cNvPr id="4" name="Título 1">
+            <a:extLst>
+              <a:ext uri="{FF2B5EF4-FFF2-40B4-BE49-F238E27FC236}">
+                <a16:creationId xmlns:a16="http://schemas.microsoft.com/office/drawing/2014/main" id="{743E43D9-670E-4571-A87E-D84AA23803AF}"/>
+              </a:ext>
+            </a:extLst>
+          </p:cNvPr>
+          <p:cNvSpPr txBox="1">
+            <a:spLocks/>
+          </p:cNvSpPr>
+          <p:nvPr/>
+        </p:nvSpPr>
+        <p:spPr>
+          <a:xfrm>
+            <a:off x="2973457" y="3884440"/>
+            <a:ext cx="6549886" cy="2675386"/>
+          </a:xfrm>
+          <a:prstGeom prst="rect">
+            <a:avLst/>
+          </a:prstGeom>
+        </p:spPr>
+        <p:txBody>
+          <a:bodyPr vert="horz" lIns="91440" tIns="45720" rIns="91440" bIns="45720" rtlCol="0" anchor="ctr">
+            <a:noAutofit/>
+          </a:bodyPr>
+          <a:lstStyle>
+            <a:lvl1pPr algn="l" defTabSz="914400" rtl="0" eaLnBrk="1" latinLnBrk="0" hangingPunct="1">
+              <a:lnSpc>
+                <a:spcPct val="90000"/>
+              </a:lnSpc>
+              <a:spcBef>
+                <a:spcPct val="0"/>
+              </a:spcBef>
+              <a:buNone/>
+              <a:defRPr sz="3600" kern="1200" cap="all" baseline="0">
+                <a:solidFill>
+                  <a:schemeClr val="tx1"/>
+                </a:solidFill>
+                <a:latin typeface="+mj-lt"/>
+                <a:ea typeface="+mj-ea"/>
+                <a:cs typeface="+mj-cs"/>
+              </a:defRPr>
+            </a:lvl1pPr>
+          </a:lstStyle>
+          <a:p>
+            <a:pPr algn="ctr"/>
+            <a:r>
+              <a:rPr lang="es-ES" sz="2000" dirty="0">
+                <a:hlinkClick r:id="rId2"/>
+              </a:rPr>
+              <a:t>Manuel.hna@Gmail.com</a:t>
+            </a:r>
+            <a:r>
+              <a:rPr lang="es-ES" sz="2000" dirty="0"/>
+              <a:t> / </a:t>
+            </a:r>
+            <a:r>
+              <a:rPr lang="es-ES" sz="2000" dirty="0">
+                <a:hlinkClick r:id="rId3"/>
+              </a:rPr>
+              <a:t>manherna@ucm.es</a:t>
+            </a:r>
+            <a:endParaRPr lang="es-ES" sz="2000" dirty="0"/>
+          </a:p>
+          <a:p>
+            <a:pPr algn="ctr"/>
+            <a:endParaRPr lang="es-ES" sz="2000" dirty="0"/>
+          </a:p>
+          <a:p>
+            <a:pPr algn="ctr"/>
+            <a:endParaRPr lang="es-ES" sz="2000" dirty="0"/>
+          </a:p>
+          <a:p>
+            <a:pPr algn="ctr"/>
+            <a:r>
+              <a:rPr lang="es-ES" sz="2000" dirty="0"/>
+              <a:t>https://www.github.com/manherna/ISS</a:t>
+            </a:r>
+            <a:endParaRPr lang="en-GB" sz="2000" dirty="0"/>
+          </a:p>
+        </p:txBody>
+      </p:sp>
+      <p:pic>
+        <p:nvPicPr>
+          <p:cNvPr id="8" name="Imagen 7">
+            <a:extLst>
+              <a:ext uri="{FF2B5EF4-FFF2-40B4-BE49-F238E27FC236}">
+                <a16:creationId xmlns:a16="http://schemas.microsoft.com/office/drawing/2014/main" id="{C73ACA97-D610-4B85-AE4B-D8DB2A6611F9}"/>
+              </a:ext>
+            </a:extLst>
+          </p:cNvPr>
+          <p:cNvPicPr>
+            <a:picLocks noChangeAspect="1"/>
+          </p:cNvPicPr>
+          <p:nvPr/>
+        </p:nvPicPr>
+        <p:blipFill>
+          <a:blip r:embed="rId4"/>
+          <a:stretch>
+            <a:fillRect/>
+          </a:stretch>
+        </p:blipFill>
+        <p:spPr>
+          <a:xfrm>
+            <a:off x="6434030" y="3606537"/>
+            <a:ext cx="2609924" cy="967412"/>
+          </a:xfrm>
+          <a:prstGeom prst="rect">
+            <a:avLst/>
+          </a:prstGeom>
+        </p:spPr>
+      </p:pic>
+      <p:pic>
+        <p:nvPicPr>
+          <p:cNvPr id="10" name="Imagen 9">
+            <a:extLst>
+              <a:ext uri="{FF2B5EF4-FFF2-40B4-BE49-F238E27FC236}">
+                <a16:creationId xmlns:a16="http://schemas.microsoft.com/office/drawing/2014/main" id="{CF083FE1-95C9-43E9-AC1D-0F24E6BB6C5A}"/>
+              </a:ext>
+            </a:extLst>
+          </p:cNvPr>
+          <p:cNvPicPr>
+            <a:picLocks noChangeAspect="1"/>
+          </p:cNvPicPr>
+          <p:nvPr/>
+        </p:nvPicPr>
+        <p:blipFill>
+          <a:blip r:embed="rId5"/>
+          <a:stretch>
+            <a:fillRect/>
+          </a:stretch>
+        </p:blipFill>
+        <p:spPr>
+          <a:xfrm>
+            <a:off x="3640477" y="3532495"/>
+            <a:ext cx="1115497" cy="1115497"/>
+          </a:xfrm>
+          <a:prstGeom prst="rect">
+            <a:avLst/>
+          </a:prstGeom>
+        </p:spPr>
+      </p:pic>
+    </p:spTree>
+    <p:extLst>
+      <p:ext uri="{BB962C8B-B14F-4D97-AF65-F5344CB8AC3E}">
+        <p14:creationId xmlns:p14="http://schemas.microsoft.com/office/powerpoint/2010/main" val="3088837555"/>
+      </p:ext>
+    </p:extLst>
+  </p:cSld>
+  <p:clrMapOvr>
+    <a:masterClrMapping/>
+  </p:clrMapOvr>
+  <p:timing>
+    <p:tnLst>
+      <p:par>
+        <p:cTn id="1" dur="indefinite" restart="never" nodeType="tmRoot">
+          <p:childTnLst>
+            <p:seq concurrent="1" nextAc="seek">
+              <p:cTn id="2" dur="indefinite" nodeType="mainSeq">
+                <p:childTnLst>
+                  <p:par>
+                    <p:cTn id="3" fill="hold">
+                      <p:stCondLst>
+                        <p:cond delay="indefinite"/>
+                      </p:stCondLst>
+                      <p:childTnLst>
+                        <p:par>
+                          <p:cTn id="4" fill="hold">
+                            <p:stCondLst>
+                              <p:cond delay="0"/>
+                            </p:stCondLst>
+                            <p:childTnLst>
+                              <p:par>
+                                <p:cTn id="5" presetID="22" presetClass="entr" presetSubtype="4" fill="hold" grpId="0" nodeType="clickEffect">
+                                  <p:stCondLst>
+                                    <p:cond delay="0"/>
+                                  </p:stCondLst>
+                                  <p:childTnLst>
+                                    <p:set>
+                                      <p:cBhvr>
+                                        <p:cTn id="6" dur="1" fill="hold">
+                                          <p:stCondLst>
+                                            <p:cond delay="0"/>
+                                          </p:stCondLst>
+                                        </p:cTn>
+                                        <p:tgtEl>
+                                          <p:spTgt spid="2"/>
+                                        </p:tgtEl>
+                                        <p:attrNameLst>
+                                          <p:attrName>style.visibility</p:attrName>
+                                        </p:attrNameLst>
+                                      </p:cBhvr>
+                                      <p:to>
+                                        <p:strVal val="visible"/>
+                                      </p:to>
+                                    </p:set>
+                                    <p:animEffect transition="in" filter="wipe(down)">
+                                      <p:cBhvr>
+                                        <p:cTn id="7" dur="500"/>
+                                        <p:tgtEl>
+                                          <p:spTgt spid="2"/>
+                                        </p:tgtEl>
+                                      </p:cBhvr>
+                                    </p:animEffect>
+                                  </p:childTnLst>
+                                </p:cTn>
+                              </p:par>
+                              <p:par>
+                                <p:cTn id="8" presetID="22" presetClass="entr" presetSubtype="4" fill="hold" nodeType="withEffect">
+                                  <p:stCondLst>
+                                    <p:cond delay="0"/>
+                                  </p:stCondLst>
+                                  <p:childTnLst>
+                                    <p:set>
+                                      <p:cBhvr>
+                                        <p:cTn id="9" dur="1" fill="hold">
+                                          <p:stCondLst>
+                                            <p:cond delay="0"/>
+                                          </p:stCondLst>
+                                        </p:cTn>
+                                        <p:tgtEl>
+                                          <p:spTgt spid="10"/>
+                                        </p:tgtEl>
+                                        <p:attrNameLst>
+                                          <p:attrName>style.visibility</p:attrName>
+                                        </p:attrNameLst>
+                                      </p:cBhvr>
+                                      <p:to>
+                                        <p:strVal val="visible"/>
+                                      </p:to>
+                                    </p:set>
+                                    <p:animEffect transition="in" filter="wipe(down)">
+                                      <p:cBhvr>
+                                        <p:cTn id="10" dur="500"/>
+                                        <p:tgtEl>
+                                          <p:spTgt spid="10"/>
+                                        </p:tgtEl>
+                                      </p:cBhvr>
+                                    </p:animEffect>
+                                  </p:childTnLst>
+                                </p:cTn>
+                              </p:par>
+                              <p:par>
+                                <p:cTn id="11" presetID="22" presetClass="entr" presetSubtype="4" fill="hold" nodeType="withEffect">
+                                  <p:stCondLst>
+                                    <p:cond delay="0"/>
+                                  </p:stCondLst>
+                                  <p:childTnLst>
+                                    <p:set>
+                                      <p:cBhvr>
+                                        <p:cTn id="12" dur="1" fill="hold">
+                                          <p:stCondLst>
+                                            <p:cond delay="0"/>
+                                          </p:stCondLst>
+                                        </p:cTn>
+                                        <p:tgtEl>
+                                          <p:spTgt spid="8"/>
+                                        </p:tgtEl>
+                                        <p:attrNameLst>
+                                          <p:attrName>style.visibility</p:attrName>
+                                        </p:attrNameLst>
+                                      </p:cBhvr>
+                                      <p:to>
+                                        <p:strVal val="visible"/>
+                                      </p:to>
+                                    </p:set>
+                                    <p:animEffect transition="in" filter="wipe(down)">
+                                      <p:cBhvr>
+                                        <p:cTn id="13" dur="500"/>
+                                        <p:tgtEl>
+                                          <p:spTgt spid="8"/>
+                                        </p:tgtEl>
+                                      </p:cBhvr>
+                                    </p:animEffect>
+                                  </p:childTnLst>
+                                </p:cTn>
+                              </p:par>
+                              <p:par>
+                                <p:cTn id="14" presetID="22" presetClass="entr" presetSubtype="4" fill="hold" grpId="0" nodeType="withEffect">
+                                  <p:stCondLst>
+                                    <p:cond delay="0"/>
+                                  </p:stCondLst>
+                                  <p:childTnLst>
+                                    <p:set>
+                                      <p:cBhvr>
+                                        <p:cTn id="15" dur="1" fill="hold">
+                                          <p:stCondLst>
+                                            <p:cond delay="0"/>
+                                          </p:stCondLst>
+                                        </p:cTn>
+                                        <p:tgtEl>
+                                          <p:spTgt spid="4"/>
+                                        </p:tgtEl>
+                                        <p:attrNameLst>
+                                          <p:attrName>style.visibility</p:attrName>
+                                        </p:attrNameLst>
+                                      </p:cBhvr>
+                                      <p:to>
+                                        <p:strVal val="visible"/>
+                                      </p:to>
+                                    </p:set>
+                                    <p:animEffect transition="in" filter="wipe(down)">
+                                      <p:cBhvr>
+                                        <p:cTn id="16" dur="500"/>
+                                        <p:tgtEl>
+                                          <p:spTgt spid="4"/>
+                                        </p:tgtEl>
+                                      </p:cBhvr>
+                                    </p:animEffect>
+                                  </p:childTnLst>
+                                </p:cTn>
+                              </p:par>
+                              <p:par>
+                                <p:cTn id="17" presetID="16" presetClass="entr" presetSubtype="21" fill="hold" grpId="0" nodeType="withEffect">
+                                  <p:stCondLst>
+                                    <p:cond delay="0"/>
+                                  </p:stCondLst>
+                                  <p:childTnLst>
+                                    <p:set>
+                                      <p:cBhvr>
+                                        <p:cTn id="18" dur="1" fill="hold">
+                                          <p:stCondLst>
+                                            <p:cond delay="0"/>
+                                          </p:stCondLst>
+                                        </p:cTn>
+                                        <p:tgtEl>
+                                          <p:spTgt spid="11"/>
+                                        </p:tgtEl>
+                                        <p:attrNameLst>
+                                          <p:attrName>style.visibility</p:attrName>
+                                        </p:attrNameLst>
+                                      </p:cBhvr>
+                                      <p:to>
+                                        <p:strVal val="visible"/>
+                                      </p:to>
+                                    </p:set>
+                                    <p:animEffect transition="in" filter="barn(inVertical)">
+                                      <p:cBhvr>
+                                        <p:cTn id="19" dur="500"/>
+                                        <p:tgtEl>
+                                          <p:spTgt spid="11"/>
+                                        </p:tgtEl>
+                                      </p:cBhvr>
+                                    </p:animEffect>
+                                  </p:childTnLst>
+                                </p:cTn>
+                              </p:par>
+                            </p:childTnLst>
+                          </p:cTn>
+                        </p:par>
+                      </p:childTnLst>
+                    </p:cTn>
+                  </p:par>
+                </p:childTnLst>
+              </p:cTn>
+              <p:prevCondLst>
+                <p:cond evt="onPrev" delay="0">
+                  <p:tgtEl>
+                    <p:sldTgt/>
+                  </p:tgtEl>
+                </p:cond>
+              </p:prevCondLst>
+              <p:nextCondLst>
+                <p:cond evt="onNext" delay="0">
+                  <p:tgtEl>
+                    <p:sldTgt/>
+                  </p:tgtEl>
+                </p:cond>
+              </p:nextCondLst>
+            </p:seq>
+          </p:childTnLst>
+        </p:cTn>
+      </p:par>
+    </p:tnLst>
+    <p:bldLst>
+      <p:bldP spid="2" grpId="0"/>
+      <p:bldP spid="11" grpId="0" animBg="1"/>
+      <p:bldP spid="4" grpId="0"/>
+    </p:bldLst>
+  </p:timing>
 </p:sld>
 </file>
 
@@ -12578,6 +13119,9 @@
                     <p:cTn id="3" fill="hold">
                       <p:stCondLst>
                         <p:cond delay="indefinite"/>
+                        <p:cond evt="onBegin" delay="0">
+                          <p:tn val="2"/>
+                        </p:cond>
                       </p:stCondLst>
                       <p:childTnLst>
                         <p:par>
@@ -12587,7 +13131,7 @@
                             </p:stCondLst>
                             <p:childTnLst>
                               <p:par>
-                                <p:cTn id="5" presetID="42" presetClass="entr" presetSubtype="0" fill="hold" grpId="0" nodeType="clickEffect">
+                                <p:cTn id="5" presetID="42" presetClass="entr" presetSubtype="0" fill="hold" grpId="0" nodeType="withEffect">
                                   <p:stCondLst>
                                     <p:cond delay="0"/>
                                   </p:stCondLst>
@@ -12670,30 +13214,21 @@
                             </p:childTnLst>
                           </p:cTn>
                         </p:par>
-                      </p:childTnLst>
-                    </p:cTn>
-                  </p:par>
-                  <p:par>
-                    <p:cTn id="10" fill="hold">
-                      <p:stCondLst>
-                        <p:cond delay="indefinite"/>
-                      </p:stCondLst>
-                      <p:childTnLst>
                         <p:par>
-                          <p:cTn id="11" fill="hold">
+                          <p:cTn id="10" fill="hold">
                             <p:stCondLst>
-                              <p:cond delay="0"/>
+                              <p:cond delay="1000"/>
                             </p:stCondLst>
                             <p:childTnLst>
                               <p:par>
-                                <p:cTn id="12" presetID="42" presetClass="entr" presetSubtype="0" fill="hold" grpId="0" nodeType="clickEffect">
+                                <p:cTn id="11" presetID="42" presetClass="entr" presetSubtype="0" fill="hold" grpId="0" nodeType="afterEffect">
                                   <p:stCondLst>
                                     <p:cond delay="0"/>
                                   </p:stCondLst>
                                   <p:childTnLst>
                                     <p:set>
                                       <p:cBhvr>
-                                        <p:cTn id="13" dur="1" fill="hold">
+                                        <p:cTn id="12" dur="1" fill="hold">
                                           <p:stCondLst>
                                             <p:cond delay="0"/>
                                           </p:stCondLst>
@@ -12715,7 +13250,7 @@
                                     </p:set>
                                     <p:animEffect transition="in" filter="fade">
                                       <p:cBhvr>
-                                        <p:cTn id="14" dur="1000"/>
+                                        <p:cTn id="13" dur="1000"/>
                                         <p:tgtEl>
                                           <p:spTgt spid="7">
                                             <p:txEl>
@@ -12727,7 +13262,7 @@
                                     </p:animEffect>
                                     <p:anim calcmode="lin" valueType="num">
                                       <p:cBhvr>
-                                        <p:cTn id="15" dur="1000" fill="hold"/>
+                                        <p:cTn id="14" dur="1000" fill="hold"/>
                                         <p:tgtEl>
                                           <p:spTgt spid="7">
                                             <p:txEl>
@@ -12754,7 +13289,7 @@
                                     </p:anim>
                                     <p:anim calcmode="lin" valueType="num">
                                       <p:cBhvr>
-                                        <p:cTn id="16" dur="1000" fill="hold"/>
+                                        <p:cTn id="15" dur="1000" fill="hold"/>
                                         <p:tgtEl>
                                           <p:spTgt spid="7">
                                             <p:txEl>
@@ -12785,30 +13320,21 @@
                             </p:childTnLst>
                           </p:cTn>
                         </p:par>
-                      </p:childTnLst>
-                    </p:cTn>
-                  </p:par>
-                  <p:par>
-                    <p:cTn id="17" fill="hold">
-                      <p:stCondLst>
-                        <p:cond delay="indefinite"/>
-                      </p:stCondLst>
-                      <p:childTnLst>
                         <p:par>
-                          <p:cTn id="18" fill="hold">
+                          <p:cTn id="16" fill="hold">
                             <p:stCondLst>
-                              <p:cond delay="0"/>
+                              <p:cond delay="2000"/>
                             </p:stCondLst>
                             <p:childTnLst>
                               <p:par>
-                                <p:cTn id="19" presetID="42" presetClass="entr" presetSubtype="0" fill="hold" grpId="0" nodeType="clickEffect">
+                                <p:cTn id="17" presetID="42" presetClass="entr" presetSubtype="0" fill="hold" grpId="0" nodeType="afterEffect">
                                   <p:stCondLst>
                                     <p:cond delay="0"/>
                                   </p:stCondLst>
                                   <p:childTnLst>
                                     <p:set>
                                       <p:cBhvr>
-                                        <p:cTn id="20" dur="1" fill="hold">
+                                        <p:cTn id="18" dur="1" fill="hold">
                                           <p:stCondLst>
                                             <p:cond delay="0"/>
                                           </p:stCondLst>
@@ -12830,7 +13356,7 @@
                                     </p:set>
                                     <p:animEffect transition="in" filter="fade">
                                       <p:cBhvr>
-                                        <p:cTn id="21" dur="1000"/>
+                                        <p:cTn id="19" dur="1000"/>
                                         <p:tgtEl>
                                           <p:spTgt spid="7">
                                             <p:txEl>
@@ -12842,7 +13368,7 @@
                                     </p:animEffect>
                                     <p:anim calcmode="lin" valueType="num">
                                       <p:cBhvr>
-                                        <p:cTn id="22" dur="1000" fill="hold"/>
+                                        <p:cTn id="20" dur="1000" fill="hold"/>
                                         <p:tgtEl>
                                           <p:spTgt spid="7">
                                             <p:txEl>
@@ -12869,7 +13395,7 @@
                                     </p:anim>
                                     <p:anim calcmode="lin" valueType="num">
                                       <p:cBhvr>
-                                        <p:cTn id="23" dur="1000" fill="hold"/>
+                                        <p:cTn id="21" dur="1000" fill="hold"/>
                                         <p:tgtEl>
                                           <p:spTgt spid="7">
                                             <p:txEl>
@@ -12900,30 +13426,21 @@
                             </p:childTnLst>
                           </p:cTn>
                         </p:par>
-                      </p:childTnLst>
-                    </p:cTn>
-                  </p:par>
-                  <p:par>
-                    <p:cTn id="24" fill="hold">
-                      <p:stCondLst>
-                        <p:cond delay="indefinite"/>
-                      </p:stCondLst>
-                      <p:childTnLst>
                         <p:par>
-                          <p:cTn id="25" fill="hold">
+                          <p:cTn id="22" fill="hold">
                             <p:stCondLst>
-                              <p:cond delay="0"/>
+                              <p:cond delay="3000"/>
                             </p:stCondLst>
                             <p:childTnLst>
                               <p:par>
-                                <p:cTn id="26" presetID="42" presetClass="entr" presetSubtype="0" fill="hold" grpId="0" nodeType="clickEffect">
+                                <p:cTn id="23" presetID="42" presetClass="entr" presetSubtype="0" fill="hold" grpId="0" nodeType="afterEffect">
                                   <p:stCondLst>
                                     <p:cond delay="0"/>
                                   </p:stCondLst>
                                   <p:childTnLst>
                                     <p:set>
                                       <p:cBhvr>
-                                        <p:cTn id="27" dur="1" fill="hold">
+                                        <p:cTn id="24" dur="1" fill="hold">
                                           <p:stCondLst>
                                             <p:cond delay="0"/>
                                           </p:stCondLst>
@@ -12945,7 +13462,7 @@
                                     </p:set>
                                     <p:animEffect transition="in" filter="fade">
                                       <p:cBhvr>
-                                        <p:cTn id="28" dur="1000"/>
+                                        <p:cTn id="25" dur="1000"/>
                                         <p:tgtEl>
                                           <p:spTgt spid="7">
                                             <p:txEl>
@@ -12957,7 +13474,7 @@
                                     </p:animEffect>
                                     <p:anim calcmode="lin" valueType="num">
                                       <p:cBhvr>
-                                        <p:cTn id="29" dur="1000" fill="hold"/>
+                                        <p:cTn id="26" dur="1000" fill="hold"/>
                                         <p:tgtEl>
                                           <p:spTgt spid="7">
                                             <p:txEl>
@@ -12984,7 +13501,7 @@
                                     </p:anim>
                                     <p:anim calcmode="lin" valueType="num">
                                       <p:cBhvr>
-                                        <p:cTn id="30" dur="1000" fill="hold"/>
+                                        <p:cTn id="27" dur="1000" fill="hold"/>
                                         <p:tgtEl>
                                           <p:spTgt spid="7">
                                             <p:txEl>
@@ -13012,15 +13529,24 @@
                                   </p:childTnLst>
                                 </p:cTn>
                               </p:par>
+                            </p:childTnLst>
+                          </p:cTn>
+                        </p:par>
+                        <p:par>
+                          <p:cTn id="28" fill="hold">
+                            <p:stCondLst>
+                              <p:cond delay="4000"/>
+                            </p:stCondLst>
+                            <p:childTnLst>
                               <p:par>
-                                <p:cTn id="31" presetID="42" presetClass="entr" presetSubtype="0" fill="hold" grpId="0" nodeType="withEffect">
+                                <p:cTn id="29" presetID="42" presetClass="entr" presetSubtype="0" fill="hold" grpId="0" nodeType="afterEffect">
                                   <p:stCondLst>
                                     <p:cond delay="0"/>
                                   </p:stCondLst>
                                   <p:childTnLst>
                                     <p:set>
                                       <p:cBhvr>
-                                        <p:cTn id="32" dur="1" fill="hold">
+                                        <p:cTn id="30" dur="1" fill="hold">
                                           <p:stCondLst>
                                             <p:cond delay="0"/>
                                           </p:stCondLst>
@@ -13042,7 +13568,7 @@
                                     </p:set>
                                     <p:animEffect transition="in" filter="fade">
                                       <p:cBhvr>
-                                        <p:cTn id="33" dur="1000"/>
+                                        <p:cTn id="31" dur="1000"/>
                                         <p:tgtEl>
                                           <p:spTgt spid="7">
                                             <p:txEl>
@@ -13054,7 +13580,7 @@
                                     </p:animEffect>
                                     <p:anim calcmode="lin" valueType="num">
                                       <p:cBhvr>
-                                        <p:cTn id="34" dur="1000" fill="hold"/>
+                                        <p:cTn id="32" dur="1000" fill="hold"/>
                                         <p:tgtEl>
                                           <p:spTgt spid="7">
                                             <p:txEl>
@@ -13081,7 +13607,7 @@
                                     </p:anim>
                                     <p:anim calcmode="lin" valueType="num">
                                       <p:cBhvr>
-                                        <p:cTn id="35" dur="1000" fill="hold"/>
+                                        <p:cTn id="33" dur="1000" fill="hold"/>
                                         <p:tgtEl>
                                           <p:spTgt spid="7">
                                             <p:txEl>
@@ -13138,7 +13664,7 @@
     </p:tnLst>
     <p:bldLst>
       <p:bldP spid="4" grpId="0"/>
-      <p:bldP spid="7" grpId="0" build="p"/>
+      <p:bldP spid="7" grpId="0" uiExpand="1" build="p"/>
     </p:bldLst>
   </p:timing>
 </p:sld>
@@ -13177,14 +13703,19 @@
             <p:ph type="title"/>
           </p:nvPr>
         </p:nvSpPr>
-        <p:spPr/>
+        <p:spPr>
+          <a:xfrm>
+            <a:off x="1141413" y="618518"/>
+            <a:ext cx="9905998" cy="1478570"/>
+          </a:xfrm>
+        </p:spPr>
         <p:txBody>
           <a:bodyPr/>
           <a:lstStyle/>
           <a:p>
             <a:r>
               <a:rPr lang="en-GB" dirty="0"/>
-              <a:t>Unity approach</a:t>
+              <a:t>Unity/ C# approach</a:t>
             </a:r>
           </a:p>
         </p:txBody>
@@ -13207,12 +13738,14 @@
         </p:nvSpPr>
         <p:spPr>
           <a:xfrm>
-            <a:off x="5359791" y="2249487"/>
-            <a:ext cx="5687619" cy="3541714"/>
+            <a:off x="5465524" y="2129714"/>
+            <a:ext cx="5687619" cy="2216496"/>
           </a:xfrm>
         </p:spPr>
         <p:txBody>
-          <a:bodyPr/>
+          <a:bodyPr>
+            <a:normAutofit lnSpcReduction="10000"/>
+          </a:bodyPr>
           <a:lstStyle/>
           <a:p>
             <a:r>
@@ -13270,6 +13803,256 @@
           </a:prstGeom>
         </p:spPr>
       </p:pic>
+      <p:pic>
+        <p:nvPicPr>
+          <p:cNvPr id="13" name="Imagen 12">
+            <a:extLst>
+              <a:ext uri="{FF2B5EF4-FFF2-40B4-BE49-F238E27FC236}">
+                <a16:creationId xmlns:a16="http://schemas.microsoft.com/office/drawing/2014/main" id="{3579C3AB-3B68-4125-A64E-FC63878117F8}"/>
+              </a:ext>
+            </a:extLst>
+          </p:cNvPr>
+          <p:cNvPicPr>
+            <a:picLocks noChangeAspect="1"/>
+          </p:cNvPicPr>
+          <p:nvPr/>
+        </p:nvPicPr>
+        <p:blipFill>
+          <a:blip r:embed="rId3"/>
+          <a:stretch>
+            <a:fillRect/>
+          </a:stretch>
+        </p:blipFill>
+        <p:spPr>
+          <a:xfrm>
+            <a:off x="1280160" y="3648049"/>
+            <a:ext cx="3541714" cy="3541714"/>
+          </a:xfrm>
+          <a:prstGeom prst="rect">
+            <a:avLst/>
+          </a:prstGeom>
+        </p:spPr>
+      </p:pic>
+      <p:sp>
+        <p:nvSpPr>
+          <p:cNvPr id="16" name="Marcador de contenido 6">
+            <a:extLst>
+              <a:ext uri="{FF2B5EF4-FFF2-40B4-BE49-F238E27FC236}">
+                <a16:creationId xmlns:a16="http://schemas.microsoft.com/office/drawing/2014/main" id="{6672E59A-3881-4F27-AC0F-9C6AE9B0C499}"/>
+              </a:ext>
+            </a:extLst>
+          </p:cNvPr>
+          <p:cNvSpPr txBox="1">
+            <a:spLocks/>
+          </p:cNvSpPr>
+          <p:nvPr/>
+        </p:nvSpPr>
+        <p:spPr>
+          <a:xfrm>
+            <a:off x="5465524" y="4505739"/>
+            <a:ext cx="5687619" cy="1718237"/>
+          </a:xfrm>
+          <a:prstGeom prst="rect">
+            <a:avLst/>
+          </a:prstGeom>
+        </p:spPr>
+        <p:txBody>
+          <a:bodyPr vert="horz" lIns="91440" tIns="45720" rIns="91440" bIns="45720" rtlCol="0">
+            <a:normAutofit/>
+          </a:bodyPr>
+          <a:lstStyle>
+            <a:lvl1pPr marL="228600" indent="-228600" algn="l" defTabSz="914400" rtl="0" eaLnBrk="1" latinLnBrk="0" hangingPunct="1">
+              <a:lnSpc>
+                <a:spcPct val="120000"/>
+              </a:lnSpc>
+              <a:spcBef>
+                <a:spcPts val="1000"/>
+              </a:spcBef>
+              <a:buSzPct val="125000"/>
+              <a:buFont typeface="Arial" panose="020B0604020202020204" pitchFamily="34" charset="0"/>
+              <a:buChar char="•"/>
+              <a:defRPr sz="2400" kern="1200">
+                <a:solidFill>
+                  <a:schemeClr val="tx1"/>
+                </a:solidFill>
+                <a:latin typeface="+mn-lt"/>
+                <a:ea typeface="+mn-ea"/>
+                <a:cs typeface="+mn-cs"/>
+              </a:defRPr>
+            </a:lvl1pPr>
+            <a:lvl2pPr marL="685800" indent="-228600" algn="l" defTabSz="914400" rtl="0" eaLnBrk="1" latinLnBrk="0" hangingPunct="1">
+              <a:lnSpc>
+                <a:spcPct val="120000"/>
+              </a:lnSpc>
+              <a:spcBef>
+                <a:spcPts val="500"/>
+              </a:spcBef>
+              <a:buSzPct val="125000"/>
+              <a:buFont typeface="Arial" panose="020B0604020202020204" pitchFamily="34" charset="0"/>
+              <a:buChar char="•"/>
+              <a:defRPr sz="2000" kern="1200">
+                <a:solidFill>
+                  <a:schemeClr val="tx1"/>
+                </a:solidFill>
+                <a:latin typeface="+mn-lt"/>
+                <a:ea typeface="+mn-ea"/>
+                <a:cs typeface="+mn-cs"/>
+              </a:defRPr>
+            </a:lvl2pPr>
+            <a:lvl3pPr marL="1143000" indent="-228600" algn="l" defTabSz="914400" rtl="0" eaLnBrk="1" latinLnBrk="0" hangingPunct="1">
+              <a:lnSpc>
+                <a:spcPct val="120000"/>
+              </a:lnSpc>
+              <a:spcBef>
+                <a:spcPts val="500"/>
+              </a:spcBef>
+              <a:buSzPct val="125000"/>
+              <a:buFont typeface="Arial" panose="020B0604020202020204" pitchFamily="34" charset="0"/>
+              <a:buChar char="•"/>
+              <a:defRPr sz="1800" kern="1200">
+                <a:solidFill>
+                  <a:schemeClr val="tx1"/>
+                </a:solidFill>
+                <a:latin typeface="+mn-lt"/>
+                <a:ea typeface="+mn-ea"/>
+                <a:cs typeface="+mn-cs"/>
+              </a:defRPr>
+            </a:lvl3pPr>
+            <a:lvl4pPr marL="1600200" indent="-228600" algn="l" defTabSz="914400" rtl="0" eaLnBrk="1" latinLnBrk="0" hangingPunct="1">
+              <a:lnSpc>
+                <a:spcPct val="120000"/>
+              </a:lnSpc>
+              <a:spcBef>
+                <a:spcPts val="500"/>
+              </a:spcBef>
+              <a:buSzPct val="125000"/>
+              <a:buFont typeface="Arial" panose="020B0604020202020204" pitchFamily="34" charset="0"/>
+              <a:buChar char="•"/>
+              <a:defRPr sz="1600" kern="1200">
+                <a:solidFill>
+                  <a:schemeClr val="tx1"/>
+                </a:solidFill>
+                <a:latin typeface="+mn-lt"/>
+                <a:ea typeface="+mn-ea"/>
+                <a:cs typeface="+mn-cs"/>
+              </a:defRPr>
+            </a:lvl4pPr>
+            <a:lvl5pPr marL="2057400" indent="-228600" algn="l" defTabSz="914400" rtl="0" eaLnBrk="1" latinLnBrk="0" hangingPunct="1">
+              <a:lnSpc>
+                <a:spcPct val="120000"/>
+              </a:lnSpc>
+              <a:spcBef>
+                <a:spcPts val="500"/>
+              </a:spcBef>
+              <a:buSzPct val="125000"/>
+              <a:buFont typeface="Arial" panose="020B0604020202020204" pitchFamily="34" charset="0"/>
+              <a:buChar char="•"/>
+              <a:defRPr sz="1600" kern="1200">
+                <a:solidFill>
+                  <a:schemeClr val="tx1"/>
+                </a:solidFill>
+                <a:latin typeface="+mn-lt"/>
+                <a:ea typeface="+mn-ea"/>
+                <a:cs typeface="+mn-cs"/>
+              </a:defRPr>
+            </a:lvl5pPr>
+            <a:lvl6pPr marL="2514600" indent="-228600" algn="l" defTabSz="914400" rtl="0" eaLnBrk="1" latinLnBrk="0" hangingPunct="1">
+              <a:lnSpc>
+                <a:spcPct val="120000"/>
+              </a:lnSpc>
+              <a:spcBef>
+                <a:spcPts val="500"/>
+              </a:spcBef>
+              <a:buSzPct val="125000"/>
+              <a:buFont typeface="Arial" panose="020B0604020202020204" pitchFamily="34" charset="0"/>
+              <a:buChar char="•"/>
+              <a:defRPr sz="1400" kern="1200">
+                <a:solidFill>
+                  <a:schemeClr val="tx1"/>
+                </a:solidFill>
+                <a:latin typeface="+mn-lt"/>
+                <a:ea typeface="+mn-ea"/>
+                <a:cs typeface="+mn-cs"/>
+              </a:defRPr>
+            </a:lvl6pPr>
+            <a:lvl7pPr marL="2971800" indent="-228600" algn="l" defTabSz="914400" rtl="0" eaLnBrk="1" latinLnBrk="0" hangingPunct="1">
+              <a:lnSpc>
+                <a:spcPct val="120000"/>
+              </a:lnSpc>
+              <a:spcBef>
+                <a:spcPts val="500"/>
+              </a:spcBef>
+              <a:buSzPct val="125000"/>
+              <a:buFont typeface="Arial" panose="020B0604020202020204" pitchFamily="34" charset="0"/>
+              <a:buChar char="•"/>
+              <a:defRPr sz="1400" kern="1200">
+                <a:solidFill>
+                  <a:schemeClr val="tx1"/>
+                </a:solidFill>
+                <a:latin typeface="+mn-lt"/>
+                <a:ea typeface="+mn-ea"/>
+                <a:cs typeface="+mn-cs"/>
+              </a:defRPr>
+            </a:lvl7pPr>
+            <a:lvl8pPr marL="3429000" indent="-228600" algn="l" defTabSz="914400" rtl="0" eaLnBrk="1" latinLnBrk="0" hangingPunct="1">
+              <a:lnSpc>
+                <a:spcPct val="120000"/>
+              </a:lnSpc>
+              <a:spcBef>
+                <a:spcPts val="500"/>
+              </a:spcBef>
+              <a:buSzPct val="125000"/>
+              <a:buFont typeface="Arial" panose="020B0604020202020204" pitchFamily="34" charset="0"/>
+              <a:buChar char="•"/>
+              <a:defRPr sz="1400" kern="1200">
+                <a:solidFill>
+                  <a:schemeClr val="tx1"/>
+                </a:solidFill>
+                <a:latin typeface="+mn-lt"/>
+                <a:ea typeface="+mn-ea"/>
+                <a:cs typeface="+mn-cs"/>
+              </a:defRPr>
+            </a:lvl8pPr>
+            <a:lvl9pPr marL="3886200" indent="-228600" algn="l" defTabSz="914400" rtl="0" eaLnBrk="1" latinLnBrk="0" hangingPunct="1">
+              <a:lnSpc>
+                <a:spcPct val="120000"/>
+              </a:lnSpc>
+              <a:spcBef>
+                <a:spcPts val="500"/>
+              </a:spcBef>
+              <a:buSzPct val="125000"/>
+              <a:buFont typeface="Arial" panose="020B0604020202020204" pitchFamily="34" charset="0"/>
+              <a:buChar char="•"/>
+              <a:defRPr sz="1400" kern="1200">
+                <a:solidFill>
+                  <a:schemeClr val="tx1"/>
+                </a:solidFill>
+                <a:latin typeface="+mn-lt"/>
+                <a:ea typeface="+mn-ea"/>
+                <a:cs typeface="+mn-cs"/>
+              </a:defRPr>
+            </a:lvl9pPr>
+          </a:lstStyle>
+          <a:p>
+            <a:r>
+              <a:rPr lang="en-GB" dirty="0"/>
+              <a:t> Object Oriented</a:t>
+            </a:r>
+          </a:p>
+          <a:p>
+            <a:r>
+              <a:rPr lang="en-GB" dirty="0"/>
+              <a:t>.NET </a:t>
+            </a:r>
+          </a:p>
+          <a:p>
+            <a:r>
+              <a:rPr lang="en-GB" dirty="0"/>
+              <a:t> Previous Experience</a:t>
+            </a:r>
+          </a:p>
+        </p:txBody>
+      </p:sp>
     </p:spTree>
     <p:extLst>
       <p:ext uri="{BB962C8B-B14F-4D97-AF65-F5344CB8AC3E}">
@@ -13327,12 +14110,8 @@
           <a:lstStyle/>
           <a:p>
             <a:r>
-              <a:rPr lang="en-GB" dirty="0" err="1"/>
-              <a:t>Proyect</a:t>
-            </a:r>
-            <a:r>
               <a:rPr lang="en-GB" dirty="0"/>
-              <a:t> overview</a:t>
+              <a:t>Project overview</a:t>
             </a:r>
           </a:p>
         </p:txBody>
@@ -13378,13 +14157,8 @@
           <a:p>
             <a:r>
               <a:rPr lang="en-GB" sz="4000" dirty="0"/>
-              <a:t>Port </a:t>
+              <a:t>Port Communication</a:t>
             </a:r>
-            <a:r>
-              <a:rPr lang="en-GB" sz="4000" dirty="0" err="1"/>
-              <a:t>Comunication</a:t>
-            </a:r>
-            <a:endParaRPr lang="en-GB" sz="4000" dirty="0"/>
           </a:p>
           <a:p>
             <a:endParaRPr lang="en-GB" dirty="0"/>
@@ -13449,10 +14223,9 @@
           <a:lstStyle/>
           <a:p>
             <a:r>
-              <a:rPr lang="en-GB"/>
+              <a:rPr lang="en-GB" dirty="0"/>
               <a:t>Calm/Rest scene</a:t>
             </a:r>
-            <a:endParaRPr lang="en-GB" dirty="0"/>
           </a:p>
         </p:txBody>
       </p:sp>
@@ -13681,6 +14454,797 @@
     <p:extLst>
       <p:ext uri="{BB962C8B-B14F-4D97-AF65-F5344CB8AC3E}">
         <p14:creationId xmlns:p14="http://schemas.microsoft.com/office/powerpoint/2010/main" val="3195309015"/>
+      </p:ext>
+    </p:extLst>
+  </p:cSld>
+  <p:clrMapOvr>
+    <a:masterClrMapping/>
+  </p:clrMapOvr>
+</p:sld>
+</file>
+
+<file path=ppt/slides/slide7.xml><?xml version="1.0" encoding="utf-8"?>
+<p:sld xmlns:a="http://schemas.openxmlformats.org/drawingml/2006/main" xmlns:r="http://schemas.openxmlformats.org/officeDocument/2006/relationships" xmlns:p="http://schemas.openxmlformats.org/presentationml/2006/main">
+  <p:cSld>
+    <p:spTree>
+      <p:nvGrpSpPr>
+        <p:cNvPr id="1" name=""/>
+        <p:cNvGrpSpPr/>
+        <p:nvPr/>
+      </p:nvGrpSpPr>
+      <p:grpSpPr>
+        <a:xfrm>
+          <a:off x="0" y="0"/>
+          <a:ext cx="0" cy="0"/>
+          <a:chOff x="0" y="0"/>
+          <a:chExt cx="0" cy="0"/>
+        </a:xfrm>
+      </p:grpSpPr>
+      <p:sp>
+        <p:nvSpPr>
+          <p:cNvPr id="2" name="Título 1">
+            <a:extLst>
+              <a:ext uri="{FF2B5EF4-FFF2-40B4-BE49-F238E27FC236}">
+                <a16:creationId xmlns:a16="http://schemas.microsoft.com/office/drawing/2014/main" id="{B7C142F3-15AB-4914-B62A-EDF8AF97F19D}"/>
+              </a:ext>
+            </a:extLst>
+          </p:cNvPr>
+          <p:cNvSpPr>
+            <a:spLocks noGrp="1"/>
+          </p:cNvSpPr>
+          <p:nvPr>
+            <p:ph type="title"/>
+          </p:nvPr>
+        </p:nvSpPr>
+        <p:spPr/>
+        <p:txBody>
+          <a:bodyPr/>
+          <a:lstStyle/>
+          <a:p>
+            <a:r>
+              <a:rPr lang="en-GB" dirty="0"/>
+              <a:t>FILE reading</a:t>
+            </a:r>
+          </a:p>
+        </p:txBody>
+      </p:sp>
+      <p:sp>
+        <p:nvSpPr>
+          <p:cNvPr id="3" name="Marcador de contenido 2">
+            <a:extLst>
+              <a:ext uri="{FF2B5EF4-FFF2-40B4-BE49-F238E27FC236}">
+                <a16:creationId xmlns:a16="http://schemas.microsoft.com/office/drawing/2014/main" id="{5E6D8EE1-E7C2-4DE7-AB76-DD359AF9E27F}"/>
+              </a:ext>
+            </a:extLst>
+          </p:cNvPr>
+          <p:cNvSpPr>
+            <a:spLocks noGrp="1"/>
+          </p:cNvSpPr>
+          <p:nvPr>
+            <p:ph idx="1"/>
+          </p:nvPr>
+        </p:nvSpPr>
+        <p:spPr>
+          <a:xfrm>
+            <a:off x="6096000" y="2249487"/>
+            <a:ext cx="4951411" cy="3541714"/>
+          </a:xfrm>
+        </p:spPr>
+        <p:txBody>
+          <a:bodyPr/>
+          <a:lstStyle/>
+          <a:p>
+            <a:r>
+              <a:rPr lang="en-GB" sz="3500" dirty="0"/>
+              <a:t>Simple File Reading</a:t>
+            </a:r>
+          </a:p>
+          <a:p>
+            <a:r>
+              <a:rPr lang="en-GB" sz="3500" dirty="0"/>
+              <a:t>Number of commands</a:t>
+            </a:r>
+          </a:p>
+          <a:p>
+            <a:r>
+              <a:rPr lang="en-GB" sz="3500" dirty="0"/>
+              <a:t>COMMAND + seconds</a:t>
+            </a:r>
+          </a:p>
+          <a:p>
+            <a:endParaRPr lang="en-GB" dirty="0"/>
+          </a:p>
+        </p:txBody>
+      </p:sp>
+      <p:pic>
+        <p:nvPicPr>
+          <p:cNvPr id="4" name="Imagen 3">
+            <a:extLst>
+              <a:ext uri="{FF2B5EF4-FFF2-40B4-BE49-F238E27FC236}">
+                <a16:creationId xmlns:a16="http://schemas.microsoft.com/office/drawing/2014/main" id="{A46D3EA0-C9E9-4664-8CEF-FB55E08258EF}"/>
+              </a:ext>
+            </a:extLst>
+          </p:cNvPr>
+          <p:cNvPicPr/>
+          <p:nvPr/>
+        </p:nvPicPr>
+        <p:blipFill>
+          <a:blip r:embed="rId2">
+            <a:extLst>
+              <a:ext uri="{28A0092B-C50C-407E-A947-70E740481C1C}">
+                <a14:useLocalDpi xmlns:a14="http://schemas.microsoft.com/office/drawing/2010/main" val="0"/>
+              </a:ext>
+            </a:extLst>
+          </a:blip>
+          <a:srcRect/>
+          <a:stretch>
+            <a:fillRect/>
+          </a:stretch>
+        </p:blipFill>
+        <p:spPr bwMode="auto">
+          <a:xfrm>
+            <a:off x="1141414" y="1911779"/>
+            <a:ext cx="3003484" cy="2674289"/>
+          </a:xfrm>
+          <a:prstGeom prst="rect">
+            <a:avLst/>
+          </a:prstGeom>
+          <a:ln w="38100" cap="sq">
+            <a:solidFill>
+              <a:srgbClr val="000000"/>
+            </a:solidFill>
+            <a:prstDash val="solid"/>
+            <a:miter lim="800000"/>
+          </a:ln>
+          <a:effectLst>
+            <a:outerShdw blurRad="50800" dist="38100" dir="2700000" algn="tl" rotWithShape="0">
+              <a:srgbClr val="000000">
+                <a:alpha val="43000"/>
+              </a:srgbClr>
+            </a:outerShdw>
+          </a:effectLst>
+        </p:spPr>
+      </p:pic>
+    </p:spTree>
+    <p:extLst>
+      <p:ext uri="{BB962C8B-B14F-4D97-AF65-F5344CB8AC3E}">
+        <p14:creationId xmlns:p14="http://schemas.microsoft.com/office/powerpoint/2010/main" val="2248155555"/>
+      </p:ext>
+    </p:extLst>
+  </p:cSld>
+  <p:clrMapOvr>
+    <a:masterClrMapping/>
+  </p:clrMapOvr>
+  <p:timing>
+    <p:tnLst>
+      <p:par>
+        <p:cTn id="1" dur="indefinite" restart="never" nodeType="tmRoot">
+          <p:childTnLst>
+            <p:seq concurrent="1" nextAc="seek">
+              <p:cTn id="2" dur="indefinite" nodeType="mainSeq">
+                <p:childTnLst>
+                  <p:par>
+                    <p:cTn id="3" fill="hold">
+                      <p:stCondLst>
+                        <p:cond delay="indefinite"/>
+                        <p:cond evt="onBegin" delay="0">
+                          <p:tn val="2"/>
+                        </p:cond>
+                      </p:stCondLst>
+                      <p:childTnLst>
+                        <p:par>
+                          <p:cTn id="4" fill="hold">
+                            <p:stCondLst>
+                              <p:cond delay="0"/>
+                            </p:stCondLst>
+                            <p:childTnLst>
+                              <p:par>
+                                <p:cTn id="5" presetID="2" presetClass="entr" presetSubtype="4" fill="hold" grpId="0" nodeType="withEffect">
+                                  <p:stCondLst>
+                                    <p:cond delay="0"/>
+                                  </p:stCondLst>
+                                  <p:childTnLst>
+                                    <p:set>
+                                      <p:cBhvr>
+                                        <p:cTn id="6" dur="1" fill="hold">
+                                          <p:stCondLst>
+                                            <p:cond delay="0"/>
+                                          </p:stCondLst>
+                                        </p:cTn>
+                                        <p:tgtEl>
+                                          <p:spTgt spid="2"/>
+                                        </p:tgtEl>
+                                        <p:attrNameLst>
+                                          <p:attrName>style.visibility</p:attrName>
+                                        </p:attrNameLst>
+                                      </p:cBhvr>
+                                      <p:to>
+                                        <p:strVal val="visible"/>
+                                      </p:to>
+                                    </p:set>
+                                    <p:anim calcmode="lin" valueType="num">
+                                      <p:cBhvr additive="base">
+                                        <p:cTn id="7" dur="500" fill="hold"/>
+                                        <p:tgtEl>
+                                          <p:spTgt spid="2"/>
+                                        </p:tgtEl>
+                                        <p:attrNameLst>
+                                          <p:attrName>ppt_x</p:attrName>
+                                        </p:attrNameLst>
+                                      </p:cBhvr>
+                                      <p:tavLst>
+                                        <p:tav tm="0">
+                                          <p:val>
+                                            <p:strVal val="#ppt_x"/>
+                                          </p:val>
+                                        </p:tav>
+                                        <p:tav tm="100000">
+                                          <p:val>
+                                            <p:strVal val="#ppt_x"/>
+                                          </p:val>
+                                        </p:tav>
+                                      </p:tavLst>
+                                    </p:anim>
+                                    <p:anim calcmode="lin" valueType="num">
+                                      <p:cBhvr additive="base">
+                                        <p:cTn id="8" dur="500" fill="hold"/>
+                                        <p:tgtEl>
+                                          <p:spTgt spid="2"/>
+                                        </p:tgtEl>
+                                        <p:attrNameLst>
+                                          <p:attrName>ppt_y</p:attrName>
+                                        </p:attrNameLst>
+                                      </p:cBhvr>
+                                      <p:tavLst>
+                                        <p:tav tm="0">
+                                          <p:val>
+                                            <p:strVal val="1+#ppt_h/2"/>
+                                          </p:val>
+                                        </p:tav>
+                                        <p:tav tm="100000">
+                                          <p:val>
+                                            <p:strVal val="#ppt_y"/>
+                                          </p:val>
+                                        </p:tav>
+                                      </p:tavLst>
+                                    </p:anim>
+                                  </p:childTnLst>
+                                </p:cTn>
+                              </p:par>
+                              <p:par>
+                                <p:cTn id="9" presetID="2" presetClass="entr" presetSubtype="4" fill="hold" grpId="0" nodeType="withEffect">
+                                  <p:stCondLst>
+                                    <p:cond delay="0"/>
+                                  </p:stCondLst>
+                                  <p:childTnLst>
+                                    <p:set>
+                                      <p:cBhvr>
+                                        <p:cTn id="10" dur="1" fill="hold">
+                                          <p:stCondLst>
+                                            <p:cond delay="0"/>
+                                          </p:stCondLst>
+                                        </p:cTn>
+                                        <p:tgtEl>
+                                          <p:spTgt spid="3">
+                                            <p:txEl>
+                                              <p:pRg st="0" end="0"/>
+                                            </p:txEl>
+                                          </p:spTgt>
+                                        </p:tgtEl>
+                                        <p:attrNameLst>
+                                          <p:attrName>style.visibility</p:attrName>
+                                        </p:attrNameLst>
+                                      </p:cBhvr>
+                                      <p:to>
+                                        <p:strVal val="visible"/>
+                                      </p:to>
+                                    </p:set>
+                                    <p:anim calcmode="lin" valueType="num">
+                                      <p:cBhvr additive="base">
+                                        <p:cTn id="11" dur="500" fill="hold"/>
+                                        <p:tgtEl>
+                                          <p:spTgt spid="3">
+                                            <p:txEl>
+                                              <p:pRg st="0" end="0"/>
+                                            </p:txEl>
+                                          </p:spTgt>
+                                        </p:tgtEl>
+                                        <p:attrNameLst>
+                                          <p:attrName>ppt_x</p:attrName>
+                                        </p:attrNameLst>
+                                      </p:cBhvr>
+                                      <p:tavLst>
+                                        <p:tav tm="0">
+                                          <p:val>
+                                            <p:strVal val="#ppt_x"/>
+                                          </p:val>
+                                        </p:tav>
+                                        <p:tav tm="100000">
+                                          <p:val>
+                                            <p:strVal val="#ppt_x"/>
+                                          </p:val>
+                                        </p:tav>
+                                      </p:tavLst>
+                                    </p:anim>
+                                    <p:anim calcmode="lin" valueType="num">
+                                      <p:cBhvr additive="base">
+                                        <p:cTn id="12" dur="500" fill="hold"/>
+                                        <p:tgtEl>
+                                          <p:spTgt spid="3">
+                                            <p:txEl>
+                                              <p:pRg st="0" end="0"/>
+                                            </p:txEl>
+                                          </p:spTgt>
+                                        </p:tgtEl>
+                                        <p:attrNameLst>
+                                          <p:attrName>ppt_y</p:attrName>
+                                        </p:attrNameLst>
+                                      </p:cBhvr>
+                                      <p:tavLst>
+                                        <p:tav tm="0">
+                                          <p:val>
+                                            <p:strVal val="1+#ppt_h/2"/>
+                                          </p:val>
+                                        </p:tav>
+                                        <p:tav tm="100000">
+                                          <p:val>
+                                            <p:strVal val="#ppt_y"/>
+                                          </p:val>
+                                        </p:tav>
+                                      </p:tavLst>
+                                    </p:anim>
+                                  </p:childTnLst>
+                                </p:cTn>
+                              </p:par>
+                              <p:par>
+                                <p:cTn id="13" presetID="2" presetClass="entr" presetSubtype="4" fill="hold" grpId="0" nodeType="withEffect">
+                                  <p:stCondLst>
+                                    <p:cond delay="0"/>
+                                  </p:stCondLst>
+                                  <p:childTnLst>
+                                    <p:set>
+                                      <p:cBhvr>
+                                        <p:cTn id="14" dur="1" fill="hold">
+                                          <p:stCondLst>
+                                            <p:cond delay="0"/>
+                                          </p:stCondLst>
+                                        </p:cTn>
+                                        <p:tgtEl>
+                                          <p:spTgt spid="3">
+                                            <p:txEl>
+                                              <p:pRg st="1" end="1"/>
+                                            </p:txEl>
+                                          </p:spTgt>
+                                        </p:tgtEl>
+                                        <p:attrNameLst>
+                                          <p:attrName>style.visibility</p:attrName>
+                                        </p:attrNameLst>
+                                      </p:cBhvr>
+                                      <p:to>
+                                        <p:strVal val="visible"/>
+                                      </p:to>
+                                    </p:set>
+                                    <p:anim calcmode="lin" valueType="num">
+                                      <p:cBhvr additive="base">
+                                        <p:cTn id="15" dur="500" fill="hold"/>
+                                        <p:tgtEl>
+                                          <p:spTgt spid="3">
+                                            <p:txEl>
+                                              <p:pRg st="1" end="1"/>
+                                            </p:txEl>
+                                          </p:spTgt>
+                                        </p:tgtEl>
+                                        <p:attrNameLst>
+                                          <p:attrName>ppt_x</p:attrName>
+                                        </p:attrNameLst>
+                                      </p:cBhvr>
+                                      <p:tavLst>
+                                        <p:tav tm="0">
+                                          <p:val>
+                                            <p:strVal val="#ppt_x"/>
+                                          </p:val>
+                                        </p:tav>
+                                        <p:tav tm="100000">
+                                          <p:val>
+                                            <p:strVal val="#ppt_x"/>
+                                          </p:val>
+                                        </p:tav>
+                                      </p:tavLst>
+                                    </p:anim>
+                                    <p:anim calcmode="lin" valueType="num">
+                                      <p:cBhvr additive="base">
+                                        <p:cTn id="16" dur="500" fill="hold"/>
+                                        <p:tgtEl>
+                                          <p:spTgt spid="3">
+                                            <p:txEl>
+                                              <p:pRg st="1" end="1"/>
+                                            </p:txEl>
+                                          </p:spTgt>
+                                        </p:tgtEl>
+                                        <p:attrNameLst>
+                                          <p:attrName>ppt_y</p:attrName>
+                                        </p:attrNameLst>
+                                      </p:cBhvr>
+                                      <p:tavLst>
+                                        <p:tav tm="0">
+                                          <p:val>
+                                            <p:strVal val="1+#ppt_h/2"/>
+                                          </p:val>
+                                        </p:tav>
+                                        <p:tav tm="100000">
+                                          <p:val>
+                                            <p:strVal val="#ppt_y"/>
+                                          </p:val>
+                                        </p:tav>
+                                      </p:tavLst>
+                                    </p:anim>
+                                  </p:childTnLst>
+                                </p:cTn>
+                              </p:par>
+                              <p:par>
+                                <p:cTn id="17" presetID="2" presetClass="entr" presetSubtype="4" fill="hold" grpId="0" nodeType="withEffect">
+                                  <p:stCondLst>
+                                    <p:cond delay="0"/>
+                                  </p:stCondLst>
+                                  <p:childTnLst>
+                                    <p:set>
+                                      <p:cBhvr>
+                                        <p:cTn id="18" dur="1" fill="hold">
+                                          <p:stCondLst>
+                                            <p:cond delay="0"/>
+                                          </p:stCondLst>
+                                        </p:cTn>
+                                        <p:tgtEl>
+                                          <p:spTgt spid="3">
+                                            <p:txEl>
+                                              <p:pRg st="2" end="2"/>
+                                            </p:txEl>
+                                          </p:spTgt>
+                                        </p:tgtEl>
+                                        <p:attrNameLst>
+                                          <p:attrName>style.visibility</p:attrName>
+                                        </p:attrNameLst>
+                                      </p:cBhvr>
+                                      <p:to>
+                                        <p:strVal val="visible"/>
+                                      </p:to>
+                                    </p:set>
+                                    <p:anim calcmode="lin" valueType="num">
+                                      <p:cBhvr additive="base">
+                                        <p:cTn id="19" dur="500" fill="hold"/>
+                                        <p:tgtEl>
+                                          <p:spTgt spid="3">
+                                            <p:txEl>
+                                              <p:pRg st="2" end="2"/>
+                                            </p:txEl>
+                                          </p:spTgt>
+                                        </p:tgtEl>
+                                        <p:attrNameLst>
+                                          <p:attrName>ppt_x</p:attrName>
+                                        </p:attrNameLst>
+                                      </p:cBhvr>
+                                      <p:tavLst>
+                                        <p:tav tm="0">
+                                          <p:val>
+                                            <p:strVal val="#ppt_x"/>
+                                          </p:val>
+                                        </p:tav>
+                                        <p:tav tm="100000">
+                                          <p:val>
+                                            <p:strVal val="#ppt_x"/>
+                                          </p:val>
+                                        </p:tav>
+                                      </p:tavLst>
+                                    </p:anim>
+                                    <p:anim calcmode="lin" valueType="num">
+                                      <p:cBhvr additive="base">
+                                        <p:cTn id="20" dur="500" fill="hold"/>
+                                        <p:tgtEl>
+                                          <p:spTgt spid="3">
+                                            <p:txEl>
+                                              <p:pRg st="2" end="2"/>
+                                            </p:txEl>
+                                          </p:spTgt>
+                                        </p:tgtEl>
+                                        <p:attrNameLst>
+                                          <p:attrName>ppt_y</p:attrName>
+                                        </p:attrNameLst>
+                                      </p:cBhvr>
+                                      <p:tavLst>
+                                        <p:tav tm="0">
+                                          <p:val>
+                                            <p:strVal val="1+#ppt_h/2"/>
+                                          </p:val>
+                                        </p:tav>
+                                        <p:tav tm="100000">
+                                          <p:val>
+                                            <p:strVal val="#ppt_y"/>
+                                          </p:val>
+                                        </p:tav>
+                                      </p:tavLst>
+                                    </p:anim>
+                                  </p:childTnLst>
+                                </p:cTn>
+                              </p:par>
+                            </p:childTnLst>
+                          </p:cTn>
+                        </p:par>
+                      </p:childTnLst>
+                    </p:cTn>
+                  </p:par>
+                  <p:par>
+                    <p:cTn id="21" fill="hold">
+                      <p:stCondLst>
+                        <p:cond delay="indefinite"/>
+                      </p:stCondLst>
+                      <p:childTnLst>
+                        <p:par>
+                          <p:cTn id="22" fill="hold">
+                            <p:stCondLst>
+                              <p:cond delay="0"/>
+                            </p:stCondLst>
+                            <p:childTnLst>
+                              <p:par>
+                                <p:cTn id="23" presetID="10" presetClass="entr" presetSubtype="0" fill="hold" nodeType="clickEffect">
+                                  <p:stCondLst>
+                                    <p:cond delay="0"/>
+                                  </p:stCondLst>
+                                  <p:childTnLst>
+                                    <p:set>
+                                      <p:cBhvr>
+                                        <p:cTn id="24" dur="1" fill="hold">
+                                          <p:stCondLst>
+                                            <p:cond delay="0"/>
+                                          </p:stCondLst>
+                                        </p:cTn>
+                                        <p:tgtEl>
+                                          <p:spTgt spid="4"/>
+                                        </p:tgtEl>
+                                        <p:attrNameLst>
+                                          <p:attrName>style.visibility</p:attrName>
+                                        </p:attrNameLst>
+                                      </p:cBhvr>
+                                      <p:to>
+                                        <p:strVal val="visible"/>
+                                      </p:to>
+                                    </p:set>
+                                    <p:animEffect transition="in" filter="fade">
+                                      <p:cBhvr>
+                                        <p:cTn id="25" dur="500"/>
+                                        <p:tgtEl>
+                                          <p:spTgt spid="4"/>
+                                        </p:tgtEl>
+                                      </p:cBhvr>
+                                    </p:animEffect>
+                                  </p:childTnLst>
+                                </p:cTn>
+                              </p:par>
+                            </p:childTnLst>
+                          </p:cTn>
+                        </p:par>
+                      </p:childTnLst>
+                    </p:cTn>
+                  </p:par>
+                </p:childTnLst>
+              </p:cTn>
+              <p:prevCondLst>
+                <p:cond evt="onPrev" delay="0">
+                  <p:tgtEl>
+                    <p:sldTgt/>
+                  </p:tgtEl>
+                </p:cond>
+              </p:prevCondLst>
+              <p:nextCondLst>
+                <p:cond evt="onNext" delay="0">
+                  <p:tgtEl>
+                    <p:sldTgt/>
+                  </p:tgtEl>
+                </p:cond>
+              </p:nextCondLst>
+            </p:seq>
+          </p:childTnLst>
+        </p:cTn>
+      </p:par>
+    </p:tnLst>
+    <p:bldLst>
+      <p:bldP spid="2" grpId="0"/>
+      <p:bldP spid="3" grpId="0" uiExpand="1" build="p"/>
+    </p:bldLst>
+  </p:timing>
+</p:sld>
+</file>
+
+<file path=ppt/slides/slide8.xml><?xml version="1.0" encoding="utf-8"?>
+<p:sld xmlns:a="http://schemas.openxmlformats.org/drawingml/2006/main" xmlns:r="http://schemas.openxmlformats.org/officeDocument/2006/relationships" xmlns:p="http://schemas.openxmlformats.org/presentationml/2006/main">
+  <p:cSld>
+    <p:spTree>
+      <p:nvGrpSpPr>
+        <p:cNvPr id="1" name=""/>
+        <p:cNvGrpSpPr/>
+        <p:nvPr/>
+      </p:nvGrpSpPr>
+      <p:grpSpPr>
+        <a:xfrm>
+          <a:off x="0" y="0"/>
+          <a:ext cx="0" cy="0"/>
+          <a:chOff x="0" y="0"/>
+          <a:chExt cx="0" cy="0"/>
+        </a:xfrm>
+      </p:grpSpPr>
+      <p:sp>
+        <p:nvSpPr>
+          <p:cNvPr id="2" name="Título 1">
+            <a:extLst>
+              <a:ext uri="{FF2B5EF4-FFF2-40B4-BE49-F238E27FC236}">
+                <a16:creationId xmlns:a16="http://schemas.microsoft.com/office/drawing/2014/main" id="{26D4A75E-30F2-4FDF-AA20-6F6EE1ECC825}"/>
+              </a:ext>
+            </a:extLst>
+          </p:cNvPr>
+          <p:cNvSpPr>
+            <a:spLocks noGrp="1"/>
+          </p:cNvSpPr>
+          <p:nvPr>
+            <p:ph type="title"/>
+          </p:nvPr>
+        </p:nvSpPr>
+        <p:spPr/>
+        <p:txBody>
+          <a:bodyPr/>
+          <a:lstStyle/>
+          <a:p>
+            <a:r>
+              <a:rPr lang="en-GB" dirty="0"/>
+              <a:t>Port communication</a:t>
+            </a:r>
+          </a:p>
+        </p:txBody>
+      </p:sp>
+      <p:sp>
+        <p:nvSpPr>
+          <p:cNvPr id="3" name="Marcador de contenido 2">
+            <a:extLst>
+              <a:ext uri="{FF2B5EF4-FFF2-40B4-BE49-F238E27FC236}">
+                <a16:creationId xmlns:a16="http://schemas.microsoft.com/office/drawing/2014/main" id="{EA80A301-BB81-416A-8E62-543E89D62921}"/>
+              </a:ext>
+            </a:extLst>
+          </p:cNvPr>
+          <p:cNvSpPr>
+            <a:spLocks noGrp="1"/>
+          </p:cNvSpPr>
+          <p:nvPr>
+            <p:ph idx="1"/>
+          </p:nvPr>
+        </p:nvSpPr>
+        <p:spPr>
+          <a:xfrm>
+            <a:off x="5870713" y="2249487"/>
+            <a:ext cx="5176698" cy="3541714"/>
+          </a:xfrm>
+        </p:spPr>
+        <p:txBody>
+          <a:bodyPr/>
+          <a:lstStyle/>
+          <a:p>
+            <a:r>
+              <a:rPr lang="en-GB" dirty="0"/>
+              <a:t> Multithread Program: Unity + Server</a:t>
+            </a:r>
+          </a:p>
+          <a:p>
+            <a:r>
+              <a:rPr lang="en-GB" dirty="0"/>
+              <a:t> Another application runs a Client: Data Receiving</a:t>
+            </a:r>
+          </a:p>
+          <a:p>
+            <a:r>
+              <a:rPr lang="en-GB" dirty="0"/>
+              <a:t> .NET Sockets</a:t>
+            </a:r>
+          </a:p>
+          <a:p>
+            <a:endParaRPr lang="en-GB" dirty="0"/>
+          </a:p>
+        </p:txBody>
+      </p:sp>
+      <p:pic>
+        <p:nvPicPr>
+          <p:cNvPr id="11" name="Imagen 10">
+            <a:extLst>
+              <a:ext uri="{FF2B5EF4-FFF2-40B4-BE49-F238E27FC236}">
+                <a16:creationId xmlns:a16="http://schemas.microsoft.com/office/drawing/2014/main" id="{E01B4777-5A64-40DA-A661-D978716681F6}"/>
+              </a:ext>
+            </a:extLst>
+          </p:cNvPr>
+          <p:cNvPicPr>
+            <a:picLocks noChangeAspect="1"/>
+          </p:cNvPicPr>
+          <p:nvPr/>
+        </p:nvPicPr>
+        <p:blipFill>
+          <a:blip r:embed="rId2"/>
+          <a:stretch>
+            <a:fillRect/>
+          </a:stretch>
+        </p:blipFill>
+        <p:spPr>
+          <a:xfrm>
+            <a:off x="263836" y="1497794"/>
+            <a:ext cx="5830576" cy="2879297"/>
+          </a:xfrm>
+          <a:prstGeom prst="rect">
+            <a:avLst/>
+          </a:prstGeom>
+        </p:spPr>
+      </p:pic>
+    </p:spTree>
+    <p:extLst>
+      <p:ext uri="{BB962C8B-B14F-4D97-AF65-F5344CB8AC3E}">
+        <p14:creationId xmlns:p14="http://schemas.microsoft.com/office/powerpoint/2010/main" val="2302078634"/>
+      </p:ext>
+    </p:extLst>
+  </p:cSld>
+  <p:clrMapOvr>
+    <a:masterClrMapping/>
+  </p:clrMapOvr>
+</p:sld>
+</file>
+
+<file path=ppt/slides/slide9.xml><?xml version="1.0" encoding="utf-8"?>
+<p:sld xmlns:a="http://schemas.openxmlformats.org/drawingml/2006/main" xmlns:r="http://schemas.openxmlformats.org/officeDocument/2006/relationships" xmlns:p="http://schemas.openxmlformats.org/presentationml/2006/main">
+  <p:cSld>
+    <p:spTree>
+      <p:nvGrpSpPr>
+        <p:cNvPr id="1" name=""/>
+        <p:cNvGrpSpPr/>
+        <p:nvPr/>
+      </p:nvGrpSpPr>
+      <p:grpSpPr>
+        <a:xfrm>
+          <a:off x="0" y="0"/>
+          <a:ext cx="0" cy="0"/>
+          <a:chOff x="0" y="0"/>
+          <a:chExt cx="0" cy="0"/>
+        </a:xfrm>
+      </p:grpSpPr>
+      <p:sp>
+        <p:nvSpPr>
+          <p:cNvPr id="4" name="Título 3">
+            <a:extLst>
+              <a:ext uri="{FF2B5EF4-FFF2-40B4-BE49-F238E27FC236}">
+                <a16:creationId xmlns:a16="http://schemas.microsoft.com/office/drawing/2014/main" id="{7FA1AAF5-0369-4771-A2EC-0171395F1EAB}"/>
+              </a:ext>
+            </a:extLst>
+          </p:cNvPr>
+          <p:cNvSpPr>
+            <a:spLocks noGrp="1"/>
+          </p:cNvSpPr>
+          <p:nvPr>
+            <p:ph type="title"/>
+          </p:nvPr>
+        </p:nvSpPr>
+        <p:spPr>
+          <a:xfrm>
+            <a:off x="1143001" y="2689715"/>
+            <a:ext cx="9905998" cy="1478570"/>
+          </a:xfrm>
+        </p:spPr>
+        <p:txBody>
+          <a:bodyPr/>
+          <a:lstStyle/>
+          <a:p>
+            <a:pPr algn="ctr"/>
+            <a:r>
+              <a:rPr lang="en-GB" dirty="0"/>
+              <a:t>ISSUES / Drawbacks/ Unfinished parts</a:t>
+            </a:r>
+          </a:p>
+        </p:txBody>
+      </p:sp>
+    </p:spTree>
+    <p:extLst>
+      <p:ext uri="{BB962C8B-B14F-4D97-AF65-F5344CB8AC3E}">
+        <p14:creationId xmlns:p14="http://schemas.microsoft.com/office/powerpoint/2010/main" val="1718815065"/>
       </p:ext>
     </p:extLst>
   </p:cSld>

</xml_diff>

<commit_message>
Project Finished. Added PDF with report. GGWP
</commit_message>
<xml_diff>
--- a/ISS_FinalPresentation.pptx
+++ b/ISS_FinalPresentation.pptx
@@ -175,7 +175,7 @@
           <a:noFill/>
           <a:extLst>
             <a:ext uri="{909E8E84-426E-40dd-AFC4-6F175D3DCCD1}">
-              <a14:hiddenFill xmlns="" xmlns:a14="http://schemas.microsoft.com/office/drawing/2010/main">
+              <a14:hiddenFill xmlns:a14="http://schemas.microsoft.com/office/drawing/2010/main" xmlns="">
                 <a:solidFill>
                   <a:srgbClr val="FFFFFF"/>
                 </a:solidFill>
@@ -235,7 +235,7 @@
             </a:ln>
             <a:extLst>
               <a:ext uri="{91240B29-F687-4f45-9708-019B960494DF}">
-                <a14:hiddenLine xmlns="" xmlns:a14="http://schemas.microsoft.com/office/drawing/2010/main" w="9525">
+                <a14:hiddenLine xmlns:a14="http://schemas.microsoft.com/office/drawing/2010/main" xmlns="" w="9525">
                   <a:solidFill>
                     <a:srgbClr val="000000"/>
                   </a:solidFill>
@@ -325,7 +325,7 @@
             </a:ln>
             <a:extLst>
               <a:ext uri="{91240B29-F687-4f45-9708-019B960494DF}">
-                <a14:hiddenLine xmlns="" xmlns:a14="http://schemas.microsoft.com/office/drawing/2010/main" w="9525">
+                <a14:hiddenLine xmlns:a14="http://schemas.microsoft.com/office/drawing/2010/main" xmlns="" w="9525">
                   <a:solidFill>
                     <a:srgbClr val="000000"/>
                   </a:solidFill>
@@ -415,7 +415,7 @@
             </a:ln>
             <a:extLst>
               <a:ext uri="{91240B29-F687-4f45-9708-019B960494DF}">
-                <a14:hiddenLine xmlns="" xmlns:a14="http://schemas.microsoft.com/office/drawing/2010/main" w="9525">
+                <a14:hiddenLine xmlns:a14="http://schemas.microsoft.com/office/drawing/2010/main" xmlns="" w="9525">
                   <a:solidFill>
                     <a:srgbClr val="000000"/>
                   </a:solidFill>
@@ -449,7 +449,7 @@
             </a:ln>
             <a:extLst>
               <a:ext uri="{91240B29-F687-4f45-9708-019B960494DF}">
-                <a14:hiddenLine xmlns="" xmlns:a14="http://schemas.microsoft.com/office/drawing/2010/main" w="9525">
+                <a14:hiddenLine xmlns:a14="http://schemas.microsoft.com/office/drawing/2010/main" xmlns="" w="9525">
                   <a:solidFill>
                     <a:srgbClr val="000000"/>
                   </a:solidFill>
@@ -539,7 +539,7 @@
             </a:ln>
             <a:extLst>
               <a:ext uri="{91240B29-F687-4f45-9708-019B960494DF}">
-                <a14:hiddenLine xmlns="" xmlns:a14="http://schemas.microsoft.com/office/drawing/2010/main" w="9525">
+                <a14:hiddenLine xmlns:a14="http://schemas.microsoft.com/office/drawing/2010/main" xmlns="" w="9525">
                   <a:solidFill>
                     <a:srgbClr val="000000"/>
                   </a:solidFill>
@@ -601,7 +601,7 @@
             </a:ln>
             <a:extLst>
               <a:ext uri="{91240B29-F687-4f45-9708-019B960494DF}">
-                <a14:hiddenLine xmlns="" xmlns:a14="http://schemas.microsoft.com/office/drawing/2010/main" w="9525">
+                <a14:hiddenLine xmlns:a14="http://schemas.microsoft.com/office/drawing/2010/main" xmlns="" w="9525">
                   <a:solidFill>
                     <a:srgbClr val="000000"/>
                   </a:solidFill>
@@ -663,7 +663,7 @@
             </a:ln>
             <a:extLst>
               <a:ext uri="{91240B29-F687-4f45-9708-019B960494DF}">
-                <a14:hiddenLine xmlns="" xmlns:a14="http://schemas.microsoft.com/office/drawing/2010/main" w="9525">
+                <a14:hiddenLine xmlns:a14="http://schemas.microsoft.com/office/drawing/2010/main" xmlns="" w="9525">
                   <a:solidFill>
                     <a:srgbClr val="000000"/>
                   </a:solidFill>
@@ -753,7 +753,7 @@
             </a:ln>
             <a:extLst>
               <a:ext uri="{91240B29-F687-4f45-9708-019B960494DF}">
-                <a14:hiddenLine xmlns="" xmlns:a14="http://schemas.microsoft.com/office/drawing/2010/main" w="9525">
+                <a14:hiddenLine xmlns:a14="http://schemas.microsoft.com/office/drawing/2010/main" xmlns="" w="9525">
                   <a:solidFill>
                     <a:srgbClr val="000000"/>
                   </a:solidFill>
@@ -815,7 +815,7 @@
             </a:ln>
             <a:extLst>
               <a:ext uri="{91240B29-F687-4f45-9708-019B960494DF}">
-                <a14:hiddenLine xmlns="" xmlns:a14="http://schemas.microsoft.com/office/drawing/2010/main" w="9525">
+                <a14:hiddenLine xmlns:a14="http://schemas.microsoft.com/office/drawing/2010/main" xmlns="" w="9525">
                   <a:solidFill>
                     <a:srgbClr val="000000"/>
                   </a:solidFill>
@@ -877,7 +877,7 @@
             </a:ln>
             <a:extLst>
               <a:ext uri="{91240B29-F687-4f45-9708-019B960494DF}">
-                <a14:hiddenLine xmlns="" xmlns:a14="http://schemas.microsoft.com/office/drawing/2010/main" w="9525">
+                <a14:hiddenLine xmlns:a14="http://schemas.microsoft.com/office/drawing/2010/main" xmlns="" w="9525">
                   <a:solidFill>
                     <a:srgbClr val="000000"/>
                   </a:solidFill>
@@ -967,7 +967,7 @@
             </a:ln>
             <a:extLst>
               <a:ext uri="{91240B29-F687-4f45-9708-019B960494DF}">
-                <a14:hiddenLine xmlns="" xmlns:a14="http://schemas.microsoft.com/office/drawing/2010/main" w="9525">
+                <a14:hiddenLine xmlns:a14="http://schemas.microsoft.com/office/drawing/2010/main" xmlns="" w="9525">
                   <a:solidFill>
                     <a:srgbClr val="000000"/>
                   </a:solidFill>
@@ -1057,7 +1057,7 @@
             </a:ln>
             <a:extLst>
               <a:ext uri="{91240B29-F687-4f45-9708-019B960494DF}">
-                <a14:hiddenLine xmlns="" xmlns:a14="http://schemas.microsoft.com/office/drawing/2010/main" w="9525">
+                <a14:hiddenLine xmlns:a14="http://schemas.microsoft.com/office/drawing/2010/main" xmlns="" w="9525">
                   <a:solidFill>
                     <a:srgbClr val="000000"/>
                   </a:solidFill>
@@ -1119,7 +1119,7 @@
             </a:ln>
             <a:extLst>
               <a:ext uri="{91240B29-F687-4f45-9708-019B960494DF}">
-                <a14:hiddenLine xmlns="" xmlns:a14="http://schemas.microsoft.com/office/drawing/2010/main" w="9525">
+                <a14:hiddenLine xmlns:a14="http://schemas.microsoft.com/office/drawing/2010/main" xmlns="" w="9525">
                   <a:solidFill>
                     <a:srgbClr val="000000"/>
                   </a:solidFill>
@@ -1229,7 +1229,7 @@
             </a:ln>
             <a:extLst>
               <a:ext uri="{91240B29-F687-4f45-9708-019B960494DF}">
-                <a14:hiddenLine xmlns="" xmlns:a14="http://schemas.microsoft.com/office/drawing/2010/main" w="9525">
+                <a14:hiddenLine xmlns:a14="http://schemas.microsoft.com/office/drawing/2010/main" xmlns="" w="9525">
                   <a:solidFill>
                     <a:srgbClr val="000000"/>
                   </a:solidFill>
@@ -1291,7 +1291,7 @@
             </a:ln>
             <a:extLst>
               <a:ext uri="{91240B29-F687-4f45-9708-019B960494DF}">
-                <a14:hiddenLine xmlns="" xmlns:a14="http://schemas.microsoft.com/office/drawing/2010/main" w="9525">
+                <a14:hiddenLine xmlns:a14="http://schemas.microsoft.com/office/drawing/2010/main" xmlns="" w="9525">
                   <a:solidFill>
                     <a:srgbClr val="000000"/>
                   </a:solidFill>
@@ -1381,7 +1381,7 @@
             </a:ln>
             <a:extLst>
               <a:ext uri="{91240B29-F687-4f45-9708-019B960494DF}">
-                <a14:hiddenLine xmlns="" xmlns:a14="http://schemas.microsoft.com/office/drawing/2010/main" w="9525">
+                <a14:hiddenLine xmlns:a14="http://schemas.microsoft.com/office/drawing/2010/main" xmlns="" w="9525">
                   <a:solidFill>
                     <a:srgbClr val="000000"/>
                   </a:solidFill>
@@ -1471,7 +1471,7 @@
             </a:ln>
             <a:extLst>
               <a:ext uri="{91240B29-F687-4f45-9708-019B960494DF}">
-                <a14:hiddenLine xmlns="" xmlns:a14="http://schemas.microsoft.com/office/drawing/2010/main" w="9525">
+                <a14:hiddenLine xmlns:a14="http://schemas.microsoft.com/office/drawing/2010/main" xmlns="" w="9525">
                   <a:solidFill>
                     <a:srgbClr val="000000"/>
                   </a:solidFill>
@@ -1533,7 +1533,7 @@
             </a:ln>
             <a:extLst>
               <a:ext uri="{91240B29-F687-4f45-9708-019B960494DF}">
-                <a14:hiddenLine xmlns="" xmlns:a14="http://schemas.microsoft.com/office/drawing/2010/main" w="9525">
+                <a14:hiddenLine xmlns:a14="http://schemas.microsoft.com/office/drawing/2010/main" xmlns="" w="9525">
                   <a:solidFill>
                     <a:srgbClr val="000000"/>
                   </a:solidFill>
@@ -1623,7 +1623,7 @@
             </a:ln>
             <a:extLst>
               <a:ext uri="{91240B29-F687-4f45-9708-019B960494DF}">
-                <a14:hiddenLine xmlns="" xmlns:a14="http://schemas.microsoft.com/office/drawing/2010/main" w="9525">
+                <a14:hiddenLine xmlns:a14="http://schemas.microsoft.com/office/drawing/2010/main" xmlns="" w="9525">
                   <a:solidFill>
                     <a:srgbClr val="000000"/>
                   </a:solidFill>
@@ -1713,7 +1713,7 @@
             </a:ln>
             <a:extLst>
               <a:ext uri="{91240B29-F687-4f45-9708-019B960494DF}">
-                <a14:hiddenLine xmlns="" xmlns:a14="http://schemas.microsoft.com/office/drawing/2010/main" w="9525">
+                <a14:hiddenLine xmlns:a14="http://schemas.microsoft.com/office/drawing/2010/main" xmlns="" w="9525">
                   <a:solidFill>
                     <a:srgbClr val="000000"/>
                   </a:solidFill>
@@ -1769,7 +1769,7 @@
             </a:ln>
             <a:extLst>
               <a:ext uri="{91240B29-F687-4f45-9708-019B960494DF}">
-                <a14:hiddenLine xmlns="" xmlns:a14="http://schemas.microsoft.com/office/drawing/2010/main" w="9525">
+                <a14:hiddenLine xmlns:a14="http://schemas.microsoft.com/office/drawing/2010/main" xmlns="" w="9525">
                   <a:solidFill>
                     <a:srgbClr val="000000"/>
                   </a:solidFill>
@@ -1859,7 +1859,7 @@
             </a:ln>
             <a:extLst>
               <a:ext uri="{91240B29-F687-4f45-9708-019B960494DF}">
-                <a14:hiddenLine xmlns="" xmlns:a14="http://schemas.microsoft.com/office/drawing/2010/main" w="9525">
+                <a14:hiddenLine xmlns:a14="http://schemas.microsoft.com/office/drawing/2010/main" xmlns="" w="9525">
                   <a:solidFill>
                     <a:srgbClr val="000000"/>
                   </a:solidFill>
@@ -1915,7 +1915,7 @@
             </a:ln>
             <a:extLst>
               <a:ext uri="{91240B29-F687-4f45-9708-019B960494DF}">
-                <a14:hiddenLine xmlns="" xmlns:a14="http://schemas.microsoft.com/office/drawing/2010/main" w="9525">
+                <a14:hiddenLine xmlns:a14="http://schemas.microsoft.com/office/drawing/2010/main" xmlns="" w="9525">
                   <a:solidFill>
                     <a:srgbClr val="000000"/>
                   </a:solidFill>
@@ -2005,7 +2005,7 @@
             </a:ln>
             <a:extLst>
               <a:ext uri="{91240B29-F687-4f45-9708-019B960494DF}">
-                <a14:hiddenLine xmlns="" xmlns:a14="http://schemas.microsoft.com/office/drawing/2010/main" w="9525">
+                <a14:hiddenLine xmlns:a14="http://schemas.microsoft.com/office/drawing/2010/main" xmlns="" w="9525">
                   <a:solidFill>
                     <a:srgbClr val="000000"/>
                   </a:solidFill>
@@ -2073,7 +2073,7 @@
             </a:ln>
             <a:extLst>
               <a:ext uri="{91240B29-F687-4f45-9708-019B960494DF}">
-                <a14:hiddenLine xmlns="" xmlns:a14="http://schemas.microsoft.com/office/drawing/2010/main" w="9525">
+                <a14:hiddenLine xmlns:a14="http://schemas.microsoft.com/office/drawing/2010/main" xmlns="" w="9525">
                   <a:solidFill>
                     <a:srgbClr val="000000"/>
                   </a:solidFill>
@@ -2163,7 +2163,7 @@
             </a:ln>
             <a:extLst>
               <a:ext uri="{91240B29-F687-4f45-9708-019B960494DF}">
-                <a14:hiddenLine xmlns="" xmlns:a14="http://schemas.microsoft.com/office/drawing/2010/main" w="9525">
+                <a14:hiddenLine xmlns:a14="http://schemas.microsoft.com/office/drawing/2010/main" xmlns="" w="9525">
                   <a:solidFill>
                     <a:srgbClr val="000000"/>
                   </a:solidFill>
@@ -2231,7 +2231,7 @@
             </a:ln>
             <a:extLst>
               <a:ext uri="{91240B29-F687-4f45-9708-019B960494DF}">
-                <a14:hiddenLine xmlns="" xmlns:a14="http://schemas.microsoft.com/office/drawing/2010/main" w="9525">
+                <a14:hiddenLine xmlns:a14="http://schemas.microsoft.com/office/drawing/2010/main" xmlns="" w="9525">
                   <a:solidFill>
                     <a:srgbClr val="000000"/>
                   </a:solidFill>
@@ -2321,7 +2321,7 @@
             </a:ln>
             <a:extLst>
               <a:ext uri="{91240B29-F687-4f45-9708-019B960494DF}">
-                <a14:hiddenLine xmlns="" xmlns:a14="http://schemas.microsoft.com/office/drawing/2010/main" w="9525">
+                <a14:hiddenLine xmlns:a14="http://schemas.microsoft.com/office/drawing/2010/main" xmlns="" w="9525">
                   <a:solidFill>
                     <a:srgbClr val="000000"/>
                   </a:solidFill>
@@ -2355,7 +2355,7 @@
             </a:ln>
             <a:extLst>
               <a:ext uri="{91240B29-F687-4f45-9708-019B960494DF}">
-                <a14:hiddenLine xmlns="" xmlns:a14="http://schemas.microsoft.com/office/drawing/2010/main" w="9525">
+                <a14:hiddenLine xmlns:a14="http://schemas.microsoft.com/office/drawing/2010/main" xmlns="" w="9525">
                   <a:solidFill>
                     <a:srgbClr val="000000"/>
                   </a:solidFill>
@@ -2445,7 +2445,7 @@
             </a:ln>
             <a:extLst>
               <a:ext uri="{91240B29-F687-4f45-9708-019B960494DF}">
-                <a14:hiddenLine xmlns="" xmlns:a14="http://schemas.microsoft.com/office/drawing/2010/main" w="9525">
+                <a14:hiddenLine xmlns:a14="http://schemas.microsoft.com/office/drawing/2010/main" xmlns="" w="9525">
                   <a:solidFill>
                     <a:srgbClr val="000000"/>
                   </a:solidFill>
@@ -2507,7 +2507,7 @@
             </a:ln>
             <a:extLst>
               <a:ext uri="{91240B29-F687-4f45-9708-019B960494DF}">
-                <a14:hiddenLine xmlns="" xmlns:a14="http://schemas.microsoft.com/office/drawing/2010/main" w="9525">
+                <a14:hiddenLine xmlns:a14="http://schemas.microsoft.com/office/drawing/2010/main" xmlns="" w="9525">
                   <a:solidFill>
                     <a:srgbClr val="000000"/>
                   </a:solidFill>
@@ -2569,7 +2569,7 @@
             </a:ln>
             <a:extLst>
               <a:ext uri="{91240B29-F687-4f45-9708-019B960494DF}">
-                <a14:hiddenLine xmlns="" xmlns:a14="http://schemas.microsoft.com/office/drawing/2010/main" w="9525">
+                <a14:hiddenLine xmlns:a14="http://schemas.microsoft.com/office/drawing/2010/main" xmlns="" w="9525">
                   <a:solidFill>
                     <a:srgbClr val="000000"/>
                   </a:solidFill>
@@ -2659,7 +2659,7 @@
             </a:ln>
             <a:extLst>
               <a:ext uri="{91240B29-F687-4f45-9708-019B960494DF}">
-                <a14:hiddenLine xmlns="" xmlns:a14="http://schemas.microsoft.com/office/drawing/2010/main" w="9525">
+                <a14:hiddenLine xmlns:a14="http://schemas.microsoft.com/office/drawing/2010/main" xmlns="" w="9525">
                   <a:solidFill>
                     <a:srgbClr val="000000"/>
                   </a:solidFill>
@@ -2727,7 +2727,7 @@
             </a:ln>
             <a:extLst>
               <a:ext uri="{91240B29-F687-4f45-9708-019B960494DF}">
-                <a14:hiddenLine xmlns="" xmlns:a14="http://schemas.microsoft.com/office/drawing/2010/main" w="9525">
+                <a14:hiddenLine xmlns:a14="http://schemas.microsoft.com/office/drawing/2010/main" xmlns="" w="9525">
                   <a:solidFill>
                     <a:srgbClr val="000000"/>
                   </a:solidFill>
@@ -2789,7 +2789,7 @@
             </a:ln>
             <a:extLst>
               <a:ext uri="{91240B29-F687-4f45-9708-019B960494DF}">
-                <a14:hiddenLine xmlns="" xmlns:a14="http://schemas.microsoft.com/office/drawing/2010/main" w="9525">
+                <a14:hiddenLine xmlns:a14="http://schemas.microsoft.com/office/drawing/2010/main" xmlns="" w="9525">
                   <a:solidFill>
                     <a:srgbClr val="000000"/>
                   </a:solidFill>
@@ -2879,7 +2879,7 @@
             </a:ln>
             <a:extLst>
               <a:ext uri="{91240B29-F687-4f45-9708-019B960494DF}">
-                <a14:hiddenLine xmlns="" xmlns:a14="http://schemas.microsoft.com/office/drawing/2010/main" w="9525">
+                <a14:hiddenLine xmlns:a14="http://schemas.microsoft.com/office/drawing/2010/main" xmlns="" w="9525">
                   <a:solidFill>
                     <a:srgbClr val="000000"/>
                   </a:solidFill>
@@ -2941,7 +2941,7 @@
             </a:ln>
             <a:extLst>
               <a:ext uri="{91240B29-F687-4f45-9708-019B960494DF}">
-                <a14:hiddenLine xmlns="" xmlns:a14="http://schemas.microsoft.com/office/drawing/2010/main" w="9525">
+                <a14:hiddenLine xmlns:a14="http://schemas.microsoft.com/office/drawing/2010/main" xmlns="" w="9525">
                   <a:solidFill>
                     <a:srgbClr val="000000"/>
                   </a:solidFill>
@@ -3031,7 +3031,7 @@
             </a:ln>
             <a:extLst>
               <a:ext uri="{91240B29-F687-4f45-9708-019B960494DF}">
-                <a14:hiddenLine xmlns="" xmlns:a14="http://schemas.microsoft.com/office/drawing/2010/main" w="9525">
+                <a14:hiddenLine xmlns:a14="http://schemas.microsoft.com/office/drawing/2010/main" xmlns="" w="9525">
                   <a:solidFill>
                     <a:srgbClr val="000000"/>
                   </a:solidFill>
@@ -3093,7 +3093,7 @@
             </a:ln>
             <a:extLst>
               <a:ext uri="{91240B29-F687-4f45-9708-019B960494DF}">
-                <a14:hiddenLine xmlns="" xmlns:a14="http://schemas.microsoft.com/office/drawing/2010/main" w="9525">
+                <a14:hiddenLine xmlns:a14="http://schemas.microsoft.com/office/drawing/2010/main" xmlns="" w="9525">
                   <a:solidFill>
                     <a:srgbClr val="000000"/>
                   </a:solidFill>
@@ -3183,7 +3183,7 @@
             </a:ln>
             <a:extLst>
               <a:ext uri="{91240B29-F687-4f45-9708-019B960494DF}">
-                <a14:hiddenLine xmlns="" xmlns:a14="http://schemas.microsoft.com/office/drawing/2010/main" w="9525">
+                <a14:hiddenLine xmlns:a14="http://schemas.microsoft.com/office/drawing/2010/main" xmlns="" w="9525">
                   <a:solidFill>
                     <a:srgbClr val="000000"/>
                   </a:solidFill>
@@ -3217,7 +3217,7 @@
             </a:ln>
             <a:extLst>
               <a:ext uri="{91240B29-F687-4f45-9708-019B960494DF}">
-                <a14:hiddenLine xmlns="" xmlns:a14="http://schemas.microsoft.com/office/drawing/2010/main" w="9525">
+                <a14:hiddenLine xmlns:a14="http://schemas.microsoft.com/office/drawing/2010/main" xmlns="" w="9525">
                   <a:solidFill>
                     <a:srgbClr val="000000"/>
                   </a:solidFill>
@@ -3282,7 +3282,7 @@
             </a:ln>
             <a:extLst>
               <a:ext uri="{91240B29-F687-4f45-9708-019B960494DF}">
-                <a14:hiddenLine xmlns="" xmlns:a14="http://schemas.microsoft.com/office/drawing/2010/main" w="9525">
+                <a14:hiddenLine xmlns:a14="http://schemas.microsoft.com/office/drawing/2010/main" xmlns="" w="9525">
                   <a:solidFill>
                     <a:srgbClr val="000000"/>
                   </a:solidFill>
@@ -3372,7 +3372,7 @@
             </a:ln>
             <a:extLst>
               <a:ext uri="{91240B29-F687-4f45-9708-019B960494DF}">
-                <a14:hiddenLine xmlns="" xmlns:a14="http://schemas.microsoft.com/office/drawing/2010/main" w="9525">
+                <a14:hiddenLine xmlns:a14="http://schemas.microsoft.com/office/drawing/2010/main" xmlns="" w="9525">
                   <a:solidFill>
                     <a:srgbClr val="000000"/>
                   </a:solidFill>
@@ -3434,7 +3434,7 @@
             </a:ln>
             <a:extLst>
               <a:ext uri="{91240B29-F687-4f45-9708-019B960494DF}">
-                <a14:hiddenLine xmlns="" xmlns:a14="http://schemas.microsoft.com/office/drawing/2010/main" w="9525">
+                <a14:hiddenLine xmlns:a14="http://schemas.microsoft.com/office/drawing/2010/main" xmlns="" w="9525">
                   <a:solidFill>
                     <a:srgbClr val="000000"/>
                   </a:solidFill>
@@ -3524,7 +3524,7 @@
             </a:ln>
             <a:extLst>
               <a:ext uri="{91240B29-F687-4f45-9708-019B960494DF}">
-                <a14:hiddenLine xmlns="" xmlns:a14="http://schemas.microsoft.com/office/drawing/2010/main" w="9525">
+                <a14:hiddenLine xmlns:a14="http://schemas.microsoft.com/office/drawing/2010/main" xmlns="" w="9525">
                   <a:solidFill>
                     <a:srgbClr val="000000"/>
                   </a:solidFill>
@@ -3614,7 +3614,7 @@
             </a:ln>
             <a:extLst>
               <a:ext uri="{91240B29-F687-4f45-9708-019B960494DF}">
-                <a14:hiddenLine xmlns="" xmlns:a14="http://schemas.microsoft.com/office/drawing/2010/main" w="9525">
+                <a14:hiddenLine xmlns:a14="http://schemas.microsoft.com/office/drawing/2010/main" xmlns="" w="9525">
                   <a:solidFill>
                     <a:srgbClr val="000000"/>
                   </a:solidFill>
@@ -3679,7 +3679,7 @@
             </a:ln>
             <a:extLst>
               <a:ext uri="{91240B29-F687-4f45-9708-019B960494DF}">
-                <a14:hiddenLine xmlns="" xmlns:a14="http://schemas.microsoft.com/office/drawing/2010/main" w="9525">
+                <a14:hiddenLine xmlns:a14="http://schemas.microsoft.com/office/drawing/2010/main" xmlns="" w="9525">
                   <a:solidFill>
                     <a:srgbClr val="000000"/>
                   </a:solidFill>
@@ -3741,7 +3741,7 @@
             </a:ln>
             <a:extLst>
               <a:ext uri="{91240B29-F687-4f45-9708-019B960494DF}">
-                <a14:hiddenLine xmlns="" xmlns:a14="http://schemas.microsoft.com/office/drawing/2010/main" w="9525">
+                <a14:hiddenLine xmlns:a14="http://schemas.microsoft.com/office/drawing/2010/main" xmlns="" w="9525">
                   <a:solidFill>
                     <a:srgbClr val="000000"/>
                   </a:solidFill>
@@ -3831,7 +3831,7 @@
             </a:ln>
             <a:extLst>
               <a:ext uri="{91240B29-F687-4f45-9708-019B960494DF}">
-                <a14:hiddenLine xmlns="" xmlns:a14="http://schemas.microsoft.com/office/drawing/2010/main" w="9525">
+                <a14:hiddenLine xmlns:a14="http://schemas.microsoft.com/office/drawing/2010/main" xmlns="" w="9525">
                   <a:solidFill>
                     <a:srgbClr val="000000"/>
                   </a:solidFill>
@@ -3921,7 +3921,7 @@
             </a:ln>
             <a:extLst>
               <a:ext uri="{91240B29-F687-4f45-9708-019B960494DF}">
-                <a14:hiddenLine xmlns="" xmlns:a14="http://schemas.microsoft.com/office/drawing/2010/main" w="9525">
+                <a14:hiddenLine xmlns:a14="http://schemas.microsoft.com/office/drawing/2010/main" xmlns="" w="9525">
                   <a:solidFill>
                     <a:srgbClr val="000000"/>
                   </a:solidFill>
@@ -3983,7 +3983,7 @@
             </a:ln>
             <a:extLst>
               <a:ext uri="{91240B29-F687-4f45-9708-019B960494DF}">
-                <a14:hiddenLine xmlns="" xmlns:a14="http://schemas.microsoft.com/office/drawing/2010/main" w="9525">
+                <a14:hiddenLine xmlns:a14="http://schemas.microsoft.com/office/drawing/2010/main" xmlns="" w="9525">
                   <a:solidFill>
                     <a:srgbClr val="000000"/>
                   </a:solidFill>
@@ -4103,7 +4103,7 @@
             </a:ln>
             <a:extLst>
               <a:ext uri="{91240B29-F687-4f45-9708-019B960494DF}">
-                <a14:hiddenLine xmlns="" xmlns:a14="http://schemas.microsoft.com/office/drawing/2010/main" w="9525">
+                <a14:hiddenLine xmlns:a14="http://schemas.microsoft.com/office/drawing/2010/main" xmlns="" w="9525">
                   <a:solidFill>
                     <a:srgbClr val="000000"/>
                   </a:solidFill>
@@ -4171,7 +4171,7 @@
             </a:ln>
             <a:extLst>
               <a:ext uri="{91240B29-F687-4f45-9708-019B960494DF}">
-                <a14:hiddenLine xmlns="" xmlns:a14="http://schemas.microsoft.com/office/drawing/2010/main" w="9525">
+                <a14:hiddenLine xmlns:a14="http://schemas.microsoft.com/office/drawing/2010/main" xmlns="" w="9525">
                   <a:solidFill>
                     <a:srgbClr val="000000"/>
                   </a:solidFill>
@@ -4261,7 +4261,7 @@
             </a:ln>
             <a:extLst>
               <a:ext uri="{91240B29-F687-4f45-9708-019B960494DF}">
-                <a14:hiddenLine xmlns="" xmlns:a14="http://schemas.microsoft.com/office/drawing/2010/main" w="9525">
+                <a14:hiddenLine xmlns:a14="http://schemas.microsoft.com/office/drawing/2010/main" xmlns="" w="9525">
                   <a:solidFill>
                     <a:srgbClr val="000000"/>
                   </a:solidFill>
@@ -4401,7 +4401,7 @@
           <a:p>
             <a:fld id="{48A87A34-81AB-432B-8DAE-1953F412C126}" type="datetimeFigureOut">
               <a:rPr lang="en-US" dirty="0"/>
-              <a:t>1/31/2018</a:t>
+              <a:t>2/1/2018</a:t>
             </a:fld>
             <a:endParaRPr lang="en-US" dirty="0"/>
           </a:p>
@@ -4663,7 +4663,7 @@
           <a:p>
             <a:fld id="{48A87A34-81AB-432B-8DAE-1953F412C126}" type="datetimeFigureOut">
               <a:rPr lang="en-US" dirty="0"/>
-              <a:t>1/31/2018</a:t>
+              <a:t>2/1/2018</a:t>
             </a:fld>
             <a:endParaRPr lang="en-US" dirty="0"/>
           </a:p>
@@ -4854,7 +4854,7 @@
           <a:p>
             <a:fld id="{48A87A34-81AB-432B-8DAE-1953F412C126}" type="datetimeFigureOut">
               <a:rPr lang="en-US" dirty="0"/>
-              <a:t>1/31/2018</a:t>
+              <a:t>2/1/2018</a:t>
             </a:fld>
             <a:endParaRPr lang="en-US" dirty="0"/>
           </a:p>
@@ -5112,7 +5112,7 @@
           <a:p>
             <a:fld id="{48A87A34-81AB-432B-8DAE-1953F412C126}" type="datetimeFigureOut">
               <a:rPr lang="en-US" dirty="0"/>
-              <a:t>1/31/2018</a:t>
+              <a:t>2/1/2018</a:t>
             </a:fld>
             <a:endParaRPr lang="en-US" dirty="0"/>
           </a:p>
@@ -5541,7 +5541,7 @@
           <a:p>
             <a:fld id="{48A87A34-81AB-432B-8DAE-1953F412C126}" type="datetimeFigureOut">
               <a:rPr lang="en-US" dirty="0"/>
-              <a:t>1/31/2018</a:t>
+              <a:t>2/1/2018</a:t>
             </a:fld>
             <a:endParaRPr lang="en-US" dirty="0"/>
           </a:p>
@@ -6082,7 +6082,7 @@
           <a:p>
             <a:fld id="{48A87A34-81AB-432B-8DAE-1953F412C126}" type="datetimeFigureOut">
               <a:rPr lang="en-US" dirty="0"/>
-              <a:t>1/31/2018</a:t>
+              <a:t>2/1/2018</a:t>
             </a:fld>
             <a:endParaRPr lang="en-US" dirty="0"/>
           </a:p>
@@ -6797,7 +6797,7 @@
           <a:p>
             <a:fld id="{48A87A34-81AB-432B-8DAE-1953F412C126}" type="datetimeFigureOut">
               <a:rPr lang="en-US" dirty="0"/>
-              <a:t>1/31/2018</a:t>
+              <a:t>2/1/2018</a:t>
             </a:fld>
             <a:endParaRPr lang="en-US" dirty="0"/>
           </a:p>
@@ -6962,7 +6962,7 @@
           <a:p>
             <a:fld id="{48A87A34-81AB-432B-8DAE-1953F412C126}" type="datetimeFigureOut">
               <a:rPr lang="en-US" dirty="0"/>
-              <a:t>1/31/2018</a:t>
+              <a:t>2/1/2018</a:t>
             </a:fld>
             <a:endParaRPr lang="en-US" dirty="0"/>
           </a:p>
@@ -7137,7 +7137,7 @@
           <a:p>
             <a:fld id="{48A87A34-81AB-432B-8DAE-1953F412C126}" type="datetimeFigureOut">
               <a:rPr lang="en-US" dirty="0"/>
-              <a:t>1/31/2018</a:t>
+              <a:t>2/1/2018</a:t>
             </a:fld>
             <a:endParaRPr lang="en-US" dirty="0"/>
           </a:p>
@@ -7302,7 +7302,7 @@
           <a:p>
             <a:fld id="{48A87A34-81AB-432B-8DAE-1953F412C126}" type="datetimeFigureOut">
               <a:rPr lang="en-US" dirty="0"/>
-              <a:t>1/31/2018</a:t>
+              <a:t>2/1/2018</a:t>
             </a:fld>
             <a:endParaRPr lang="en-US" dirty="0"/>
           </a:p>
@@ -7547,7 +7547,7 @@
           <a:p>
             <a:fld id="{48A87A34-81AB-432B-8DAE-1953F412C126}" type="datetimeFigureOut">
               <a:rPr lang="en-US" dirty="0"/>
-              <a:t>1/31/2018</a:t>
+              <a:t>2/1/2018</a:t>
             </a:fld>
             <a:endParaRPr lang="en-US" dirty="0"/>
           </a:p>
@@ -7774,7 +7774,7 @@
           <a:p>
             <a:fld id="{48A87A34-81AB-432B-8DAE-1953F412C126}" type="datetimeFigureOut">
               <a:rPr lang="en-US" dirty="0"/>
-              <a:t>1/31/2018</a:t>
+              <a:t>2/1/2018</a:t>
             </a:fld>
             <a:endParaRPr lang="en-US" dirty="0"/>
           </a:p>
@@ -8150,7 +8150,7 @@
           <a:p>
             <a:fld id="{48A87A34-81AB-432B-8DAE-1953F412C126}" type="datetimeFigureOut">
               <a:rPr lang="en-US" dirty="0"/>
-              <a:t>1/31/2018</a:t>
+              <a:t>2/1/2018</a:t>
             </a:fld>
             <a:endParaRPr lang="en-US" dirty="0"/>
           </a:p>
@@ -8263,7 +8263,7 @@
           <a:p>
             <a:fld id="{48A87A34-81AB-432B-8DAE-1953F412C126}" type="datetimeFigureOut">
               <a:rPr lang="en-US" dirty="0"/>
-              <a:t>1/31/2018</a:t>
+              <a:t>2/1/2018</a:t>
             </a:fld>
             <a:endParaRPr lang="en-US" dirty="0"/>
           </a:p>
@@ -8353,7 +8353,7 @@
           <a:p>
             <a:fld id="{48A87A34-81AB-432B-8DAE-1953F412C126}" type="datetimeFigureOut">
               <a:rPr lang="en-US" dirty="0"/>
-              <a:t>1/31/2018</a:t>
+              <a:t>2/1/2018</a:t>
             </a:fld>
             <a:endParaRPr lang="en-US" dirty="0"/>
           </a:p>
@@ -8597,7 +8597,7 @@
           <a:p>
             <a:fld id="{48A87A34-81AB-432B-8DAE-1953F412C126}" type="datetimeFigureOut">
               <a:rPr lang="en-US" dirty="0"/>
-              <a:t>1/31/2018</a:t>
+              <a:t>2/1/2018</a:t>
             </a:fld>
             <a:endParaRPr lang="en-US" dirty="0"/>
           </a:p>
@@ -8872,7 +8872,7 @@
           <a:p>
             <a:fld id="{48A87A34-81AB-432B-8DAE-1953F412C126}" type="datetimeFigureOut">
               <a:rPr lang="en-US" dirty="0"/>
-              <a:t>1/31/2018</a:t>
+              <a:t>2/1/2018</a:t>
             </a:fld>
             <a:endParaRPr lang="en-US" dirty="0"/>
           </a:p>
@@ -8983,7 +8983,7 @@
           <a:noFill/>
           <a:extLst>
             <a:ext uri="{909E8E84-426E-40dd-AFC4-6F175D3DCCD1}">
-              <a14:hiddenFill xmlns="" xmlns:a14="http://schemas.microsoft.com/office/drawing/2010/main">
+              <a14:hiddenFill xmlns:a14="http://schemas.microsoft.com/office/drawing/2010/main" xmlns="">
                 <a:solidFill>
                   <a:srgbClr val="FFFFFF"/>
                 </a:solidFill>
@@ -9057,7 +9057,7 @@
               </a:ln>
               <a:extLst>
                 <a:ext uri="{91240B29-F687-4f45-9708-019B960494DF}">
-                  <a14:hiddenLine xmlns="" xmlns:a14="http://schemas.microsoft.com/office/drawing/2010/main" w="9525">
+                  <a14:hiddenLine xmlns:a14="http://schemas.microsoft.com/office/drawing/2010/main" xmlns="" w="9525">
                     <a:solidFill>
                       <a:srgbClr val="000000"/>
                     </a:solidFill>
@@ -9147,7 +9147,7 @@
               </a:ln>
               <a:extLst>
                 <a:ext uri="{91240B29-F687-4f45-9708-019B960494DF}">
-                  <a14:hiddenLine xmlns="" xmlns:a14="http://schemas.microsoft.com/office/drawing/2010/main" w="9525">
+                  <a14:hiddenLine xmlns:a14="http://schemas.microsoft.com/office/drawing/2010/main" xmlns="" w="9525">
                     <a:solidFill>
                       <a:srgbClr val="000000"/>
                     </a:solidFill>
@@ -9237,7 +9237,7 @@
               </a:ln>
               <a:extLst>
                 <a:ext uri="{91240B29-F687-4f45-9708-019B960494DF}">
-                  <a14:hiddenLine xmlns="" xmlns:a14="http://schemas.microsoft.com/office/drawing/2010/main" w="9525">
+                  <a14:hiddenLine xmlns:a14="http://schemas.microsoft.com/office/drawing/2010/main" xmlns="" w="9525">
                     <a:solidFill>
                       <a:srgbClr val="000000"/>
                     </a:solidFill>
@@ -9299,7 +9299,7 @@
               </a:ln>
               <a:extLst>
                 <a:ext uri="{91240B29-F687-4f45-9708-019B960494DF}">
-                  <a14:hiddenLine xmlns="" xmlns:a14="http://schemas.microsoft.com/office/drawing/2010/main" w="9525">
+                  <a14:hiddenLine xmlns:a14="http://schemas.microsoft.com/office/drawing/2010/main" xmlns="" w="9525">
                     <a:solidFill>
                       <a:srgbClr val="000000"/>
                     </a:solidFill>
@@ -9389,7 +9389,7 @@
               </a:ln>
               <a:extLst>
                 <a:ext uri="{91240B29-F687-4f45-9708-019B960494DF}">
-                  <a14:hiddenLine xmlns="" xmlns:a14="http://schemas.microsoft.com/office/drawing/2010/main" w="9525">
+                  <a14:hiddenLine xmlns:a14="http://schemas.microsoft.com/office/drawing/2010/main" xmlns="" w="9525">
                     <a:solidFill>
                       <a:srgbClr val="000000"/>
                     </a:solidFill>
@@ -9451,7 +9451,7 @@
               </a:ln>
               <a:extLst>
                 <a:ext uri="{91240B29-F687-4f45-9708-019B960494DF}">
-                  <a14:hiddenLine xmlns="" xmlns:a14="http://schemas.microsoft.com/office/drawing/2010/main" w="9525">
+                  <a14:hiddenLine xmlns:a14="http://schemas.microsoft.com/office/drawing/2010/main" xmlns="" w="9525">
                     <a:solidFill>
                       <a:srgbClr val="000000"/>
                     </a:solidFill>
@@ -9513,7 +9513,7 @@
               </a:ln>
               <a:extLst>
                 <a:ext uri="{91240B29-F687-4f45-9708-019B960494DF}">
-                  <a14:hiddenLine xmlns="" xmlns:a14="http://schemas.microsoft.com/office/drawing/2010/main" w="9525">
+                  <a14:hiddenLine xmlns:a14="http://schemas.microsoft.com/office/drawing/2010/main" xmlns="" w="9525">
                     <a:solidFill>
                       <a:srgbClr val="000000"/>
                     </a:solidFill>
@@ -9603,7 +9603,7 @@
               </a:ln>
               <a:extLst>
                 <a:ext uri="{91240B29-F687-4f45-9708-019B960494DF}">
-                  <a14:hiddenLine xmlns="" xmlns:a14="http://schemas.microsoft.com/office/drawing/2010/main" w="9525">
+                  <a14:hiddenLine xmlns:a14="http://schemas.microsoft.com/office/drawing/2010/main" xmlns="" w="9525">
                     <a:solidFill>
                       <a:srgbClr val="000000"/>
                     </a:solidFill>
@@ -9693,7 +9693,7 @@
               </a:ln>
               <a:extLst>
                 <a:ext uri="{91240B29-F687-4f45-9708-019B960494DF}">
-                  <a14:hiddenLine xmlns="" xmlns:a14="http://schemas.microsoft.com/office/drawing/2010/main" w="9525">
+                  <a14:hiddenLine xmlns:a14="http://schemas.microsoft.com/office/drawing/2010/main" xmlns="" w="9525">
                     <a:solidFill>
                       <a:srgbClr val="000000"/>
                     </a:solidFill>
@@ -9755,7 +9755,7 @@
               </a:ln>
               <a:extLst>
                 <a:ext uri="{91240B29-F687-4f45-9708-019B960494DF}">
-                  <a14:hiddenLine xmlns="" xmlns:a14="http://schemas.microsoft.com/office/drawing/2010/main" w="9525">
+                  <a14:hiddenLine xmlns:a14="http://schemas.microsoft.com/office/drawing/2010/main" xmlns="" w="9525">
                     <a:solidFill>
                       <a:srgbClr val="000000"/>
                     </a:solidFill>
@@ -9865,7 +9865,7 @@
               </a:ln>
               <a:extLst>
                 <a:ext uri="{91240B29-F687-4f45-9708-019B960494DF}">
-                  <a14:hiddenLine xmlns="" xmlns:a14="http://schemas.microsoft.com/office/drawing/2010/main" w="9525">
+                  <a14:hiddenLine xmlns:a14="http://schemas.microsoft.com/office/drawing/2010/main" xmlns="" w="9525">
                     <a:solidFill>
                       <a:srgbClr val="000000"/>
                     </a:solidFill>
@@ -9949,7 +9949,7 @@
               </a:ln>
               <a:extLst>
                 <a:ext uri="{91240B29-F687-4f45-9708-019B960494DF}">
-                  <a14:hiddenLine xmlns="" xmlns:a14="http://schemas.microsoft.com/office/drawing/2010/main" w="9525">
+                  <a14:hiddenLine xmlns:a14="http://schemas.microsoft.com/office/drawing/2010/main" xmlns="" w="9525">
                     <a:solidFill>
                       <a:srgbClr val="000000"/>
                     </a:solidFill>
@@ -10011,7 +10011,7 @@
               </a:ln>
               <a:extLst>
                 <a:ext uri="{91240B29-F687-4f45-9708-019B960494DF}">
-                  <a14:hiddenLine xmlns="" xmlns:a14="http://schemas.microsoft.com/office/drawing/2010/main" w="9525">
+                  <a14:hiddenLine xmlns:a14="http://schemas.microsoft.com/office/drawing/2010/main" xmlns="" w="9525">
                     <a:solidFill>
                       <a:srgbClr val="000000"/>
                     </a:solidFill>
@@ -10073,7 +10073,7 @@
               </a:ln>
               <a:extLst>
                 <a:ext uri="{91240B29-F687-4f45-9708-019B960494DF}">
-                  <a14:hiddenLine xmlns="" xmlns:a14="http://schemas.microsoft.com/office/drawing/2010/main" w="9525">
+                  <a14:hiddenLine xmlns:a14="http://schemas.microsoft.com/office/drawing/2010/main" xmlns="" w="9525">
                     <a:solidFill>
                       <a:srgbClr val="000000"/>
                     </a:solidFill>
@@ -10163,7 +10163,7 @@
               </a:ln>
               <a:extLst>
                 <a:ext uri="{91240B29-F687-4f45-9708-019B960494DF}">
-                  <a14:hiddenLine xmlns="" xmlns:a14="http://schemas.microsoft.com/office/drawing/2010/main" w="9525">
+                  <a14:hiddenLine xmlns:a14="http://schemas.microsoft.com/office/drawing/2010/main" xmlns="" w="9525">
                     <a:solidFill>
                       <a:srgbClr val="000000"/>
                     </a:solidFill>
@@ -10197,7 +10197,7 @@
               </a:ln>
               <a:extLst>
                 <a:ext uri="{91240B29-F687-4f45-9708-019B960494DF}">
-                  <a14:hiddenLine xmlns="" xmlns:a14="http://schemas.microsoft.com/office/drawing/2010/main" w="9525">
+                  <a14:hiddenLine xmlns:a14="http://schemas.microsoft.com/office/drawing/2010/main" xmlns="" w="9525">
                     <a:solidFill>
                       <a:srgbClr val="000000"/>
                     </a:solidFill>
@@ -10262,7 +10262,7 @@
               </a:ln>
               <a:extLst>
                 <a:ext uri="{91240B29-F687-4f45-9708-019B960494DF}">
-                  <a14:hiddenLine xmlns="" xmlns:a14="http://schemas.microsoft.com/office/drawing/2010/main" w="9525">
+                  <a14:hiddenLine xmlns:a14="http://schemas.microsoft.com/office/drawing/2010/main" xmlns="" w="9525">
                     <a:solidFill>
                       <a:srgbClr val="000000"/>
                     </a:solidFill>
@@ -10352,7 +10352,7 @@
               </a:ln>
               <a:extLst>
                 <a:ext uri="{91240B29-F687-4f45-9708-019B960494DF}">
-                  <a14:hiddenLine xmlns="" xmlns:a14="http://schemas.microsoft.com/office/drawing/2010/main" w="9525">
+                  <a14:hiddenLine xmlns:a14="http://schemas.microsoft.com/office/drawing/2010/main" xmlns="" w="9525">
                     <a:solidFill>
                       <a:srgbClr val="000000"/>
                     </a:solidFill>
@@ -10414,7 +10414,7 @@
               </a:ln>
               <a:extLst>
                 <a:ext uri="{91240B29-F687-4f45-9708-019B960494DF}">
-                  <a14:hiddenLine xmlns="" xmlns:a14="http://schemas.microsoft.com/office/drawing/2010/main" w="9525">
+                  <a14:hiddenLine xmlns:a14="http://schemas.microsoft.com/office/drawing/2010/main" xmlns="" w="9525">
                     <a:solidFill>
                       <a:srgbClr val="000000"/>
                     </a:solidFill>
@@ -10504,7 +10504,7 @@
               </a:ln>
               <a:extLst>
                 <a:ext uri="{91240B29-F687-4f45-9708-019B960494DF}">
-                  <a14:hiddenLine xmlns="" xmlns:a14="http://schemas.microsoft.com/office/drawing/2010/main" w="9525">
+                  <a14:hiddenLine xmlns:a14="http://schemas.microsoft.com/office/drawing/2010/main" xmlns="" w="9525">
                     <a:solidFill>
                       <a:srgbClr val="000000"/>
                     </a:solidFill>
@@ -10569,7 +10569,7 @@
               </a:ln>
               <a:extLst>
                 <a:ext uri="{91240B29-F687-4f45-9708-019B960494DF}">
-                  <a14:hiddenLine xmlns="" xmlns:a14="http://schemas.microsoft.com/office/drawing/2010/main" w="9525">
+                  <a14:hiddenLine xmlns:a14="http://schemas.microsoft.com/office/drawing/2010/main" xmlns="" w="9525">
                     <a:solidFill>
                       <a:srgbClr val="000000"/>
                     </a:solidFill>
@@ -10631,7 +10631,7 @@
               </a:ln>
               <a:extLst>
                 <a:ext uri="{91240B29-F687-4f45-9708-019B960494DF}">
-                  <a14:hiddenLine xmlns="" xmlns:a14="http://schemas.microsoft.com/office/drawing/2010/main" w="9525">
+                  <a14:hiddenLine xmlns:a14="http://schemas.microsoft.com/office/drawing/2010/main" xmlns="" w="9525">
                     <a:solidFill>
                       <a:srgbClr val="000000"/>
                     </a:solidFill>
@@ -10721,7 +10721,7 @@
               </a:ln>
               <a:extLst>
                 <a:ext uri="{91240B29-F687-4f45-9708-019B960494DF}">
-                  <a14:hiddenLine xmlns="" xmlns:a14="http://schemas.microsoft.com/office/drawing/2010/main" w="9525">
+                  <a14:hiddenLine xmlns:a14="http://schemas.microsoft.com/office/drawing/2010/main" xmlns="" w="9525">
                     <a:solidFill>
                       <a:srgbClr val="000000"/>
                     </a:solidFill>
@@ -10811,7 +10811,7 @@
               </a:ln>
               <a:extLst>
                 <a:ext uri="{91240B29-F687-4f45-9708-019B960494DF}">
-                  <a14:hiddenLine xmlns="" xmlns:a14="http://schemas.microsoft.com/office/drawing/2010/main" w="9525">
+                  <a14:hiddenLine xmlns:a14="http://schemas.microsoft.com/office/drawing/2010/main" xmlns="" w="9525">
                     <a:solidFill>
                       <a:srgbClr val="000000"/>
                     </a:solidFill>
@@ -10876,7 +10876,7 @@
               </a:ln>
               <a:extLst>
                 <a:ext uri="{91240B29-F687-4f45-9708-019B960494DF}">
-                  <a14:hiddenLine xmlns="" xmlns:a14="http://schemas.microsoft.com/office/drawing/2010/main" w="9525">
+                  <a14:hiddenLine xmlns:a14="http://schemas.microsoft.com/office/drawing/2010/main" xmlns="" w="9525">
                     <a:solidFill>
                       <a:srgbClr val="000000"/>
                     </a:solidFill>
@@ -10996,7 +10996,7 @@
               </a:ln>
               <a:extLst>
                 <a:ext uri="{91240B29-F687-4f45-9708-019B960494DF}">
-                  <a14:hiddenLine xmlns="" xmlns:a14="http://schemas.microsoft.com/office/drawing/2010/main" w="9525">
+                  <a14:hiddenLine xmlns:a14="http://schemas.microsoft.com/office/drawing/2010/main" xmlns="" w="9525">
                     <a:solidFill>
                       <a:srgbClr val="000000"/>
                     </a:solidFill>
@@ -11094,7 +11094,7 @@
               </a:ln>
               <a:extLst>
                 <a:ext uri="{91240B29-F687-4f45-9708-019B960494DF}">
-                  <a14:hiddenLine xmlns="" xmlns:a14="http://schemas.microsoft.com/office/drawing/2010/main" w="9525">
+                  <a14:hiddenLine xmlns:a14="http://schemas.microsoft.com/office/drawing/2010/main" xmlns="" w="9525">
                     <a:solidFill>
                       <a:srgbClr val="000000"/>
                     </a:solidFill>
@@ -11209,7 +11209,7 @@
               </a:ln>
               <a:extLst>
                 <a:ext uri="{91240B29-F687-4f45-9708-019B960494DF}">
-                  <a14:hiddenLine xmlns="" xmlns:a14="http://schemas.microsoft.com/office/drawing/2010/main" w="9525">
+                  <a14:hiddenLine xmlns:a14="http://schemas.microsoft.com/office/drawing/2010/main" xmlns="" w="9525">
                     <a:solidFill>
                       <a:srgbClr val="000000"/>
                     </a:solidFill>
@@ -11299,7 +11299,7 @@
               </a:ln>
               <a:extLst>
                 <a:ext uri="{91240B29-F687-4f45-9708-019B960494DF}">
-                  <a14:hiddenLine xmlns="" xmlns:a14="http://schemas.microsoft.com/office/drawing/2010/main" w="9525">
+                  <a14:hiddenLine xmlns:a14="http://schemas.microsoft.com/office/drawing/2010/main" xmlns="" w="9525">
                     <a:solidFill>
                       <a:srgbClr val="000000"/>
                     </a:solidFill>
@@ -11364,7 +11364,7 @@
               </a:ln>
               <a:extLst>
                 <a:ext uri="{91240B29-F687-4f45-9708-019B960494DF}">
-                  <a14:hiddenLine xmlns="" xmlns:a14="http://schemas.microsoft.com/office/drawing/2010/main" w="9525">
+                  <a14:hiddenLine xmlns:a14="http://schemas.microsoft.com/office/drawing/2010/main" xmlns="" w="9525">
                     <a:solidFill>
                       <a:srgbClr val="000000"/>
                     </a:solidFill>
@@ -11454,7 +11454,7 @@
               </a:ln>
               <a:extLst>
                 <a:ext uri="{91240B29-F687-4f45-9708-019B960494DF}">
-                  <a14:hiddenLine xmlns="" xmlns:a14="http://schemas.microsoft.com/office/drawing/2010/main" w="9525">
+                  <a14:hiddenLine xmlns:a14="http://schemas.microsoft.com/office/drawing/2010/main" xmlns="" w="9525">
                     <a:solidFill>
                       <a:srgbClr val="000000"/>
                     </a:solidFill>
@@ -11522,7 +11522,7 @@
               </a:ln>
               <a:extLst>
                 <a:ext uri="{91240B29-F687-4f45-9708-019B960494DF}">
-                  <a14:hiddenLine xmlns="" xmlns:a14="http://schemas.microsoft.com/office/drawing/2010/main" w="9525">
+                  <a14:hiddenLine xmlns:a14="http://schemas.microsoft.com/office/drawing/2010/main" xmlns="" w="9525">
                     <a:solidFill>
                       <a:srgbClr val="000000"/>
                     </a:solidFill>
@@ -11612,7 +11612,7 @@
               </a:ln>
               <a:extLst>
                 <a:ext uri="{91240B29-F687-4f45-9708-019B960494DF}">
-                  <a14:hiddenLine xmlns="" xmlns:a14="http://schemas.microsoft.com/office/drawing/2010/main" w="9525">
+                  <a14:hiddenLine xmlns:a14="http://schemas.microsoft.com/office/drawing/2010/main" xmlns="" w="9525">
                     <a:solidFill>
                       <a:srgbClr val="000000"/>
                     </a:solidFill>
@@ -11680,7 +11680,7 @@
               </a:ln>
               <a:extLst>
                 <a:ext uri="{91240B29-F687-4f45-9708-019B960494DF}">
-                  <a14:hiddenLine xmlns="" xmlns:a14="http://schemas.microsoft.com/office/drawing/2010/main" w="9525">
+                  <a14:hiddenLine xmlns:a14="http://schemas.microsoft.com/office/drawing/2010/main" xmlns="" w="9525">
                     <a:solidFill>
                       <a:srgbClr val="000000"/>
                     </a:solidFill>
@@ -11770,7 +11770,7 @@
               </a:ln>
               <a:extLst>
                 <a:ext uri="{91240B29-F687-4f45-9708-019B960494DF}">
-                  <a14:hiddenLine xmlns="" xmlns:a14="http://schemas.microsoft.com/office/drawing/2010/main" w="9525">
+                  <a14:hiddenLine xmlns:a14="http://schemas.microsoft.com/office/drawing/2010/main" xmlns="" w="9525">
                     <a:solidFill>
                       <a:srgbClr val="000000"/>
                     </a:solidFill>
@@ -11804,7 +11804,7 @@
               </a:ln>
               <a:extLst>
                 <a:ext uri="{91240B29-F687-4f45-9708-019B960494DF}">
-                  <a14:hiddenLine xmlns="" xmlns:a14="http://schemas.microsoft.com/office/drawing/2010/main" w="9525">
+                  <a14:hiddenLine xmlns:a14="http://schemas.microsoft.com/office/drawing/2010/main" xmlns="" w="9525">
                     <a:solidFill>
                       <a:srgbClr val="000000"/>
                     </a:solidFill>
@@ -11945,7 +11945,7 @@
             <a:fld id="{48A87A34-81AB-432B-8DAE-1953F412C126}" type="datetimeFigureOut">
               <a:rPr lang="en-US" dirty="0"/>
               <a:pPr/>
-              <a:t>1/31/2018</a:t>
+              <a:t>2/1/2018</a:t>
             </a:fld>
             <a:endParaRPr lang="en-US" dirty="0"/>
           </a:p>
@@ -14364,63 +14364,201 @@
           </a:p>
         </p:txBody>
       </p:sp>
-      <p:sp>
-        <p:nvSpPr>
-          <p:cNvPr id="3" name="Marcador de contenido 2">
-            <a:extLst>
-              <a:ext uri="{FF2B5EF4-FFF2-40B4-BE49-F238E27FC236}">
-                <a16:creationId xmlns:a16="http://schemas.microsoft.com/office/drawing/2014/main" id="{FEF48166-CD71-4078-A558-3AF08630F60E}"/>
-              </a:ext>
-            </a:extLst>
-          </p:cNvPr>
-          <p:cNvSpPr>
-            <a:spLocks noGrp="1"/>
-          </p:cNvSpPr>
-          <p:nvPr>
-            <p:ph idx="1"/>
-          </p:nvPr>
-        </p:nvSpPr>
-        <p:spPr>
-          <a:xfrm>
-            <a:off x="6386732" y="2249486"/>
-            <a:ext cx="4660679" cy="3316427"/>
-          </a:xfrm>
-        </p:spPr>
-        <p:txBody>
-          <a:bodyPr/>
-          <a:lstStyle/>
-          <a:p>
-            <a:r>
-              <a:rPr lang="en-GB" dirty="0"/>
-              <a:t>Pink squares placed through “Grid Algorithm”</a:t>
-            </a:r>
-          </a:p>
-          <a:p>
-            <a:r>
-              <a:rPr lang="en-GB" dirty="0"/>
-              <a:t>Loud and streaky noises</a:t>
-            </a:r>
-          </a:p>
-          <a:p>
-            <a:r>
-              <a:rPr lang="en-GB" dirty="0"/>
-              <a:t>Click detection</a:t>
-            </a:r>
-          </a:p>
-          <a:p>
-            <a:r>
-              <a:rPr lang="en-GB" dirty="0"/>
-              <a:t>Distance calculation</a:t>
-            </a:r>
-          </a:p>
-          <a:p>
-            <a:r>
-              <a:rPr lang="en-GB" dirty="0"/>
-              <a:t>Port communication</a:t>
-            </a:r>
-          </a:p>
-        </p:txBody>
-      </p:sp>
+      <mc:AlternateContent xmlns:mc="http://schemas.openxmlformats.org/markup-compatibility/2006">
+        <mc:Choice xmlns:a14="http://schemas.microsoft.com/office/drawing/2010/main" Requires="a14">
+          <p:sp>
+            <p:nvSpPr>
+              <p:cNvPr id="3" name="Marcador de contenido 2">
+                <a:extLst>
+                  <a:ext uri="{FF2B5EF4-FFF2-40B4-BE49-F238E27FC236}">
+                    <a16:creationId xmlns:a16="http://schemas.microsoft.com/office/drawing/2014/main" id="{FEF48166-CD71-4078-A558-3AF08630F60E}"/>
+                  </a:ext>
+                </a:extLst>
+              </p:cNvPr>
+              <p:cNvSpPr>
+                <a:spLocks noGrp="1"/>
+              </p:cNvSpPr>
+              <p:nvPr>
+                <p:ph idx="1"/>
+              </p:nvPr>
+            </p:nvSpPr>
+            <p:spPr>
+              <a:xfrm>
+                <a:off x="5988120" y="1547121"/>
+                <a:ext cx="5819568" cy="3316427"/>
+              </a:xfrm>
+            </p:spPr>
+            <p:txBody>
+              <a:bodyPr>
+                <a:noAutofit/>
+              </a:bodyPr>
+              <a:lstStyle/>
+              <a:p>
+                <a:r>
+                  <a:rPr lang="es-ES" sz="2500" dirty="0" err="1"/>
+                  <a:t>Number</a:t>
+                </a:r>
+                <a:r>
+                  <a:rPr lang="es-ES" sz="2500" dirty="0"/>
+                  <a:t> </a:t>
+                </a:r>
+                <a:r>
+                  <a:rPr lang="es-ES" sz="2500" dirty="0" err="1"/>
+                  <a:t>of</a:t>
+                </a:r>
+                <a:r>
+                  <a:rPr lang="es-ES" sz="2500" dirty="0"/>
+                  <a:t> </a:t>
+                </a:r>
+                <a:r>
+                  <a:rPr lang="es-ES" sz="2500" dirty="0" err="1"/>
+                  <a:t>squares</a:t>
+                </a:r>
+                <a:r>
+                  <a:rPr lang="es-ES" sz="2500" dirty="0"/>
+                  <a:t> </a:t>
+                </a:r>
+                <a:r>
+                  <a:rPr lang="es-ES" sz="2500" dirty="0" err="1"/>
+                  <a:t>played</a:t>
+                </a:r>
+                <a:r>
+                  <a:rPr lang="es-ES" sz="2500" dirty="0"/>
+                  <a:t> </a:t>
+                </a:r>
+                <a:r>
+                  <a:rPr lang="es-ES" sz="2500" dirty="0" err="1"/>
+                  <a:t>parametrized</a:t>
+                </a:r>
+                <a:endParaRPr lang="es-ES" sz="2500" dirty="0"/>
+              </a:p>
+              <a:p>
+                <a:pPr marL="0" indent="0">
+                  <a:buNone/>
+                </a:pPr>
+                <a14:m>
+                  <m:oMathPara xmlns:m="http://schemas.openxmlformats.org/officeDocument/2006/math">
+                    <m:oMathParaPr>
+                      <m:jc m:val="centerGroup"/>
+                    </m:oMathParaPr>
+                    <m:oMath xmlns:m="http://schemas.openxmlformats.org/officeDocument/2006/math">
+                      <m:r>
+                        <a:rPr lang="en-US" i="1"/>
+                        <m:t>𝑁</m:t>
+                      </m:r>
+                      <m:r>
+                        <a:rPr lang="en-US" i="1"/>
+                        <m:t>= </m:t>
+                      </m:r>
+                      <m:f>
+                        <m:fPr>
+                          <m:ctrlPr>
+                            <a:rPr lang="en-GB" i="1"/>
+                          </m:ctrlPr>
+                        </m:fPr>
+                        <m:num>
+                          <m:r>
+                            <a:rPr lang="en-US" i="1"/>
+                            <m:t>𝑇</m:t>
+                          </m:r>
+                        </m:num>
+                        <m:den>
+                          <m:r>
+                            <a:rPr lang="en-US" i="1"/>
+                            <m:t>𝑀𝐶𝑇</m:t>
+                          </m:r>
+                        </m:den>
+                      </m:f>
+                      <m:r>
+                        <a:rPr lang="en-US" i="1"/>
+                        <m:t>−</m:t>
+                      </m:r>
+                      <m:r>
+                        <a:rPr lang="en-US" i="1"/>
+                        <m:t>𝐼𝑇</m:t>
+                      </m:r>
+                    </m:oMath>
+                  </m:oMathPara>
+                </a14:m>
+                <a:endParaRPr lang="en-GB" sz="2100" dirty="0"/>
+              </a:p>
+              <a:p>
+                <a:r>
+                  <a:rPr lang="en-GB" sz="2500" dirty="0"/>
+                  <a:t>Squares placed through “Grid Algorithm”</a:t>
+                </a:r>
+              </a:p>
+              <a:p>
+                <a:r>
+                  <a:rPr lang="en-GB" sz="2500" dirty="0"/>
+                  <a:t>Loud and streaky noises</a:t>
+                </a:r>
+              </a:p>
+              <a:p>
+                <a:r>
+                  <a:rPr lang="en-GB" sz="2500" dirty="0"/>
+                  <a:t>Click detection</a:t>
+                </a:r>
+              </a:p>
+              <a:p>
+                <a:r>
+                  <a:rPr lang="en-GB" sz="2500" dirty="0"/>
+                  <a:t>Distance calculation</a:t>
+                </a:r>
+              </a:p>
+              <a:p>
+                <a:r>
+                  <a:rPr lang="en-GB" sz="2500" dirty="0"/>
+                  <a:t>Port communication</a:t>
+                </a:r>
+              </a:p>
+            </p:txBody>
+          </p:sp>
+        </mc:Choice>
+        <mc:Fallback>
+          <p:sp>
+            <p:nvSpPr>
+              <p:cNvPr id="3" name="Marcador de contenido 2">
+                <a:extLst>
+                  <a:ext uri="{FF2B5EF4-FFF2-40B4-BE49-F238E27FC236}">
+                    <a16:creationId xmlns:a16="http://schemas.microsoft.com/office/drawing/2014/main" id="{FEF48166-CD71-4078-A558-3AF08630F60E}"/>
+                  </a:ext>
+                </a:extLst>
+              </p:cNvPr>
+              <p:cNvSpPr>
+                <a:spLocks noGrp="1" noRot="1" noChangeAspect="1" noMove="1" noResize="1" noEditPoints="1" noAdjustHandles="1" noChangeArrowheads="1" noChangeShapeType="1" noTextEdit="1"/>
+              </p:cNvSpPr>
+              <p:nvPr>
+                <p:ph idx="1"/>
+              </p:nvPr>
+            </p:nvSpPr>
+            <p:spPr>
+              <a:xfrm>
+                <a:off x="5988120" y="1547121"/>
+                <a:ext cx="5819568" cy="3316427"/>
+              </a:xfrm>
+              <a:blipFill>
+                <a:blip r:embed="rId2"/>
+                <a:stretch>
+                  <a:fillRect l="-2304" t="-2574" b="-33824"/>
+                </a:stretch>
+              </a:blipFill>
+            </p:spPr>
+            <p:txBody>
+              <a:bodyPr/>
+              <a:lstStyle/>
+              <a:p>
+                <a:r>
+                  <a:rPr lang="en-GB">
+                    <a:noFill/>
+                  </a:rPr>
+                  <a:t> </a:t>
+                </a:r>
+              </a:p>
+            </p:txBody>
+          </p:sp>
+        </mc:Fallback>
+      </mc:AlternateContent>
       <p:pic>
         <p:nvPicPr>
           <p:cNvPr id="4" name="Imagen 3">
@@ -14436,7 +14574,7 @@
           <p:nvPr/>
         </p:nvPicPr>
         <p:blipFill rotWithShape="1">
-          <a:blip r:embed="rId2"/>
+          <a:blip r:embed="rId3"/>
           <a:srcRect l="13" t="15563" r="-13" b="8975"/>
           <a:stretch/>
         </p:blipFill>
@@ -14526,13 +14664,54 @@
         </p:nvSpPr>
         <p:spPr>
           <a:xfrm>
-            <a:off x="6096000" y="2249487"/>
+            <a:off x="6094412" y="1911779"/>
             <a:ext cx="4951411" cy="3541714"/>
           </a:xfrm>
         </p:spPr>
         <p:txBody>
-          <a:bodyPr/>
+          <a:bodyPr>
+            <a:normAutofit lnSpcReduction="10000"/>
+          </a:bodyPr>
           <a:lstStyle/>
+          <a:p>
+            <a:r>
+              <a:rPr lang="es-ES" sz="3500" dirty="0" err="1"/>
+              <a:t>Programmable</a:t>
+            </a:r>
+            <a:r>
+              <a:rPr lang="es-ES" sz="3500" dirty="0"/>
+              <a:t> </a:t>
+            </a:r>
+            <a:r>
+              <a:rPr lang="es-ES" sz="3500" dirty="0" err="1"/>
+              <a:t>behaviour</a:t>
+            </a:r>
+            <a:r>
+              <a:rPr lang="es-ES" sz="3500" dirty="0"/>
+              <a:t> </a:t>
+            </a:r>
+            <a:r>
+              <a:rPr lang="es-ES" sz="3500" dirty="0" err="1"/>
+              <a:t>of</a:t>
+            </a:r>
+            <a:r>
+              <a:rPr lang="es-ES" sz="3500" dirty="0"/>
+              <a:t> </a:t>
+            </a:r>
+            <a:r>
+              <a:rPr lang="es-ES" sz="3500" dirty="0" err="1"/>
+              <a:t>the</a:t>
+            </a:r>
+            <a:r>
+              <a:rPr lang="es-ES" sz="3500" dirty="0"/>
+              <a:t> </a:t>
+            </a:r>
+            <a:r>
+              <a:rPr lang="es-ES" sz="3500" dirty="0" err="1"/>
+              <a:t>Simulation</a:t>
+            </a:r>
+            <a:endParaRPr lang="en-GB" sz="3500" dirty="0"/>
+          </a:p>
           <a:p>
             <a:r>
               <a:rPr lang="en-GB" sz="3500" dirty="0"/>
@@ -14796,15 +14975,33 @@
                                   </p:childTnLst>
                                 </p:cTn>
                               </p:par>
+                            </p:childTnLst>
+                          </p:cTn>
+                        </p:par>
+                      </p:childTnLst>
+                    </p:cTn>
+                  </p:par>
+                  <p:par>
+                    <p:cTn id="13" fill="hold">
+                      <p:stCondLst>
+                        <p:cond delay="indefinite"/>
+                      </p:stCondLst>
+                      <p:childTnLst>
+                        <p:par>
+                          <p:cTn id="14" fill="hold">
+                            <p:stCondLst>
+                              <p:cond delay="0"/>
+                            </p:stCondLst>
+                            <p:childTnLst>
                               <p:par>
-                                <p:cTn id="13" presetID="2" presetClass="entr" presetSubtype="4" fill="hold" grpId="0" nodeType="withEffect">
+                                <p:cTn id="15" presetID="2" presetClass="entr" presetSubtype="4" fill="hold" grpId="0" nodeType="clickEffect">
                                   <p:stCondLst>
                                     <p:cond delay="0"/>
                                   </p:stCondLst>
                                   <p:childTnLst>
                                     <p:set>
                                       <p:cBhvr>
-                                        <p:cTn id="14" dur="1" fill="hold">
+                                        <p:cTn id="16" dur="1" fill="hold">
                                           <p:stCondLst>
                                             <p:cond delay="0"/>
                                           </p:stCondLst>
@@ -14826,7 +15023,7 @@
                                     </p:set>
                                     <p:anim calcmode="lin" valueType="num">
                                       <p:cBhvr additive="base">
-                                        <p:cTn id="15" dur="500" fill="hold"/>
+                                        <p:cTn id="17" dur="500" fill="hold"/>
                                         <p:tgtEl>
                                           <p:spTgt spid="3">
                                             <p:txEl>
@@ -14853,7 +15050,7 @@
                                     </p:anim>
                                     <p:anim calcmode="lin" valueType="num">
                                       <p:cBhvr additive="base">
-                                        <p:cTn id="16" dur="500" fill="hold"/>
+                                        <p:cTn id="18" dur="500" fill="hold"/>
                                         <p:tgtEl>
                                           <p:spTgt spid="3">
                                             <p:txEl>
@@ -14882,14 +15079,14 @@
                                 </p:cTn>
                               </p:par>
                               <p:par>
-                                <p:cTn id="17" presetID="2" presetClass="entr" presetSubtype="4" fill="hold" grpId="0" nodeType="withEffect">
+                                <p:cTn id="19" presetID="2" presetClass="entr" presetSubtype="4" fill="hold" grpId="0" nodeType="withEffect">
                                   <p:stCondLst>
                                     <p:cond delay="0"/>
                                   </p:stCondLst>
                                   <p:childTnLst>
                                     <p:set>
                                       <p:cBhvr>
-                                        <p:cTn id="18" dur="1" fill="hold">
+                                        <p:cTn id="20" dur="1" fill="hold">
                                           <p:stCondLst>
                                             <p:cond delay="0"/>
                                           </p:stCondLst>
@@ -14911,7 +15108,7 @@
                                     </p:set>
                                     <p:anim calcmode="lin" valueType="num">
                                       <p:cBhvr additive="base">
-                                        <p:cTn id="19" dur="500" fill="hold"/>
+                                        <p:cTn id="21" dur="500" fill="hold"/>
                                         <p:tgtEl>
                                           <p:spTgt spid="3">
                                             <p:txEl>
@@ -14938,11 +15135,96 @@
                                     </p:anim>
                                     <p:anim calcmode="lin" valueType="num">
                                       <p:cBhvr additive="base">
-                                        <p:cTn id="20" dur="500" fill="hold"/>
+                                        <p:cTn id="22" dur="500" fill="hold"/>
                                         <p:tgtEl>
                                           <p:spTgt spid="3">
                                             <p:txEl>
                                               <p:pRg st="2" end="2"/>
+                                            </p:txEl>
+                                          </p:spTgt>
+                                        </p:tgtEl>
+                                        <p:attrNameLst>
+                                          <p:attrName>ppt_y</p:attrName>
+                                        </p:attrNameLst>
+                                      </p:cBhvr>
+                                      <p:tavLst>
+                                        <p:tav tm="0">
+                                          <p:val>
+                                            <p:strVal val="1+#ppt_h/2"/>
+                                          </p:val>
+                                        </p:tav>
+                                        <p:tav tm="100000">
+                                          <p:val>
+                                            <p:strVal val="#ppt_y"/>
+                                          </p:val>
+                                        </p:tav>
+                                      </p:tavLst>
+                                    </p:anim>
+                                  </p:childTnLst>
+                                </p:cTn>
+                              </p:par>
+                              <p:par>
+                                <p:cTn id="23" presetID="2" presetClass="entr" presetSubtype="4" fill="hold" grpId="0" nodeType="withEffect">
+                                  <p:stCondLst>
+                                    <p:cond delay="0"/>
+                                  </p:stCondLst>
+                                  <p:childTnLst>
+                                    <p:set>
+                                      <p:cBhvr>
+                                        <p:cTn id="24" dur="1" fill="hold">
+                                          <p:stCondLst>
+                                            <p:cond delay="0"/>
+                                          </p:stCondLst>
+                                        </p:cTn>
+                                        <p:tgtEl>
+                                          <p:spTgt spid="3">
+                                            <p:txEl>
+                                              <p:pRg st="3" end="3"/>
+                                            </p:txEl>
+                                          </p:spTgt>
+                                        </p:tgtEl>
+                                        <p:attrNameLst>
+                                          <p:attrName>style.visibility</p:attrName>
+                                        </p:attrNameLst>
+                                      </p:cBhvr>
+                                      <p:to>
+                                        <p:strVal val="visible"/>
+                                      </p:to>
+                                    </p:set>
+                                    <p:anim calcmode="lin" valueType="num">
+                                      <p:cBhvr additive="base">
+                                        <p:cTn id="25" dur="500" fill="hold"/>
+                                        <p:tgtEl>
+                                          <p:spTgt spid="3">
+                                            <p:txEl>
+                                              <p:pRg st="3" end="3"/>
+                                            </p:txEl>
+                                          </p:spTgt>
+                                        </p:tgtEl>
+                                        <p:attrNameLst>
+                                          <p:attrName>ppt_x</p:attrName>
+                                        </p:attrNameLst>
+                                      </p:cBhvr>
+                                      <p:tavLst>
+                                        <p:tav tm="0">
+                                          <p:val>
+                                            <p:strVal val="#ppt_x"/>
+                                          </p:val>
+                                        </p:tav>
+                                        <p:tav tm="100000">
+                                          <p:val>
+                                            <p:strVal val="#ppt_x"/>
+                                          </p:val>
+                                        </p:tav>
+                                      </p:tavLst>
+                                    </p:anim>
+                                    <p:anim calcmode="lin" valueType="num">
+                                      <p:cBhvr additive="base">
+                                        <p:cTn id="26" dur="500" fill="hold"/>
+                                        <p:tgtEl>
+                                          <p:spTgt spid="3">
+                                            <p:txEl>
+                                              <p:pRg st="3" end="3"/>
                                             </p:txEl>
                                           </p:spTgt>
                                         </p:tgtEl>
@@ -14973,26 +15255,26 @@
                     </p:cTn>
                   </p:par>
                   <p:par>
-                    <p:cTn id="21" fill="hold">
+                    <p:cTn id="27" fill="hold">
                       <p:stCondLst>
                         <p:cond delay="indefinite"/>
                       </p:stCondLst>
                       <p:childTnLst>
                         <p:par>
-                          <p:cTn id="22" fill="hold">
+                          <p:cTn id="28" fill="hold">
                             <p:stCondLst>
                               <p:cond delay="0"/>
                             </p:stCondLst>
                             <p:childTnLst>
                               <p:par>
-                                <p:cTn id="23" presetID="10" presetClass="entr" presetSubtype="0" fill="hold" nodeType="clickEffect">
+                                <p:cTn id="29" presetID="10" presetClass="entr" presetSubtype="0" fill="hold" nodeType="clickEffect">
                                   <p:stCondLst>
                                     <p:cond delay="0"/>
                                   </p:stCondLst>
                                   <p:childTnLst>
                                     <p:set>
                                       <p:cBhvr>
-                                        <p:cTn id="24" dur="1" fill="hold">
+                                        <p:cTn id="30" dur="1" fill="hold">
                                           <p:stCondLst>
                                             <p:cond delay="0"/>
                                           </p:stCondLst>
@@ -15010,7 +15292,7 @@
                                     </p:set>
                                     <p:animEffect transition="in" filter="fade">
                                       <p:cBhvr>
-                                        <p:cTn id="25" dur="500"/>
+                                        <p:cTn id="31" dur="500"/>
                                         <p:tgtEl>
                                           <p:spTgt spid="4"/>
                                         </p:tgtEl>
@@ -15126,19 +15408,19 @@
           <a:lstStyle/>
           <a:p>
             <a:r>
-              <a:rPr lang="en-GB" dirty="0"/>
+              <a:rPr lang="en-GB" sz="3000" dirty="0"/>
               <a:t> Multithread Program: Unity + Server</a:t>
             </a:r>
           </a:p>
           <a:p>
             <a:r>
-              <a:rPr lang="en-GB" dirty="0"/>
+              <a:rPr lang="en-GB" sz="3000" dirty="0"/>
               <a:t> Another application runs a Client: Data Receiving</a:t>
             </a:r>
           </a:p>
           <a:p>
             <a:r>
-              <a:rPr lang="en-GB" dirty="0"/>
+              <a:rPr lang="en-GB" sz="3000" dirty="0"/>
               <a:t> .NET Sockets</a:t>
             </a:r>
           </a:p>

</xml_diff>